<commit_message>
Added battery overview and schamtics
</commit_message>
<xml_diff>
--- a/PRESENTATION/Battery.pptx
+++ b/PRESENTATION/Battery.pptx
@@ -6,12 +6,19 @@
   </p:sldMasterIdLst>
   <p:sldIdLst>
     <p:sldId id="256" r:id="rId2"/>
-    <p:sldId id="257" r:id="rId3"/>
-    <p:sldId id="258" r:id="rId4"/>
-    <p:sldId id="259" r:id="rId5"/>
-    <p:sldId id="260" r:id="rId6"/>
-    <p:sldId id="261" r:id="rId7"/>
-    <p:sldId id="262" r:id="rId8"/>
+    <p:sldId id="268" r:id="rId3"/>
+    <p:sldId id="266" r:id="rId4"/>
+    <p:sldId id="267" r:id="rId5"/>
+    <p:sldId id="269" r:id="rId6"/>
+    <p:sldId id="264" r:id="rId7"/>
+    <p:sldId id="257" r:id="rId8"/>
+    <p:sldId id="258" r:id="rId9"/>
+    <p:sldId id="260" r:id="rId10"/>
+    <p:sldId id="265" r:id="rId11"/>
+    <p:sldId id="259" r:id="rId12"/>
+    <p:sldId id="261" r:id="rId13"/>
+    <p:sldId id="262" r:id="rId14"/>
+    <p:sldId id="263" r:id="rId15"/>
   </p:sldIdLst>
   <p:sldSz cx="12192000" cy="6858000"/>
   <p:notesSz cx="6858000" cy="9144000"/>
@@ -267,7 +274,7 @@
           <a:p>
             <a:fld id="{B027D84C-C8DF-44EC-8F26-E09A80CBF3F2}" type="datetimeFigureOut">
               <a:rPr lang="en-GB" smtClean="0"/>
-              <a:t>11/02/2020</a:t>
+              <a:t>13/02/2020</a:t>
             </a:fld>
             <a:endParaRPr lang="en-GB"/>
           </a:p>
@@ -467,7 +474,7 @@
           <a:p>
             <a:fld id="{B027D84C-C8DF-44EC-8F26-E09A80CBF3F2}" type="datetimeFigureOut">
               <a:rPr lang="en-GB" smtClean="0"/>
-              <a:t>11/02/2020</a:t>
+              <a:t>13/02/2020</a:t>
             </a:fld>
             <a:endParaRPr lang="en-GB"/>
           </a:p>
@@ -677,7 +684,7 @@
           <a:p>
             <a:fld id="{B027D84C-C8DF-44EC-8F26-E09A80CBF3F2}" type="datetimeFigureOut">
               <a:rPr lang="en-GB" smtClean="0"/>
-              <a:t>11/02/2020</a:t>
+              <a:t>13/02/2020</a:t>
             </a:fld>
             <a:endParaRPr lang="en-GB"/>
           </a:p>
@@ -877,7 +884,7 @@
           <a:p>
             <a:fld id="{B027D84C-C8DF-44EC-8F26-E09A80CBF3F2}" type="datetimeFigureOut">
               <a:rPr lang="en-GB" smtClean="0"/>
-              <a:t>11/02/2020</a:t>
+              <a:t>13/02/2020</a:t>
             </a:fld>
             <a:endParaRPr lang="en-GB"/>
           </a:p>
@@ -1153,7 +1160,7 @@
           <a:p>
             <a:fld id="{B027D84C-C8DF-44EC-8F26-E09A80CBF3F2}" type="datetimeFigureOut">
               <a:rPr lang="en-GB" smtClean="0"/>
-              <a:t>11/02/2020</a:t>
+              <a:t>13/02/2020</a:t>
             </a:fld>
             <a:endParaRPr lang="en-GB"/>
           </a:p>
@@ -1421,7 +1428,7 @@
           <a:p>
             <a:fld id="{B027D84C-C8DF-44EC-8F26-E09A80CBF3F2}" type="datetimeFigureOut">
               <a:rPr lang="en-GB" smtClean="0"/>
-              <a:t>11/02/2020</a:t>
+              <a:t>13/02/2020</a:t>
             </a:fld>
             <a:endParaRPr lang="en-GB"/>
           </a:p>
@@ -1836,7 +1843,7 @@
           <a:p>
             <a:fld id="{B027D84C-C8DF-44EC-8F26-E09A80CBF3F2}" type="datetimeFigureOut">
               <a:rPr lang="en-GB" smtClean="0"/>
-              <a:t>11/02/2020</a:t>
+              <a:t>13/02/2020</a:t>
             </a:fld>
             <a:endParaRPr lang="en-GB"/>
           </a:p>
@@ -1978,7 +1985,7 @@
           <a:p>
             <a:fld id="{B027D84C-C8DF-44EC-8F26-E09A80CBF3F2}" type="datetimeFigureOut">
               <a:rPr lang="en-GB" smtClean="0"/>
-              <a:t>11/02/2020</a:t>
+              <a:t>13/02/2020</a:t>
             </a:fld>
             <a:endParaRPr lang="en-GB"/>
           </a:p>
@@ -2091,7 +2098,7 @@
           <a:p>
             <a:fld id="{B027D84C-C8DF-44EC-8F26-E09A80CBF3F2}" type="datetimeFigureOut">
               <a:rPr lang="en-GB" smtClean="0"/>
-              <a:t>11/02/2020</a:t>
+              <a:t>13/02/2020</a:t>
             </a:fld>
             <a:endParaRPr lang="en-GB"/>
           </a:p>
@@ -2404,7 +2411,7 @@
           <a:p>
             <a:fld id="{B027D84C-C8DF-44EC-8F26-E09A80CBF3F2}" type="datetimeFigureOut">
               <a:rPr lang="en-GB" smtClean="0"/>
-              <a:t>11/02/2020</a:t>
+              <a:t>13/02/2020</a:t>
             </a:fld>
             <a:endParaRPr lang="en-GB"/>
           </a:p>
@@ -2693,7 +2700,7 @@
           <a:p>
             <a:fld id="{B027D84C-C8DF-44EC-8F26-E09A80CBF3F2}" type="datetimeFigureOut">
               <a:rPr lang="en-GB" smtClean="0"/>
-              <a:t>11/02/2020</a:t>
+              <a:t>13/02/2020</a:t>
             </a:fld>
             <a:endParaRPr lang="en-GB"/>
           </a:p>
@@ -2936,7 +2943,7 @@
           <a:p>
             <a:fld id="{B027D84C-C8DF-44EC-8F26-E09A80CBF3F2}" type="datetimeFigureOut">
               <a:rPr lang="en-GB" smtClean="0"/>
-              <a:t>11/02/2020</a:t>
+              <a:t>13/02/2020</a:t>
             </a:fld>
             <a:endParaRPr lang="en-GB"/>
           </a:p>
@@ -3452,7 +3459,7 @@
 </p:sld>
 </file>
 
-<file path=ppt/slides/slide2.xml><?xml version="1.0" encoding="utf-8"?>
+<file path=ppt/slides/slide10.xml><?xml version="1.0" encoding="utf-8"?>
 <p:sld xmlns:a="http://schemas.openxmlformats.org/drawingml/2006/main" xmlns:r="http://schemas.openxmlformats.org/officeDocument/2006/relationships" xmlns:p="http://schemas.openxmlformats.org/presentationml/2006/main">
   <p:cSld>
     <p:spTree>
@@ -3474,7 +3481,7 @@
           <p:cNvPr id="2" name="Title 1">
             <a:extLst>
               <a:ext uri="{FF2B5EF4-FFF2-40B4-BE49-F238E27FC236}">
-                <a16:creationId xmlns:a16="http://schemas.microsoft.com/office/drawing/2014/main" id="{0E5B7271-3723-49ED-A2DA-31D2BA410DEE}"/>
+                <a16:creationId xmlns:a16="http://schemas.microsoft.com/office/drawing/2014/main" id="{760EF5DD-47B4-4904-B175-B38B60653E55}"/>
               </a:ext>
             </a:extLst>
           </p:cNvPr>
@@ -3492,7 +3499,7 @@
           <a:p>
             <a:r>
               <a:rPr lang="en-GB" dirty="0"/>
-              <a:t>Range specification</a:t>
+              <a:t>Battery control overview</a:t>
             </a:r>
           </a:p>
         </p:txBody>
@@ -3502,7 +3509,7 @@
           <p:cNvPr id="3" name="Content Placeholder 2">
             <a:extLst>
               <a:ext uri="{FF2B5EF4-FFF2-40B4-BE49-F238E27FC236}">
-                <a16:creationId xmlns:a16="http://schemas.microsoft.com/office/drawing/2014/main" id="{AA7F8B67-E3A2-43A1-80EB-39942E5EBA00}"/>
+                <a16:creationId xmlns:a16="http://schemas.microsoft.com/office/drawing/2014/main" id="{3F6515A1-B1E3-4AE3-B640-E7A426887C39}"/>
               </a:ext>
             </a:extLst>
           </p:cNvPr>
@@ -3515,76 +3522,17 @@
         </p:nvSpPr>
         <p:spPr/>
         <p:txBody>
-          <a:bodyPr>
-            <a:normAutofit lnSpcReduction="10000"/>
-          </a:bodyPr>
-          <a:lstStyle/>
-          <a:p>
-            <a:pPr marL="0" indent="0">
-              <a:buNone/>
-            </a:pPr>
-            <a:r>
-              <a:rPr lang="en-GB" sz="3200" dirty="0"/>
-              <a:t>Specification</a:t>
-            </a:r>
-          </a:p>
-          <a:p>
-            <a:r>
-              <a:rPr lang="en-GB" sz="3200" dirty="0"/>
-              <a:t>Charge every week (7 days)</a:t>
-            </a:r>
-          </a:p>
-          <a:p>
-            <a:r>
-              <a:rPr lang="en-GB" sz="3200" dirty="0"/>
-              <a:t>Days being used:5 days (commute)</a:t>
-            </a:r>
-          </a:p>
-          <a:p>
-            <a:r>
-              <a:rPr lang="en-GB" sz="3200" dirty="0"/>
-              <a:t>Distance each day: 3km </a:t>
-            </a:r>
-          </a:p>
-          <a:p>
-            <a:r>
-              <a:rPr lang="en-GB" sz="3200" dirty="0"/>
-              <a:t>Estimated vertical distance: 80m</a:t>
-            </a:r>
-          </a:p>
-          <a:p>
-            <a:pPr marL="0" indent="0">
-              <a:buNone/>
-            </a:pPr>
-            <a:endParaRPr lang="en-GB" sz="3200" dirty="0"/>
-          </a:p>
-          <a:p>
-            <a:pPr marL="0" indent="0">
-              <a:buNone/>
-            </a:pPr>
-            <a:r>
-              <a:rPr lang="en-GB" sz="3200" dirty="0"/>
-              <a:t>This means:</a:t>
-            </a:r>
-          </a:p>
-          <a:p>
-            <a:r>
-              <a:rPr lang="en-GB" sz="3200" dirty="0"/>
-              <a:t>Estimated Watt-hours per mile: 10Wh/mile</a:t>
-            </a:r>
-          </a:p>
-          <a:p>
-            <a:endParaRPr lang="en-GB" sz="3200" dirty="0"/>
-          </a:p>
-          <a:p>
-            <a:endParaRPr lang="en-GB" sz="3200" dirty="0"/>
+          <a:bodyPr/>
+          <a:lstStyle/>
+          <a:p>
+            <a:endParaRPr lang="en-GB"/>
           </a:p>
         </p:txBody>
       </p:sp>
     </p:spTree>
     <p:extLst>
       <p:ext uri="{BB962C8B-B14F-4D97-AF65-F5344CB8AC3E}">
-        <p14:creationId xmlns:p14="http://schemas.microsoft.com/office/powerpoint/2010/main" val="2271532738"/>
+        <p14:creationId xmlns:p14="http://schemas.microsoft.com/office/powerpoint/2010/main" val="2397045919"/>
       </p:ext>
     </p:extLst>
   </p:cSld>
@@ -3594,7 +3542,7 @@
 </p:sld>
 </file>
 
-<file path=ppt/slides/slide3.xml><?xml version="1.0" encoding="utf-8"?>
+<file path=ppt/slides/slide11.xml><?xml version="1.0" encoding="utf-8"?>
 <p:sld xmlns:a="http://schemas.openxmlformats.org/drawingml/2006/main" xmlns:r="http://schemas.openxmlformats.org/officeDocument/2006/relationships" xmlns:p="http://schemas.openxmlformats.org/presentationml/2006/main">
   <p:cSld>
     <p:spTree>
@@ -3616,172 +3564,6 @@
           <p:cNvPr id="2" name="Title 1">
             <a:extLst>
               <a:ext uri="{FF2B5EF4-FFF2-40B4-BE49-F238E27FC236}">
-                <a16:creationId xmlns:a16="http://schemas.microsoft.com/office/drawing/2014/main" id="{673FF3E4-F450-44AE-80B0-AF79C50B5E10}"/>
-              </a:ext>
-            </a:extLst>
-          </p:cNvPr>
-          <p:cNvSpPr>
-            <a:spLocks noGrp="1"/>
-          </p:cNvSpPr>
-          <p:nvPr>
-            <p:ph type="title"/>
-          </p:nvPr>
-        </p:nvSpPr>
-        <p:spPr/>
-        <p:txBody>
-          <a:bodyPr/>
-          <a:lstStyle/>
-          <a:p>
-            <a:r>
-              <a:rPr lang="en-GB" dirty="0"/>
-              <a:t>Battery specification</a:t>
-            </a:r>
-          </a:p>
-        </p:txBody>
-      </p:sp>
-      <p:sp>
-        <p:nvSpPr>
-          <p:cNvPr id="3" name="Content Placeholder 2">
-            <a:extLst>
-              <a:ext uri="{FF2B5EF4-FFF2-40B4-BE49-F238E27FC236}">
-                <a16:creationId xmlns:a16="http://schemas.microsoft.com/office/drawing/2014/main" id="{D125B466-8300-4B74-A1BA-905EF3820914}"/>
-              </a:ext>
-            </a:extLst>
-          </p:cNvPr>
-          <p:cNvSpPr>
-            <a:spLocks noGrp="1"/>
-          </p:cNvSpPr>
-          <p:nvPr>
-            <p:ph idx="1"/>
-          </p:nvPr>
-        </p:nvSpPr>
-        <p:spPr/>
-        <p:txBody>
-          <a:bodyPr>
-            <a:normAutofit/>
-          </a:bodyPr>
-          <a:lstStyle/>
-          <a:p>
-            <a:pPr marL="0" indent="0">
-              <a:buNone/>
-            </a:pPr>
-            <a:r>
-              <a:rPr lang="en-GB" dirty="0"/>
-              <a:t>Lithium polymer chemistry</a:t>
-            </a:r>
-          </a:p>
-          <a:p>
-            <a:r>
-              <a:rPr lang="en-GB" dirty="0"/>
-              <a:t>Watt-hour capacity: 180Wh</a:t>
-            </a:r>
-          </a:p>
-          <a:p>
-            <a:r>
-              <a:rPr lang="en-GB" dirty="0"/>
-              <a:t>Supply voltage:22.2V</a:t>
-            </a:r>
-          </a:p>
-          <a:p>
-            <a:r>
-              <a:rPr lang="en-GB" dirty="0"/>
-              <a:t>Amp-hour capacity: 8100Ah</a:t>
-            </a:r>
-          </a:p>
-          <a:p>
-            <a:r>
-              <a:rPr lang="en-GB" dirty="0"/>
-              <a:t>Mass: 1.7kg</a:t>
-            </a:r>
-          </a:p>
-          <a:p>
-            <a:endParaRPr lang="en-GB" dirty="0"/>
-          </a:p>
-          <a:p>
-            <a:r>
-              <a:rPr lang="en-GB" dirty="0"/>
-              <a:t>Supply voltage: 50v</a:t>
-            </a:r>
-          </a:p>
-          <a:p>
-            <a:r>
-              <a:rPr lang="en-GB" dirty="0"/>
-              <a:t>2 batteries in parallel required</a:t>
-            </a:r>
-          </a:p>
-        </p:txBody>
-      </p:sp>
-      <p:pic>
-        <p:nvPicPr>
-          <p:cNvPr id="5" name="Picture 4" descr="A screenshot of a cell phone&#10;&#10;Description automatically generated">
-            <a:extLst>
-              <a:ext uri="{FF2B5EF4-FFF2-40B4-BE49-F238E27FC236}">
-                <a16:creationId xmlns:a16="http://schemas.microsoft.com/office/drawing/2014/main" id="{FD6F27ED-35B8-40F0-B2E0-07E4EFF2036D}"/>
-              </a:ext>
-            </a:extLst>
-          </p:cNvPr>
-          <p:cNvPicPr>
-            <a:picLocks noChangeAspect="1"/>
-          </p:cNvPicPr>
-          <p:nvPr/>
-        </p:nvPicPr>
-        <p:blipFill>
-          <a:blip r:embed="rId2">
-            <a:extLst>
-              <a:ext uri="{28A0092B-C50C-407E-A947-70E740481C1C}">
-                <a14:useLocalDpi xmlns:a14="http://schemas.microsoft.com/office/drawing/2010/main" val="0"/>
-              </a:ext>
-            </a:extLst>
-          </a:blip>
-          <a:stretch>
-            <a:fillRect/>
-          </a:stretch>
-        </p:blipFill>
-        <p:spPr>
-          <a:xfrm>
-            <a:off x="6096000" y="928328"/>
-            <a:ext cx="5907531" cy="3759338"/>
-          </a:xfrm>
-          <a:prstGeom prst="rect">
-            <a:avLst/>
-          </a:prstGeom>
-        </p:spPr>
-      </p:pic>
-    </p:spTree>
-    <p:extLst>
-      <p:ext uri="{BB962C8B-B14F-4D97-AF65-F5344CB8AC3E}">
-        <p14:creationId xmlns:p14="http://schemas.microsoft.com/office/powerpoint/2010/main" val="1175002974"/>
-      </p:ext>
-    </p:extLst>
-  </p:cSld>
-  <p:clrMapOvr>
-    <a:masterClrMapping/>
-  </p:clrMapOvr>
-</p:sld>
-</file>
-
-<file path=ppt/slides/slide4.xml><?xml version="1.0" encoding="utf-8"?>
-<p:sld xmlns:a="http://schemas.openxmlformats.org/drawingml/2006/main" xmlns:r="http://schemas.openxmlformats.org/officeDocument/2006/relationships" xmlns:p="http://schemas.openxmlformats.org/presentationml/2006/main">
-  <p:cSld>
-    <p:spTree>
-      <p:nvGrpSpPr>
-        <p:cNvPr id="1" name=""/>
-        <p:cNvGrpSpPr/>
-        <p:nvPr/>
-      </p:nvGrpSpPr>
-      <p:grpSpPr>
-        <a:xfrm>
-          <a:off x="0" y="0"/>
-          <a:ext cx="0" cy="0"/>
-          <a:chOff x="0" y="0"/>
-          <a:chExt cx="0" cy="0"/>
-        </a:xfrm>
-      </p:grpSpPr>
-      <p:sp>
-        <p:nvSpPr>
-          <p:cNvPr id="2" name="Title 1">
-            <a:extLst>
-              <a:ext uri="{FF2B5EF4-FFF2-40B4-BE49-F238E27FC236}">
                 <a16:creationId xmlns:a16="http://schemas.microsoft.com/office/drawing/2014/main" id="{AB06405B-CD38-4321-A24A-67621C4E3700}"/>
               </a:ext>
             </a:extLst>
@@ -3805,8 +3587,8 @@
           </a:p>
         </p:txBody>
       </p:sp>
-      <mc:AlternateContent xmlns:mc="http://schemas.openxmlformats.org/markup-compatibility/2006">
-        <mc:Choice xmlns:a14="http://schemas.microsoft.com/office/drawing/2010/main" Requires="a14">
+      <mc:AlternateContent xmlns:mc="http://schemas.openxmlformats.org/markup-compatibility/2006" xmlns:a14="http://schemas.microsoft.com/office/drawing/2010/main">
+        <mc:Choice Requires="a14">
           <p:sp>
             <p:nvSpPr>
               <p:cNvPr id="3" name="Content Placeholder 2">
@@ -3930,7 +3712,7 @@
             </p:txBody>
           </p:sp>
         </mc:Choice>
-        <mc:Fallback>
+        <mc:Fallback xmlns="">
           <p:sp>
             <p:nvSpPr>
               <p:cNvPr id="3" name="Content Placeholder 2">
@@ -4013,169 +3795,7 @@
 </p:sld>
 </file>
 
-<file path=ppt/slides/slide5.xml><?xml version="1.0" encoding="utf-8"?>
-<p:sld xmlns:a="http://schemas.openxmlformats.org/drawingml/2006/main" xmlns:r="http://schemas.openxmlformats.org/officeDocument/2006/relationships" xmlns:p="http://schemas.openxmlformats.org/presentationml/2006/main">
-  <p:cSld>
-    <p:spTree>
-      <p:nvGrpSpPr>
-        <p:cNvPr id="1" name=""/>
-        <p:cNvGrpSpPr/>
-        <p:nvPr/>
-      </p:nvGrpSpPr>
-      <p:grpSpPr>
-        <a:xfrm>
-          <a:off x="0" y="0"/>
-          <a:ext cx="0" cy="0"/>
-          <a:chOff x="0" y="0"/>
-          <a:chExt cx="0" cy="0"/>
-        </a:xfrm>
-      </p:grpSpPr>
-      <p:sp>
-        <p:nvSpPr>
-          <p:cNvPr id="2" name="Title 1">
-            <a:extLst>
-              <a:ext uri="{FF2B5EF4-FFF2-40B4-BE49-F238E27FC236}">
-                <a16:creationId xmlns:a16="http://schemas.microsoft.com/office/drawing/2014/main" id="{37129C13-237D-4521-81BA-D7F55AD5B585}"/>
-              </a:ext>
-            </a:extLst>
-          </p:cNvPr>
-          <p:cNvSpPr>
-            <a:spLocks noGrp="1"/>
-          </p:cNvSpPr>
-          <p:nvPr>
-            <p:ph type="title"/>
-          </p:nvPr>
-        </p:nvSpPr>
-        <p:spPr/>
-        <p:txBody>
-          <a:bodyPr/>
-          <a:lstStyle/>
-          <a:p>
-            <a:r>
-              <a:rPr lang="en-GB" dirty="0"/>
-              <a:t>Battery charging</a:t>
-            </a:r>
-          </a:p>
-        </p:txBody>
-      </p:sp>
-      <p:sp>
-        <p:nvSpPr>
-          <p:cNvPr id="3" name="Content Placeholder 2">
-            <a:extLst>
-              <a:ext uri="{FF2B5EF4-FFF2-40B4-BE49-F238E27FC236}">
-                <a16:creationId xmlns:a16="http://schemas.microsoft.com/office/drawing/2014/main" id="{67871035-2C42-42A1-86FD-846461ADF945}"/>
-              </a:ext>
-            </a:extLst>
-          </p:cNvPr>
-          <p:cNvSpPr>
-            <a:spLocks noGrp="1"/>
-          </p:cNvSpPr>
-          <p:nvPr>
-            <p:ph idx="1"/>
-          </p:nvPr>
-        </p:nvSpPr>
-        <p:spPr/>
-        <p:txBody>
-          <a:bodyPr/>
-          <a:lstStyle/>
-          <a:p>
-            <a:r>
-              <a:rPr lang="en-GB" dirty="0"/>
-              <a:t>Lithium polymer can be dangerous:</a:t>
-            </a:r>
-          </a:p>
-          <a:p>
-            <a:pPr lvl="1"/>
-            <a:r>
-              <a:rPr lang="en-GB" dirty="0"/>
-              <a:t>Overcharging</a:t>
-            </a:r>
-          </a:p>
-          <a:p>
-            <a:pPr lvl="1"/>
-            <a:r>
-              <a:rPr lang="en-GB" dirty="0"/>
-              <a:t>Unbalanced charging</a:t>
-            </a:r>
-          </a:p>
-          <a:p>
-            <a:r>
-              <a:rPr lang="en-GB" dirty="0"/>
-              <a:t>Use an off the shelf solution</a:t>
-            </a:r>
-          </a:p>
-          <a:p>
-            <a:r>
-              <a:rPr lang="en-GB" dirty="0"/>
-              <a:t>Use hobby/RC charger</a:t>
-            </a:r>
-          </a:p>
-          <a:p>
-            <a:r>
-              <a:rPr lang="en-GB" dirty="0"/>
-              <a:t>Charge batteries in parallel</a:t>
-            </a:r>
-          </a:p>
-          <a:p>
-            <a:endParaRPr lang="en-GB" dirty="0"/>
-          </a:p>
-          <a:p>
-            <a:r>
-              <a:rPr lang="en-GB" dirty="0"/>
-              <a:t>Battery isolated from charger by MOSFET mux</a:t>
-            </a:r>
-          </a:p>
-          <a:p>
-            <a:endParaRPr lang="en-GB" dirty="0"/>
-          </a:p>
-          <a:p>
-            <a:endParaRPr lang="en-GB" dirty="0"/>
-          </a:p>
-        </p:txBody>
-      </p:sp>
-      <p:pic>
-        <p:nvPicPr>
-          <p:cNvPr id="6" name="Picture 5">
-            <a:extLst>
-              <a:ext uri="{FF2B5EF4-FFF2-40B4-BE49-F238E27FC236}">
-                <a16:creationId xmlns:a16="http://schemas.microsoft.com/office/drawing/2014/main" id="{38978E23-184E-43D4-927F-322B80564812}"/>
-              </a:ext>
-            </a:extLst>
-          </p:cNvPr>
-          <p:cNvPicPr>
-            <a:picLocks noChangeAspect="1"/>
-          </p:cNvPicPr>
-          <p:nvPr/>
-        </p:nvPicPr>
-        <p:blipFill rotWithShape="1">
-          <a:blip r:embed="rId2"/>
-          <a:srcRect l="1375"/>
-          <a:stretch/>
-        </p:blipFill>
-        <p:spPr>
-          <a:xfrm>
-            <a:off x="7055194" y="681037"/>
-            <a:ext cx="4525780" cy="3465767"/>
-          </a:xfrm>
-          <a:prstGeom prst="rect">
-            <a:avLst/>
-          </a:prstGeom>
-        </p:spPr>
-      </p:pic>
-    </p:spTree>
-    <p:extLst>
-      <p:ext uri="{BB962C8B-B14F-4D97-AF65-F5344CB8AC3E}">
-        <p14:creationId xmlns:p14="http://schemas.microsoft.com/office/powerpoint/2010/main" val="2721647380"/>
-      </p:ext>
-    </p:extLst>
-  </p:cSld>
-  <p:clrMapOvr>
-    <a:masterClrMapping/>
-  </p:clrMapOvr>
-</p:sld>
-</file>
-
-<file path=ppt/slides/slide6.xml><?xml version="1.0" encoding="utf-8"?>
+<file path=ppt/slides/slide12.xml><?xml version="1.0" encoding="utf-8"?>
 <p:sld xmlns:a="http://schemas.openxmlformats.org/drawingml/2006/main" xmlns:r="http://schemas.openxmlformats.org/officeDocument/2006/relationships" xmlns:p="http://schemas.openxmlformats.org/presentationml/2006/main">
   <p:cSld>
     <p:spTree>
@@ -4309,6 +3929,907 @@
 </p:sld>
 </file>
 
+<file path=ppt/slides/slide13.xml><?xml version="1.0" encoding="utf-8"?>
+<p:sld xmlns:a="http://schemas.openxmlformats.org/drawingml/2006/main" xmlns:r="http://schemas.openxmlformats.org/officeDocument/2006/relationships" xmlns:p="http://schemas.openxmlformats.org/presentationml/2006/main">
+  <p:cSld>
+    <p:spTree>
+      <p:nvGrpSpPr>
+        <p:cNvPr id="1" name=""/>
+        <p:cNvGrpSpPr/>
+        <p:nvPr/>
+      </p:nvGrpSpPr>
+      <p:grpSpPr>
+        <a:xfrm>
+          <a:off x="0" y="0"/>
+          <a:ext cx="0" cy="0"/>
+          <a:chOff x="0" y="0"/>
+          <a:chExt cx="0" cy="0"/>
+        </a:xfrm>
+      </p:grpSpPr>
+      <p:sp>
+        <p:nvSpPr>
+          <p:cNvPr id="2" name="Title 1">
+            <a:extLst>
+              <a:ext uri="{FF2B5EF4-FFF2-40B4-BE49-F238E27FC236}">
+                <a16:creationId xmlns:a16="http://schemas.microsoft.com/office/drawing/2014/main" id="{FE0F4796-51C8-49EF-98D8-8B5BA57E15CE}"/>
+              </a:ext>
+            </a:extLst>
+          </p:cNvPr>
+          <p:cNvSpPr>
+            <a:spLocks noGrp="1"/>
+          </p:cNvSpPr>
+          <p:nvPr>
+            <p:ph type="title"/>
+          </p:nvPr>
+        </p:nvSpPr>
+        <p:spPr/>
+        <p:txBody>
+          <a:bodyPr/>
+          <a:lstStyle/>
+          <a:p>
+            <a:r>
+              <a:rPr lang="en-GB" dirty="0"/>
+              <a:t>Battery mux	</a:t>
+            </a:r>
+          </a:p>
+        </p:txBody>
+      </p:sp>
+      <p:sp>
+        <p:nvSpPr>
+          <p:cNvPr id="3" name="Content Placeholder 2">
+            <a:extLst>
+              <a:ext uri="{FF2B5EF4-FFF2-40B4-BE49-F238E27FC236}">
+                <a16:creationId xmlns:a16="http://schemas.microsoft.com/office/drawing/2014/main" id="{B7847DB7-EF3F-4994-B4A2-71BE0D764F4A}"/>
+              </a:ext>
+            </a:extLst>
+          </p:cNvPr>
+          <p:cNvSpPr>
+            <a:spLocks noGrp="1"/>
+          </p:cNvSpPr>
+          <p:nvPr>
+            <p:ph idx="1"/>
+          </p:nvPr>
+        </p:nvSpPr>
+        <p:spPr/>
+        <p:txBody>
+          <a:bodyPr/>
+          <a:lstStyle/>
+          <a:p>
+            <a:r>
+              <a:rPr lang="en-GB" dirty="0"/>
+              <a:t>Two large batteries</a:t>
+            </a:r>
+          </a:p>
+          <a:p>
+            <a:pPr marL="0" indent="0">
+              <a:buNone/>
+            </a:pPr>
+            <a:r>
+              <a:rPr lang="en-GB" dirty="0"/>
+              <a:t>States:</a:t>
+            </a:r>
+          </a:p>
+          <a:p>
+            <a:pPr lvl="1"/>
+            <a:r>
+              <a:rPr lang="en-GB" dirty="0"/>
+              <a:t>Charge in parallel</a:t>
+            </a:r>
+          </a:p>
+          <a:p>
+            <a:pPr lvl="1"/>
+            <a:r>
+              <a:rPr lang="en-GB" dirty="0"/>
+              <a:t>Discharge in series</a:t>
+            </a:r>
+          </a:p>
+          <a:p>
+            <a:r>
+              <a:rPr lang="en-GB" dirty="0"/>
+              <a:t>Electrically controlled path switching</a:t>
+            </a:r>
+          </a:p>
+          <a:p>
+            <a:r>
+              <a:rPr lang="en-GB" dirty="0"/>
+              <a:t>Vibration resistant</a:t>
+            </a:r>
+          </a:p>
+          <a:p>
+            <a:r>
+              <a:rPr lang="en-GB" dirty="0"/>
+              <a:t>Short resistant</a:t>
+            </a:r>
+          </a:p>
+          <a:p>
+            <a:r>
+              <a:rPr lang="en-GB" dirty="0"/>
+              <a:t>Bidirectional current flow (balanced charging)</a:t>
+            </a:r>
+          </a:p>
+          <a:p>
+            <a:endParaRPr lang="en-GB" dirty="0"/>
+          </a:p>
+        </p:txBody>
+      </p:sp>
+    </p:spTree>
+    <p:extLst>
+      <p:ext uri="{BB962C8B-B14F-4D97-AF65-F5344CB8AC3E}">
+        <p14:creationId xmlns:p14="http://schemas.microsoft.com/office/powerpoint/2010/main" val="431821034"/>
+      </p:ext>
+    </p:extLst>
+  </p:cSld>
+  <p:clrMapOvr>
+    <a:masterClrMapping/>
+  </p:clrMapOvr>
+</p:sld>
+</file>
+
+<file path=ppt/slides/slide14.xml><?xml version="1.0" encoding="utf-8"?>
+<p:sld xmlns:a="http://schemas.openxmlformats.org/drawingml/2006/main" xmlns:r="http://schemas.openxmlformats.org/officeDocument/2006/relationships" xmlns:p="http://schemas.openxmlformats.org/presentationml/2006/main">
+  <p:cSld>
+    <p:spTree>
+      <p:nvGrpSpPr>
+        <p:cNvPr id="1" name=""/>
+        <p:cNvGrpSpPr/>
+        <p:nvPr/>
+      </p:nvGrpSpPr>
+      <p:grpSpPr>
+        <a:xfrm>
+          <a:off x="0" y="0"/>
+          <a:ext cx="0" cy="0"/>
+          <a:chOff x="0" y="0"/>
+          <a:chExt cx="0" cy="0"/>
+        </a:xfrm>
+      </p:grpSpPr>
+      <p:sp>
+        <p:nvSpPr>
+          <p:cNvPr id="2" name="Title 1">
+            <a:extLst>
+              <a:ext uri="{FF2B5EF4-FFF2-40B4-BE49-F238E27FC236}">
+                <a16:creationId xmlns:a16="http://schemas.microsoft.com/office/drawing/2014/main" id="{B9ADB3C6-0180-42C7-9291-81D283C2953E}"/>
+              </a:ext>
+            </a:extLst>
+          </p:cNvPr>
+          <p:cNvSpPr>
+            <a:spLocks noGrp="1"/>
+          </p:cNvSpPr>
+          <p:nvPr>
+            <p:ph type="title"/>
+          </p:nvPr>
+        </p:nvSpPr>
+        <p:spPr/>
+        <p:txBody>
+          <a:bodyPr/>
+          <a:lstStyle/>
+          <a:p>
+            <a:r>
+              <a:rPr lang="en-GB" dirty="0"/>
+              <a:t>Switching technology</a:t>
+            </a:r>
+          </a:p>
+        </p:txBody>
+      </p:sp>
+      <p:sp>
+        <p:nvSpPr>
+          <p:cNvPr id="3" name="Content Placeholder 2">
+            <a:extLst>
+              <a:ext uri="{FF2B5EF4-FFF2-40B4-BE49-F238E27FC236}">
+                <a16:creationId xmlns:a16="http://schemas.microsoft.com/office/drawing/2014/main" id="{F3AE64F4-03B2-4673-8BDD-84CA0ABF0AC7}"/>
+              </a:ext>
+            </a:extLst>
+          </p:cNvPr>
+          <p:cNvSpPr>
+            <a:spLocks noGrp="1"/>
+          </p:cNvSpPr>
+          <p:nvPr>
+            <p:ph idx="1"/>
+          </p:nvPr>
+        </p:nvSpPr>
+        <p:spPr>
+          <a:xfrm>
+            <a:off x="838200" y="1825625"/>
+            <a:ext cx="4748868" cy="4351338"/>
+          </a:xfrm>
+        </p:spPr>
+        <p:txBody>
+          <a:bodyPr/>
+          <a:lstStyle/>
+          <a:p>
+            <a:pPr marL="0" indent="0">
+              <a:buNone/>
+            </a:pPr>
+            <a:r>
+              <a:rPr lang="en-GB" dirty="0"/>
+              <a:t>Relay:</a:t>
+            </a:r>
+          </a:p>
+          <a:p>
+            <a:r>
+              <a:rPr lang="en-GB" dirty="0"/>
+              <a:t>Mechanical switch</a:t>
+            </a:r>
+          </a:p>
+          <a:p>
+            <a:r>
+              <a:rPr lang="en-GB" dirty="0"/>
+              <a:t>Very High voltage</a:t>
+            </a:r>
+          </a:p>
+          <a:p>
+            <a:r>
+              <a:rPr lang="en-GB" dirty="0"/>
+              <a:t>Very High current</a:t>
+            </a:r>
+          </a:p>
+          <a:p>
+            <a:r>
+              <a:rPr lang="en-GB" dirty="0"/>
+              <a:t>Low standby draw</a:t>
+            </a:r>
+          </a:p>
+          <a:p>
+            <a:endParaRPr lang="en-GB" dirty="0"/>
+          </a:p>
+          <a:p>
+            <a:endParaRPr lang="en-GB" dirty="0"/>
+          </a:p>
+        </p:txBody>
+      </p:sp>
+      <p:sp>
+        <p:nvSpPr>
+          <p:cNvPr id="4" name="Content Placeholder 2">
+            <a:extLst>
+              <a:ext uri="{FF2B5EF4-FFF2-40B4-BE49-F238E27FC236}">
+                <a16:creationId xmlns:a16="http://schemas.microsoft.com/office/drawing/2014/main" id="{80FCAF3B-D795-4829-8DBE-A7553CCAA8E5}"/>
+              </a:ext>
+            </a:extLst>
+          </p:cNvPr>
+          <p:cNvSpPr txBox="1">
+            <a:spLocks/>
+          </p:cNvSpPr>
+          <p:nvPr/>
+        </p:nvSpPr>
+        <p:spPr>
+          <a:xfrm>
+            <a:off x="6292442" y="1825625"/>
+            <a:ext cx="4748868" cy="4351338"/>
+          </a:xfrm>
+          <a:prstGeom prst="rect">
+            <a:avLst/>
+          </a:prstGeom>
+        </p:spPr>
+        <p:txBody>
+          <a:bodyPr vert="horz" lIns="91440" tIns="45720" rIns="91440" bIns="45720" rtlCol="0">
+            <a:normAutofit/>
+          </a:bodyPr>
+          <a:lstStyle>
+            <a:lvl1pPr marL="228600" indent="-228600" algn="l" defTabSz="914400" rtl="0" eaLnBrk="1" latinLnBrk="0" hangingPunct="1">
+              <a:lnSpc>
+                <a:spcPct val="90000"/>
+              </a:lnSpc>
+              <a:spcBef>
+                <a:spcPts val="1000"/>
+              </a:spcBef>
+              <a:buFont typeface="Arial" panose="020B0604020202020204" pitchFamily="34" charset="0"/>
+              <a:buChar char="•"/>
+              <a:defRPr sz="2800" kern="1200">
+                <a:solidFill>
+                  <a:schemeClr val="tx1"/>
+                </a:solidFill>
+                <a:latin typeface="+mn-lt"/>
+                <a:ea typeface="+mn-ea"/>
+                <a:cs typeface="+mn-cs"/>
+              </a:defRPr>
+            </a:lvl1pPr>
+            <a:lvl2pPr marL="685800" indent="-228600" algn="l" defTabSz="914400" rtl="0" eaLnBrk="1" latinLnBrk="0" hangingPunct="1">
+              <a:lnSpc>
+                <a:spcPct val="90000"/>
+              </a:lnSpc>
+              <a:spcBef>
+                <a:spcPts val="500"/>
+              </a:spcBef>
+              <a:buFont typeface="Arial" panose="020B0604020202020204" pitchFamily="34" charset="0"/>
+              <a:buChar char="•"/>
+              <a:defRPr sz="2400" kern="1200">
+                <a:solidFill>
+                  <a:schemeClr val="tx1"/>
+                </a:solidFill>
+                <a:latin typeface="+mn-lt"/>
+                <a:ea typeface="+mn-ea"/>
+                <a:cs typeface="+mn-cs"/>
+              </a:defRPr>
+            </a:lvl2pPr>
+            <a:lvl3pPr marL="1143000" indent="-228600" algn="l" defTabSz="914400" rtl="0" eaLnBrk="1" latinLnBrk="0" hangingPunct="1">
+              <a:lnSpc>
+                <a:spcPct val="90000"/>
+              </a:lnSpc>
+              <a:spcBef>
+                <a:spcPts val="500"/>
+              </a:spcBef>
+              <a:buFont typeface="Arial" panose="020B0604020202020204" pitchFamily="34" charset="0"/>
+              <a:buChar char="•"/>
+              <a:defRPr sz="2000" kern="1200">
+                <a:solidFill>
+                  <a:schemeClr val="tx1"/>
+                </a:solidFill>
+                <a:latin typeface="+mn-lt"/>
+                <a:ea typeface="+mn-ea"/>
+                <a:cs typeface="+mn-cs"/>
+              </a:defRPr>
+            </a:lvl3pPr>
+            <a:lvl4pPr marL="1600200" indent="-228600" algn="l" defTabSz="914400" rtl="0" eaLnBrk="1" latinLnBrk="0" hangingPunct="1">
+              <a:lnSpc>
+                <a:spcPct val="90000"/>
+              </a:lnSpc>
+              <a:spcBef>
+                <a:spcPts val="500"/>
+              </a:spcBef>
+              <a:buFont typeface="Arial" panose="020B0604020202020204" pitchFamily="34" charset="0"/>
+              <a:buChar char="•"/>
+              <a:defRPr sz="1800" kern="1200">
+                <a:solidFill>
+                  <a:schemeClr val="tx1"/>
+                </a:solidFill>
+                <a:latin typeface="+mn-lt"/>
+                <a:ea typeface="+mn-ea"/>
+                <a:cs typeface="+mn-cs"/>
+              </a:defRPr>
+            </a:lvl4pPr>
+            <a:lvl5pPr marL="2057400" indent="-228600" algn="l" defTabSz="914400" rtl="0" eaLnBrk="1" latinLnBrk="0" hangingPunct="1">
+              <a:lnSpc>
+                <a:spcPct val="90000"/>
+              </a:lnSpc>
+              <a:spcBef>
+                <a:spcPts val="500"/>
+              </a:spcBef>
+              <a:buFont typeface="Arial" panose="020B0604020202020204" pitchFamily="34" charset="0"/>
+              <a:buChar char="•"/>
+              <a:defRPr sz="1800" kern="1200">
+                <a:solidFill>
+                  <a:schemeClr val="tx1"/>
+                </a:solidFill>
+                <a:latin typeface="+mn-lt"/>
+                <a:ea typeface="+mn-ea"/>
+                <a:cs typeface="+mn-cs"/>
+              </a:defRPr>
+            </a:lvl5pPr>
+            <a:lvl6pPr marL="2514600" indent="-228600" algn="l" defTabSz="914400" rtl="0" eaLnBrk="1" latinLnBrk="0" hangingPunct="1">
+              <a:lnSpc>
+                <a:spcPct val="90000"/>
+              </a:lnSpc>
+              <a:spcBef>
+                <a:spcPts val="500"/>
+              </a:spcBef>
+              <a:buFont typeface="Arial" panose="020B0604020202020204" pitchFamily="34" charset="0"/>
+              <a:buChar char="•"/>
+              <a:defRPr sz="1800" kern="1200">
+                <a:solidFill>
+                  <a:schemeClr val="tx1"/>
+                </a:solidFill>
+                <a:latin typeface="+mn-lt"/>
+                <a:ea typeface="+mn-ea"/>
+                <a:cs typeface="+mn-cs"/>
+              </a:defRPr>
+            </a:lvl6pPr>
+            <a:lvl7pPr marL="2971800" indent="-228600" algn="l" defTabSz="914400" rtl="0" eaLnBrk="1" latinLnBrk="0" hangingPunct="1">
+              <a:lnSpc>
+                <a:spcPct val="90000"/>
+              </a:lnSpc>
+              <a:spcBef>
+                <a:spcPts val="500"/>
+              </a:spcBef>
+              <a:buFont typeface="Arial" panose="020B0604020202020204" pitchFamily="34" charset="0"/>
+              <a:buChar char="•"/>
+              <a:defRPr sz="1800" kern="1200">
+                <a:solidFill>
+                  <a:schemeClr val="tx1"/>
+                </a:solidFill>
+                <a:latin typeface="+mn-lt"/>
+                <a:ea typeface="+mn-ea"/>
+                <a:cs typeface="+mn-cs"/>
+              </a:defRPr>
+            </a:lvl7pPr>
+            <a:lvl8pPr marL="3429000" indent="-228600" algn="l" defTabSz="914400" rtl="0" eaLnBrk="1" latinLnBrk="0" hangingPunct="1">
+              <a:lnSpc>
+                <a:spcPct val="90000"/>
+              </a:lnSpc>
+              <a:spcBef>
+                <a:spcPts val="500"/>
+              </a:spcBef>
+              <a:buFont typeface="Arial" panose="020B0604020202020204" pitchFamily="34" charset="0"/>
+              <a:buChar char="•"/>
+              <a:defRPr sz="1800" kern="1200">
+                <a:solidFill>
+                  <a:schemeClr val="tx1"/>
+                </a:solidFill>
+                <a:latin typeface="+mn-lt"/>
+                <a:ea typeface="+mn-ea"/>
+                <a:cs typeface="+mn-cs"/>
+              </a:defRPr>
+            </a:lvl8pPr>
+            <a:lvl9pPr marL="3886200" indent="-228600" algn="l" defTabSz="914400" rtl="0" eaLnBrk="1" latinLnBrk="0" hangingPunct="1">
+              <a:lnSpc>
+                <a:spcPct val="90000"/>
+              </a:lnSpc>
+              <a:spcBef>
+                <a:spcPts val="500"/>
+              </a:spcBef>
+              <a:buFont typeface="Arial" panose="020B0604020202020204" pitchFamily="34" charset="0"/>
+              <a:buChar char="•"/>
+              <a:defRPr sz="1800" kern="1200">
+                <a:solidFill>
+                  <a:schemeClr val="tx1"/>
+                </a:solidFill>
+                <a:latin typeface="+mn-lt"/>
+                <a:ea typeface="+mn-ea"/>
+                <a:cs typeface="+mn-cs"/>
+              </a:defRPr>
+            </a:lvl9pPr>
+          </a:lstStyle>
+          <a:p>
+            <a:pPr marL="0" indent="0">
+              <a:buNone/>
+            </a:pPr>
+            <a:r>
+              <a:rPr lang="en-GB" dirty="0"/>
+              <a:t>Bipolar power switch(BPS):</a:t>
+            </a:r>
+          </a:p>
+          <a:p>
+            <a:r>
+              <a:rPr lang="en-GB" dirty="0"/>
+              <a:t>Solid state system</a:t>
+            </a:r>
+          </a:p>
+          <a:p>
+            <a:r>
+              <a:rPr lang="en-GB" dirty="0"/>
+              <a:t>MOSFET switching</a:t>
+            </a:r>
+          </a:p>
+          <a:p>
+            <a:r>
+              <a:rPr lang="en-GB" dirty="0"/>
+              <a:t>Higher power dissipation</a:t>
+            </a:r>
+          </a:p>
+          <a:p>
+            <a:r>
+              <a:rPr lang="en-GB" dirty="0"/>
+              <a:t>Fast switching</a:t>
+            </a:r>
+          </a:p>
+        </p:txBody>
+      </p:sp>
+    </p:spTree>
+    <p:extLst>
+      <p:ext uri="{BB962C8B-B14F-4D97-AF65-F5344CB8AC3E}">
+        <p14:creationId xmlns:p14="http://schemas.microsoft.com/office/powerpoint/2010/main" val="3038464115"/>
+      </p:ext>
+    </p:extLst>
+  </p:cSld>
+  <p:clrMapOvr>
+    <a:masterClrMapping/>
+  </p:clrMapOvr>
+</p:sld>
+</file>
+
+<file path=ppt/slides/slide2.xml><?xml version="1.0" encoding="utf-8"?>
+<p:sld xmlns:a="http://schemas.openxmlformats.org/drawingml/2006/main" xmlns:r="http://schemas.openxmlformats.org/officeDocument/2006/relationships" xmlns:p="http://schemas.openxmlformats.org/presentationml/2006/main">
+  <p:cSld>
+    <p:spTree>
+      <p:nvGrpSpPr>
+        <p:cNvPr id="1" name=""/>
+        <p:cNvGrpSpPr/>
+        <p:nvPr/>
+      </p:nvGrpSpPr>
+      <p:grpSpPr>
+        <a:xfrm>
+          <a:off x="0" y="0"/>
+          <a:ext cx="0" cy="0"/>
+          <a:chOff x="0" y="0"/>
+          <a:chExt cx="0" cy="0"/>
+        </a:xfrm>
+      </p:grpSpPr>
+      <p:sp>
+        <p:nvSpPr>
+          <p:cNvPr id="2" name="Title 1">
+            <a:extLst>
+              <a:ext uri="{FF2B5EF4-FFF2-40B4-BE49-F238E27FC236}">
+                <a16:creationId xmlns:a16="http://schemas.microsoft.com/office/drawing/2014/main" id="{87F95180-E0DA-4CA2-BA61-0FC2BB0738A1}"/>
+              </a:ext>
+            </a:extLst>
+          </p:cNvPr>
+          <p:cNvSpPr>
+            <a:spLocks noGrp="1"/>
+          </p:cNvSpPr>
+          <p:nvPr>
+            <p:ph type="title"/>
+          </p:nvPr>
+        </p:nvSpPr>
+        <p:spPr/>
+        <p:txBody>
+          <a:bodyPr/>
+          <a:lstStyle/>
+          <a:p>
+            <a:r>
+              <a:rPr lang="en-GB" dirty="0"/>
+              <a:t>Into - toby</a:t>
+            </a:r>
+          </a:p>
+        </p:txBody>
+      </p:sp>
+      <p:sp>
+        <p:nvSpPr>
+          <p:cNvPr id="3" name="Content Placeholder 2">
+            <a:extLst>
+              <a:ext uri="{FF2B5EF4-FFF2-40B4-BE49-F238E27FC236}">
+                <a16:creationId xmlns:a16="http://schemas.microsoft.com/office/drawing/2014/main" id="{9F1D8DE5-1BA7-4DCC-BB90-D0359564455C}"/>
+              </a:ext>
+            </a:extLst>
+          </p:cNvPr>
+          <p:cNvSpPr>
+            <a:spLocks noGrp="1"/>
+          </p:cNvSpPr>
+          <p:nvPr>
+            <p:ph idx="1"/>
+          </p:nvPr>
+        </p:nvSpPr>
+        <p:spPr/>
+        <p:txBody>
+          <a:bodyPr/>
+          <a:lstStyle/>
+          <a:p>
+            <a:endParaRPr lang="en-GB"/>
+          </a:p>
+        </p:txBody>
+      </p:sp>
+    </p:spTree>
+    <p:extLst>
+      <p:ext uri="{BB962C8B-B14F-4D97-AF65-F5344CB8AC3E}">
+        <p14:creationId xmlns:p14="http://schemas.microsoft.com/office/powerpoint/2010/main" val="275639994"/>
+      </p:ext>
+    </p:extLst>
+  </p:cSld>
+  <p:clrMapOvr>
+    <a:masterClrMapping/>
+  </p:clrMapOvr>
+</p:sld>
+</file>
+
+<file path=ppt/slides/slide3.xml><?xml version="1.0" encoding="utf-8"?>
+<p:sld xmlns:a="http://schemas.openxmlformats.org/drawingml/2006/main" xmlns:r="http://schemas.openxmlformats.org/officeDocument/2006/relationships" xmlns:p="http://schemas.openxmlformats.org/presentationml/2006/main">
+  <p:cSld>
+    <p:spTree>
+      <p:nvGrpSpPr>
+        <p:cNvPr id="1" name=""/>
+        <p:cNvGrpSpPr/>
+        <p:nvPr/>
+      </p:nvGrpSpPr>
+      <p:grpSpPr>
+        <a:xfrm>
+          <a:off x="0" y="0"/>
+          <a:ext cx="0" cy="0"/>
+          <a:chOff x="0" y="0"/>
+          <a:chExt cx="0" cy="0"/>
+        </a:xfrm>
+      </p:grpSpPr>
+      <p:sp>
+        <p:nvSpPr>
+          <p:cNvPr id="2" name="Title 1">
+            <a:extLst>
+              <a:ext uri="{FF2B5EF4-FFF2-40B4-BE49-F238E27FC236}">
+                <a16:creationId xmlns:a16="http://schemas.microsoft.com/office/drawing/2014/main" id="{16E1419E-1881-49D7-A695-3E923D925BB6}"/>
+              </a:ext>
+            </a:extLst>
+          </p:cNvPr>
+          <p:cNvSpPr>
+            <a:spLocks noGrp="1"/>
+          </p:cNvSpPr>
+          <p:nvPr>
+            <p:ph type="title"/>
+          </p:nvPr>
+        </p:nvSpPr>
+        <p:spPr/>
+        <p:txBody>
+          <a:bodyPr/>
+          <a:lstStyle/>
+          <a:p>
+            <a:r>
+              <a:rPr lang="en-GB" dirty="0"/>
+              <a:t>BOARD - ED</a:t>
+            </a:r>
+          </a:p>
+        </p:txBody>
+      </p:sp>
+      <p:sp>
+        <p:nvSpPr>
+          <p:cNvPr id="3" name="Content Placeholder 2">
+            <a:extLst>
+              <a:ext uri="{FF2B5EF4-FFF2-40B4-BE49-F238E27FC236}">
+                <a16:creationId xmlns:a16="http://schemas.microsoft.com/office/drawing/2014/main" id="{3B1C41F3-4EF7-41FB-8FE4-436C725FB87F}"/>
+              </a:ext>
+            </a:extLst>
+          </p:cNvPr>
+          <p:cNvSpPr>
+            <a:spLocks noGrp="1"/>
+          </p:cNvSpPr>
+          <p:nvPr>
+            <p:ph idx="1"/>
+          </p:nvPr>
+        </p:nvSpPr>
+        <p:spPr/>
+        <p:txBody>
+          <a:bodyPr/>
+          <a:lstStyle/>
+          <a:p>
+            <a:endParaRPr lang="en-GB"/>
+          </a:p>
+        </p:txBody>
+      </p:sp>
+    </p:spTree>
+    <p:extLst>
+      <p:ext uri="{BB962C8B-B14F-4D97-AF65-F5344CB8AC3E}">
+        <p14:creationId xmlns:p14="http://schemas.microsoft.com/office/powerpoint/2010/main" val="1177586150"/>
+      </p:ext>
+    </p:extLst>
+  </p:cSld>
+  <p:clrMapOvr>
+    <a:masterClrMapping/>
+  </p:clrMapOvr>
+</p:sld>
+</file>
+
+<file path=ppt/slides/slide4.xml><?xml version="1.0" encoding="utf-8"?>
+<p:sld xmlns:a="http://schemas.openxmlformats.org/drawingml/2006/main" xmlns:r="http://schemas.openxmlformats.org/officeDocument/2006/relationships" xmlns:p="http://schemas.openxmlformats.org/presentationml/2006/main">
+  <p:cSld>
+    <p:spTree>
+      <p:nvGrpSpPr>
+        <p:cNvPr id="1" name=""/>
+        <p:cNvGrpSpPr/>
+        <p:nvPr/>
+      </p:nvGrpSpPr>
+      <p:grpSpPr>
+        <a:xfrm>
+          <a:off x="0" y="0"/>
+          <a:ext cx="0" cy="0"/>
+          <a:chOff x="0" y="0"/>
+          <a:chExt cx="0" cy="0"/>
+        </a:xfrm>
+      </p:grpSpPr>
+      <p:sp>
+        <p:nvSpPr>
+          <p:cNvPr id="2" name="Title 1">
+            <a:extLst>
+              <a:ext uri="{FF2B5EF4-FFF2-40B4-BE49-F238E27FC236}">
+                <a16:creationId xmlns:a16="http://schemas.microsoft.com/office/drawing/2014/main" id="{4F7200DE-032E-48FD-8334-F93B5DE71996}"/>
+              </a:ext>
+            </a:extLst>
+          </p:cNvPr>
+          <p:cNvSpPr>
+            <a:spLocks noGrp="1"/>
+          </p:cNvSpPr>
+          <p:nvPr>
+            <p:ph type="title"/>
+          </p:nvPr>
+        </p:nvSpPr>
+        <p:spPr/>
+        <p:txBody>
+          <a:bodyPr/>
+          <a:lstStyle/>
+          <a:p>
+            <a:r>
+              <a:rPr lang="en-GB" dirty="0"/>
+              <a:t>TRUCKS - TOBY</a:t>
+            </a:r>
+          </a:p>
+        </p:txBody>
+      </p:sp>
+      <p:sp>
+        <p:nvSpPr>
+          <p:cNvPr id="3" name="Content Placeholder 2">
+            <a:extLst>
+              <a:ext uri="{FF2B5EF4-FFF2-40B4-BE49-F238E27FC236}">
+                <a16:creationId xmlns:a16="http://schemas.microsoft.com/office/drawing/2014/main" id="{CE0BD0BB-3E09-46CF-8A28-1943386FEC0F}"/>
+              </a:ext>
+            </a:extLst>
+          </p:cNvPr>
+          <p:cNvSpPr>
+            <a:spLocks noGrp="1"/>
+          </p:cNvSpPr>
+          <p:nvPr>
+            <p:ph idx="1"/>
+          </p:nvPr>
+        </p:nvSpPr>
+        <p:spPr/>
+        <p:txBody>
+          <a:bodyPr/>
+          <a:lstStyle/>
+          <a:p>
+            <a:endParaRPr lang="en-GB"/>
+          </a:p>
+        </p:txBody>
+      </p:sp>
+    </p:spTree>
+    <p:extLst>
+      <p:ext uri="{BB962C8B-B14F-4D97-AF65-F5344CB8AC3E}">
+        <p14:creationId xmlns:p14="http://schemas.microsoft.com/office/powerpoint/2010/main" val="3459229785"/>
+      </p:ext>
+    </p:extLst>
+  </p:cSld>
+  <p:clrMapOvr>
+    <a:masterClrMapping/>
+  </p:clrMapOvr>
+</p:sld>
+</file>
+
+<file path=ppt/slides/slide5.xml><?xml version="1.0" encoding="utf-8"?>
+<p:sld xmlns:a="http://schemas.openxmlformats.org/drawingml/2006/main" xmlns:r="http://schemas.openxmlformats.org/officeDocument/2006/relationships" xmlns:p="http://schemas.openxmlformats.org/presentationml/2006/main">
+  <p:cSld>
+    <p:spTree>
+      <p:nvGrpSpPr>
+        <p:cNvPr id="1" name=""/>
+        <p:cNvGrpSpPr/>
+        <p:nvPr/>
+      </p:nvGrpSpPr>
+      <p:grpSpPr>
+        <a:xfrm>
+          <a:off x="0" y="0"/>
+          <a:ext cx="0" cy="0"/>
+          <a:chOff x="0" y="0"/>
+          <a:chExt cx="0" cy="0"/>
+        </a:xfrm>
+      </p:grpSpPr>
+      <p:sp>
+        <p:nvSpPr>
+          <p:cNvPr id="2" name="Title 1">
+            <a:extLst>
+              <a:ext uri="{FF2B5EF4-FFF2-40B4-BE49-F238E27FC236}">
+                <a16:creationId xmlns:a16="http://schemas.microsoft.com/office/drawing/2014/main" id="{23179417-7B3A-4B85-92FD-69E7E95D03A0}"/>
+              </a:ext>
+            </a:extLst>
+          </p:cNvPr>
+          <p:cNvSpPr>
+            <a:spLocks noGrp="1"/>
+          </p:cNvSpPr>
+          <p:nvPr>
+            <p:ph type="title"/>
+          </p:nvPr>
+        </p:nvSpPr>
+        <p:spPr/>
+        <p:txBody>
+          <a:bodyPr/>
+          <a:lstStyle/>
+          <a:p>
+            <a:r>
+              <a:rPr lang="en-GB" dirty="0"/>
+              <a:t>Wheels - HUGO</a:t>
+            </a:r>
+          </a:p>
+        </p:txBody>
+      </p:sp>
+      <p:sp>
+        <p:nvSpPr>
+          <p:cNvPr id="3" name="Content Placeholder 2">
+            <a:extLst>
+              <a:ext uri="{FF2B5EF4-FFF2-40B4-BE49-F238E27FC236}">
+                <a16:creationId xmlns:a16="http://schemas.microsoft.com/office/drawing/2014/main" id="{FBF7D434-3D6C-409F-BDDF-960525912722}"/>
+              </a:ext>
+            </a:extLst>
+          </p:cNvPr>
+          <p:cNvSpPr>
+            <a:spLocks noGrp="1"/>
+          </p:cNvSpPr>
+          <p:nvPr>
+            <p:ph idx="1"/>
+          </p:nvPr>
+        </p:nvSpPr>
+        <p:spPr/>
+        <p:txBody>
+          <a:bodyPr/>
+          <a:lstStyle/>
+          <a:p>
+            <a:endParaRPr lang="en-GB"/>
+          </a:p>
+        </p:txBody>
+      </p:sp>
+    </p:spTree>
+    <p:extLst>
+      <p:ext uri="{BB962C8B-B14F-4D97-AF65-F5344CB8AC3E}">
+        <p14:creationId xmlns:p14="http://schemas.microsoft.com/office/powerpoint/2010/main" val="2605612958"/>
+      </p:ext>
+    </p:extLst>
+  </p:cSld>
+  <p:clrMapOvr>
+    <a:masterClrMapping/>
+  </p:clrMapOvr>
+</p:sld>
+</file>
+
+<file path=ppt/slides/slide6.xml><?xml version="1.0" encoding="utf-8"?>
+<p:sld xmlns:a="http://schemas.openxmlformats.org/drawingml/2006/main" xmlns:r="http://schemas.openxmlformats.org/officeDocument/2006/relationships" xmlns:p="http://schemas.openxmlformats.org/presentationml/2006/main">
+  <p:cSld>
+    <p:spTree>
+      <p:nvGrpSpPr>
+        <p:cNvPr id="1" name=""/>
+        <p:cNvGrpSpPr/>
+        <p:nvPr/>
+      </p:nvGrpSpPr>
+      <p:grpSpPr>
+        <a:xfrm>
+          <a:off x="0" y="0"/>
+          <a:ext cx="0" cy="0"/>
+          <a:chOff x="0" y="0"/>
+          <a:chExt cx="0" cy="0"/>
+        </a:xfrm>
+      </p:grpSpPr>
+      <p:sp>
+        <p:nvSpPr>
+          <p:cNvPr id="2" name="Title 1">
+            <a:extLst>
+              <a:ext uri="{FF2B5EF4-FFF2-40B4-BE49-F238E27FC236}">
+                <a16:creationId xmlns:a16="http://schemas.microsoft.com/office/drawing/2014/main" id="{5A5E529B-DFE6-4189-8C9D-83663736760C}"/>
+              </a:ext>
+            </a:extLst>
+          </p:cNvPr>
+          <p:cNvSpPr>
+            <a:spLocks noGrp="1"/>
+          </p:cNvSpPr>
+          <p:nvPr>
+            <p:ph type="title"/>
+          </p:nvPr>
+        </p:nvSpPr>
+        <p:spPr/>
+        <p:txBody>
+          <a:bodyPr/>
+          <a:lstStyle/>
+          <a:p>
+            <a:r>
+              <a:rPr lang="en-GB" dirty="0"/>
+              <a:t>Battery – SAM</a:t>
+            </a:r>
+          </a:p>
+        </p:txBody>
+      </p:sp>
+      <p:sp>
+        <p:nvSpPr>
+          <p:cNvPr id="3" name="Content Placeholder 2">
+            <a:extLst>
+              <a:ext uri="{FF2B5EF4-FFF2-40B4-BE49-F238E27FC236}">
+                <a16:creationId xmlns:a16="http://schemas.microsoft.com/office/drawing/2014/main" id="{1F2F5A3D-399D-42E6-B9E6-1FB08B63D0D2}"/>
+              </a:ext>
+            </a:extLst>
+          </p:cNvPr>
+          <p:cNvSpPr>
+            <a:spLocks noGrp="1"/>
+          </p:cNvSpPr>
+          <p:nvPr>
+            <p:ph idx="1"/>
+          </p:nvPr>
+        </p:nvSpPr>
+        <p:spPr/>
+        <p:txBody>
+          <a:bodyPr/>
+          <a:lstStyle/>
+          <a:p>
+            <a:endParaRPr lang="en-GB" dirty="0"/>
+          </a:p>
+        </p:txBody>
+      </p:sp>
+    </p:spTree>
+    <p:extLst>
+      <p:ext uri="{BB962C8B-B14F-4D97-AF65-F5344CB8AC3E}">
+        <p14:creationId xmlns:p14="http://schemas.microsoft.com/office/powerpoint/2010/main" val="693304522"/>
+      </p:ext>
+    </p:extLst>
+  </p:cSld>
+  <p:clrMapOvr>
+    <a:masterClrMapping/>
+  </p:clrMapOvr>
+</p:sld>
+</file>
+
 <file path=ppt/slides/slide7.xml><?xml version="1.0" encoding="utf-8"?>
 <p:sld xmlns:a="http://schemas.openxmlformats.org/drawingml/2006/main" xmlns:r="http://schemas.openxmlformats.org/officeDocument/2006/relationships" xmlns:p="http://schemas.openxmlformats.org/presentationml/2006/main">
   <p:cSld>
@@ -4331,7 +4852,7 @@
           <p:cNvPr id="2" name="Title 1">
             <a:extLst>
               <a:ext uri="{FF2B5EF4-FFF2-40B4-BE49-F238E27FC236}">
-                <a16:creationId xmlns:a16="http://schemas.microsoft.com/office/drawing/2014/main" id="{FE0F4796-51C8-49EF-98D8-8B5BA57E15CE}"/>
+                <a16:creationId xmlns:a16="http://schemas.microsoft.com/office/drawing/2014/main" id="{0E5B7271-3723-49ED-A2DA-31D2BA410DEE}"/>
               </a:ext>
             </a:extLst>
           </p:cNvPr>
@@ -4347,7 +4868,10 @@
           <a:bodyPr/>
           <a:lstStyle/>
           <a:p>
-            <a:endParaRPr lang="en-GB"/>
+            <a:r>
+              <a:rPr lang="en-GB" dirty="0"/>
+              <a:t>Range specification</a:t>
+            </a:r>
           </a:p>
         </p:txBody>
       </p:sp>
@@ -4356,7 +4880,7 @@
           <p:cNvPr id="3" name="Content Placeholder 2">
             <a:extLst>
               <a:ext uri="{FF2B5EF4-FFF2-40B4-BE49-F238E27FC236}">
-                <a16:creationId xmlns:a16="http://schemas.microsoft.com/office/drawing/2014/main" id="{B7847DB7-EF3F-4994-B4A2-71BE0D764F4A}"/>
+                <a16:creationId xmlns:a16="http://schemas.microsoft.com/office/drawing/2014/main" id="{AA7F8B67-E3A2-43A1-80EB-39942E5EBA00}"/>
               </a:ext>
             </a:extLst>
           </p:cNvPr>
@@ -4369,17 +4893,404 @@
         </p:nvSpPr>
         <p:spPr/>
         <p:txBody>
-          <a:bodyPr/>
-          <a:lstStyle/>
-          <a:p>
-            <a:endParaRPr lang="en-GB"/>
+          <a:bodyPr>
+            <a:normAutofit lnSpcReduction="10000"/>
+          </a:bodyPr>
+          <a:lstStyle/>
+          <a:p>
+            <a:pPr marL="0" indent="0">
+              <a:buNone/>
+            </a:pPr>
+            <a:r>
+              <a:rPr lang="en-GB" sz="3200" dirty="0"/>
+              <a:t>Specification</a:t>
+            </a:r>
+          </a:p>
+          <a:p>
+            <a:r>
+              <a:rPr lang="en-GB" sz="3200" dirty="0"/>
+              <a:t>Charge every week (7 days)</a:t>
+            </a:r>
+          </a:p>
+          <a:p>
+            <a:r>
+              <a:rPr lang="en-GB" sz="3200" dirty="0"/>
+              <a:t>Days being used:5 days (commute)</a:t>
+            </a:r>
+          </a:p>
+          <a:p>
+            <a:r>
+              <a:rPr lang="en-GB" sz="3200" dirty="0"/>
+              <a:t>Distance each day: 3km </a:t>
+            </a:r>
+          </a:p>
+          <a:p>
+            <a:r>
+              <a:rPr lang="en-GB" sz="3200" dirty="0"/>
+              <a:t>Estimated vertical distance: 80m</a:t>
+            </a:r>
+          </a:p>
+          <a:p>
+            <a:pPr marL="0" indent="0">
+              <a:buNone/>
+            </a:pPr>
+            <a:endParaRPr lang="en-GB" sz="3200" dirty="0"/>
+          </a:p>
+          <a:p>
+            <a:pPr marL="0" indent="0">
+              <a:buNone/>
+            </a:pPr>
+            <a:r>
+              <a:rPr lang="en-GB" sz="3200" dirty="0"/>
+              <a:t>This means:</a:t>
+            </a:r>
+          </a:p>
+          <a:p>
+            <a:r>
+              <a:rPr lang="en-GB" sz="3200" dirty="0"/>
+              <a:t>Estimated Watt-hours per mile: 10Wh/mile</a:t>
+            </a:r>
+          </a:p>
+          <a:p>
+            <a:endParaRPr lang="en-GB" sz="3200" dirty="0"/>
+          </a:p>
+          <a:p>
+            <a:endParaRPr lang="en-GB" sz="3200" dirty="0"/>
           </a:p>
         </p:txBody>
       </p:sp>
     </p:spTree>
     <p:extLst>
       <p:ext uri="{BB962C8B-B14F-4D97-AF65-F5344CB8AC3E}">
-        <p14:creationId xmlns:p14="http://schemas.microsoft.com/office/powerpoint/2010/main" val="431821034"/>
+        <p14:creationId xmlns:p14="http://schemas.microsoft.com/office/powerpoint/2010/main" val="2271532738"/>
+      </p:ext>
+    </p:extLst>
+  </p:cSld>
+  <p:clrMapOvr>
+    <a:masterClrMapping/>
+  </p:clrMapOvr>
+</p:sld>
+</file>
+
+<file path=ppt/slides/slide8.xml><?xml version="1.0" encoding="utf-8"?>
+<p:sld xmlns:a="http://schemas.openxmlformats.org/drawingml/2006/main" xmlns:r="http://schemas.openxmlformats.org/officeDocument/2006/relationships" xmlns:p="http://schemas.openxmlformats.org/presentationml/2006/main">
+  <p:cSld>
+    <p:spTree>
+      <p:nvGrpSpPr>
+        <p:cNvPr id="1" name=""/>
+        <p:cNvGrpSpPr/>
+        <p:nvPr/>
+      </p:nvGrpSpPr>
+      <p:grpSpPr>
+        <a:xfrm>
+          <a:off x="0" y="0"/>
+          <a:ext cx="0" cy="0"/>
+          <a:chOff x="0" y="0"/>
+          <a:chExt cx="0" cy="0"/>
+        </a:xfrm>
+      </p:grpSpPr>
+      <p:sp>
+        <p:nvSpPr>
+          <p:cNvPr id="2" name="Title 1">
+            <a:extLst>
+              <a:ext uri="{FF2B5EF4-FFF2-40B4-BE49-F238E27FC236}">
+                <a16:creationId xmlns:a16="http://schemas.microsoft.com/office/drawing/2014/main" id="{673FF3E4-F450-44AE-80B0-AF79C50B5E10}"/>
+              </a:ext>
+            </a:extLst>
+          </p:cNvPr>
+          <p:cNvSpPr>
+            <a:spLocks noGrp="1"/>
+          </p:cNvSpPr>
+          <p:nvPr>
+            <p:ph type="title"/>
+          </p:nvPr>
+        </p:nvSpPr>
+        <p:spPr/>
+        <p:txBody>
+          <a:bodyPr/>
+          <a:lstStyle/>
+          <a:p>
+            <a:r>
+              <a:rPr lang="en-GB" dirty="0"/>
+              <a:t>Battery specification</a:t>
+            </a:r>
+          </a:p>
+        </p:txBody>
+      </p:sp>
+      <p:sp>
+        <p:nvSpPr>
+          <p:cNvPr id="3" name="Content Placeholder 2">
+            <a:extLst>
+              <a:ext uri="{FF2B5EF4-FFF2-40B4-BE49-F238E27FC236}">
+                <a16:creationId xmlns:a16="http://schemas.microsoft.com/office/drawing/2014/main" id="{D125B466-8300-4B74-A1BA-905EF3820914}"/>
+              </a:ext>
+            </a:extLst>
+          </p:cNvPr>
+          <p:cNvSpPr>
+            <a:spLocks noGrp="1"/>
+          </p:cNvSpPr>
+          <p:nvPr>
+            <p:ph idx="1"/>
+          </p:nvPr>
+        </p:nvSpPr>
+        <p:spPr/>
+        <p:txBody>
+          <a:bodyPr>
+            <a:normAutofit/>
+          </a:bodyPr>
+          <a:lstStyle/>
+          <a:p>
+            <a:pPr marL="0" indent="0">
+              <a:buNone/>
+            </a:pPr>
+            <a:r>
+              <a:rPr lang="en-GB" dirty="0"/>
+              <a:t>Lithium polymer chemistry</a:t>
+            </a:r>
+          </a:p>
+          <a:p>
+            <a:r>
+              <a:rPr lang="en-GB" dirty="0"/>
+              <a:t>Watt-hour capacity: 180Wh</a:t>
+            </a:r>
+          </a:p>
+          <a:p>
+            <a:r>
+              <a:rPr lang="en-GB" dirty="0"/>
+              <a:t>Supply voltage:22.2V</a:t>
+            </a:r>
+          </a:p>
+          <a:p>
+            <a:r>
+              <a:rPr lang="en-GB" dirty="0"/>
+              <a:t>Amp-hour capacity: 8100Ah</a:t>
+            </a:r>
+          </a:p>
+          <a:p>
+            <a:r>
+              <a:rPr lang="en-GB" dirty="0"/>
+              <a:t>Mass: 1.7kg</a:t>
+            </a:r>
+          </a:p>
+          <a:p>
+            <a:endParaRPr lang="en-GB" dirty="0"/>
+          </a:p>
+          <a:p>
+            <a:r>
+              <a:rPr lang="en-GB" dirty="0"/>
+              <a:t>Supply voltage: 50v</a:t>
+            </a:r>
+          </a:p>
+          <a:p>
+            <a:r>
+              <a:rPr lang="en-GB" dirty="0"/>
+              <a:t>2 batteries in parallel required</a:t>
+            </a:r>
+          </a:p>
+        </p:txBody>
+      </p:sp>
+      <p:pic>
+        <p:nvPicPr>
+          <p:cNvPr id="5" name="Picture 4" descr="A screenshot of a cell phone&#10;&#10;Description automatically generated">
+            <a:extLst>
+              <a:ext uri="{FF2B5EF4-FFF2-40B4-BE49-F238E27FC236}">
+                <a16:creationId xmlns:a16="http://schemas.microsoft.com/office/drawing/2014/main" id="{FD6F27ED-35B8-40F0-B2E0-07E4EFF2036D}"/>
+              </a:ext>
+            </a:extLst>
+          </p:cNvPr>
+          <p:cNvPicPr>
+            <a:picLocks noChangeAspect="1"/>
+          </p:cNvPicPr>
+          <p:nvPr/>
+        </p:nvPicPr>
+        <p:blipFill>
+          <a:blip r:embed="rId2">
+            <a:extLst>
+              <a:ext uri="{28A0092B-C50C-407E-A947-70E740481C1C}">
+                <a14:useLocalDpi xmlns:a14="http://schemas.microsoft.com/office/drawing/2010/main" val="0"/>
+              </a:ext>
+            </a:extLst>
+          </a:blip>
+          <a:stretch>
+            <a:fillRect/>
+          </a:stretch>
+        </p:blipFill>
+        <p:spPr>
+          <a:xfrm>
+            <a:off x="6096000" y="928328"/>
+            <a:ext cx="5907531" cy="3759338"/>
+          </a:xfrm>
+          <a:prstGeom prst="rect">
+            <a:avLst/>
+          </a:prstGeom>
+        </p:spPr>
+      </p:pic>
+    </p:spTree>
+    <p:extLst>
+      <p:ext uri="{BB962C8B-B14F-4D97-AF65-F5344CB8AC3E}">
+        <p14:creationId xmlns:p14="http://schemas.microsoft.com/office/powerpoint/2010/main" val="1175002974"/>
+      </p:ext>
+    </p:extLst>
+  </p:cSld>
+  <p:clrMapOvr>
+    <a:masterClrMapping/>
+  </p:clrMapOvr>
+</p:sld>
+</file>
+
+<file path=ppt/slides/slide9.xml><?xml version="1.0" encoding="utf-8"?>
+<p:sld xmlns:a="http://schemas.openxmlformats.org/drawingml/2006/main" xmlns:r="http://schemas.openxmlformats.org/officeDocument/2006/relationships" xmlns:p="http://schemas.openxmlformats.org/presentationml/2006/main">
+  <p:cSld>
+    <p:spTree>
+      <p:nvGrpSpPr>
+        <p:cNvPr id="1" name=""/>
+        <p:cNvGrpSpPr/>
+        <p:nvPr/>
+      </p:nvGrpSpPr>
+      <p:grpSpPr>
+        <a:xfrm>
+          <a:off x="0" y="0"/>
+          <a:ext cx="0" cy="0"/>
+          <a:chOff x="0" y="0"/>
+          <a:chExt cx="0" cy="0"/>
+        </a:xfrm>
+      </p:grpSpPr>
+      <p:sp>
+        <p:nvSpPr>
+          <p:cNvPr id="2" name="Title 1">
+            <a:extLst>
+              <a:ext uri="{FF2B5EF4-FFF2-40B4-BE49-F238E27FC236}">
+                <a16:creationId xmlns:a16="http://schemas.microsoft.com/office/drawing/2014/main" id="{37129C13-237D-4521-81BA-D7F55AD5B585}"/>
+              </a:ext>
+            </a:extLst>
+          </p:cNvPr>
+          <p:cNvSpPr>
+            <a:spLocks noGrp="1"/>
+          </p:cNvSpPr>
+          <p:nvPr>
+            <p:ph type="title"/>
+          </p:nvPr>
+        </p:nvSpPr>
+        <p:spPr/>
+        <p:txBody>
+          <a:bodyPr/>
+          <a:lstStyle/>
+          <a:p>
+            <a:r>
+              <a:rPr lang="en-GB" dirty="0"/>
+              <a:t>Battery charging</a:t>
+            </a:r>
+          </a:p>
+        </p:txBody>
+      </p:sp>
+      <p:sp>
+        <p:nvSpPr>
+          <p:cNvPr id="3" name="Content Placeholder 2">
+            <a:extLst>
+              <a:ext uri="{FF2B5EF4-FFF2-40B4-BE49-F238E27FC236}">
+                <a16:creationId xmlns:a16="http://schemas.microsoft.com/office/drawing/2014/main" id="{67871035-2C42-42A1-86FD-846461ADF945}"/>
+              </a:ext>
+            </a:extLst>
+          </p:cNvPr>
+          <p:cNvSpPr>
+            <a:spLocks noGrp="1"/>
+          </p:cNvSpPr>
+          <p:nvPr>
+            <p:ph idx="1"/>
+          </p:nvPr>
+        </p:nvSpPr>
+        <p:spPr/>
+        <p:txBody>
+          <a:bodyPr/>
+          <a:lstStyle/>
+          <a:p>
+            <a:r>
+              <a:rPr lang="en-GB" dirty="0"/>
+              <a:t>Lithium polymer can be dangerous:</a:t>
+            </a:r>
+          </a:p>
+          <a:p>
+            <a:pPr lvl="1"/>
+            <a:r>
+              <a:rPr lang="en-GB" dirty="0"/>
+              <a:t>Overcharging</a:t>
+            </a:r>
+          </a:p>
+          <a:p>
+            <a:pPr lvl="1"/>
+            <a:r>
+              <a:rPr lang="en-GB" dirty="0"/>
+              <a:t>Unbalanced charging</a:t>
+            </a:r>
+          </a:p>
+          <a:p>
+            <a:r>
+              <a:rPr lang="en-GB" dirty="0"/>
+              <a:t>Use an off the shelf solution</a:t>
+            </a:r>
+          </a:p>
+          <a:p>
+            <a:r>
+              <a:rPr lang="en-GB" dirty="0"/>
+              <a:t>Use hobby/RC charger</a:t>
+            </a:r>
+          </a:p>
+          <a:p>
+            <a:endParaRPr lang="en-GB" dirty="0"/>
+          </a:p>
+          <a:p>
+            <a:r>
+              <a:rPr lang="en-GB" dirty="0"/>
+              <a:t>Charge batteries in parallel</a:t>
+            </a:r>
+          </a:p>
+          <a:p>
+            <a:r>
+              <a:rPr lang="en-GB" dirty="0"/>
+              <a:t>System to switch between series and parallel</a:t>
+            </a:r>
+          </a:p>
+          <a:p>
+            <a:endParaRPr lang="en-GB" dirty="0"/>
+          </a:p>
+          <a:p>
+            <a:endParaRPr lang="en-GB" dirty="0"/>
+          </a:p>
+        </p:txBody>
+      </p:sp>
+      <p:pic>
+        <p:nvPicPr>
+          <p:cNvPr id="6" name="Picture 5">
+            <a:extLst>
+              <a:ext uri="{FF2B5EF4-FFF2-40B4-BE49-F238E27FC236}">
+                <a16:creationId xmlns:a16="http://schemas.microsoft.com/office/drawing/2014/main" id="{38978E23-184E-43D4-927F-322B80564812}"/>
+              </a:ext>
+            </a:extLst>
+          </p:cNvPr>
+          <p:cNvPicPr>
+            <a:picLocks noChangeAspect="1"/>
+          </p:cNvPicPr>
+          <p:nvPr/>
+        </p:nvPicPr>
+        <p:blipFill rotWithShape="1">
+          <a:blip r:embed="rId2"/>
+          <a:srcRect l="1375"/>
+          <a:stretch/>
+        </p:blipFill>
+        <p:spPr>
+          <a:xfrm>
+            <a:off x="7055194" y="681037"/>
+            <a:ext cx="4525780" cy="3465767"/>
+          </a:xfrm>
+          <a:prstGeom prst="rect">
+            <a:avLst/>
+          </a:prstGeom>
+        </p:spPr>
+      </p:pic>
+    </p:spTree>
+    <p:extLst>
+      <p:ext uri="{BB962C8B-B14F-4D97-AF65-F5344CB8AC3E}">
+        <p14:creationId xmlns:p14="http://schemas.microsoft.com/office/powerpoint/2010/main" val="2721647380"/>
       </p:ext>
     </p:extLst>
   </p:cSld>

</xml_diff>

<commit_message>
Removed example presentation from tracking
</commit_message>
<xml_diff>
--- a/PRESENTATION/Battery.pptx
+++ b/PRESENTATION/Battery.pptx
@@ -6,12 +6,19 @@
   </p:sldMasterIdLst>
   <p:sldIdLst>
     <p:sldId id="256" r:id="rId2"/>
-    <p:sldId id="257" r:id="rId3"/>
-    <p:sldId id="258" r:id="rId4"/>
-    <p:sldId id="259" r:id="rId5"/>
-    <p:sldId id="260" r:id="rId6"/>
-    <p:sldId id="261" r:id="rId7"/>
-    <p:sldId id="262" r:id="rId8"/>
+    <p:sldId id="268" r:id="rId3"/>
+    <p:sldId id="266" r:id="rId4"/>
+    <p:sldId id="267" r:id="rId5"/>
+    <p:sldId id="269" r:id="rId6"/>
+    <p:sldId id="264" r:id="rId7"/>
+    <p:sldId id="257" r:id="rId8"/>
+    <p:sldId id="258" r:id="rId9"/>
+    <p:sldId id="260" r:id="rId10"/>
+    <p:sldId id="265" r:id="rId11"/>
+    <p:sldId id="259" r:id="rId12"/>
+    <p:sldId id="261" r:id="rId13"/>
+    <p:sldId id="262" r:id="rId14"/>
+    <p:sldId id="263" r:id="rId15"/>
   </p:sldIdLst>
   <p:sldSz cx="12192000" cy="6858000"/>
   <p:notesSz cx="6858000" cy="9144000"/>
@@ -267,7 +274,7 @@
           <a:p>
             <a:fld id="{B027D84C-C8DF-44EC-8F26-E09A80CBF3F2}" type="datetimeFigureOut">
               <a:rPr lang="en-GB" smtClean="0"/>
-              <a:t>11/02/2020</a:t>
+              <a:t>13/02/2020</a:t>
             </a:fld>
             <a:endParaRPr lang="en-GB"/>
           </a:p>
@@ -467,7 +474,7 @@
           <a:p>
             <a:fld id="{B027D84C-C8DF-44EC-8F26-E09A80CBF3F2}" type="datetimeFigureOut">
               <a:rPr lang="en-GB" smtClean="0"/>
-              <a:t>11/02/2020</a:t>
+              <a:t>13/02/2020</a:t>
             </a:fld>
             <a:endParaRPr lang="en-GB"/>
           </a:p>
@@ -677,7 +684,7 @@
           <a:p>
             <a:fld id="{B027D84C-C8DF-44EC-8F26-E09A80CBF3F2}" type="datetimeFigureOut">
               <a:rPr lang="en-GB" smtClean="0"/>
-              <a:t>11/02/2020</a:t>
+              <a:t>13/02/2020</a:t>
             </a:fld>
             <a:endParaRPr lang="en-GB"/>
           </a:p>
@@ -877,7 +884,7 @@
           <a:p>
             <a:fld id="{B027D84C-C8DF-44EC-8F26-E09A80CBF3F2}" type="datetimeFigureOut">
               <a:rPr lang="en-GB" smtClean="0"/>
-              <a:t>11/02/2020</a:t>
+              <a:t>13/02/2020</a:t>
             </a:fld>
             <a:endParaRPr lang="en-GB"/>
           </a:p>
@@ -1153,7 +1160,7 @@
           <a:p>
             <a:fld id="{B027D84C-C8DF-44EC-8F26-E09A80CBF3F2}" type="datetimeFigureOut">
               <a:rPr lang="en-GB" smtClean="0"/>
-              <a:t>11/02/2020</a:t>
+              <a:t>13/02/2020</a:t>
             </a:fld>
             <a:endParaRPr lang="en-GB"/>
           </a:p>
@@ -1421,7 +1428,7 @@
           <a:p>
             <a:fld id="{B027D84C-C8DF-44EC-8F26-E09A80CBF3F2}" type="datetimeFigureOut">
               <a:rPr lang="en-GB" smtClean="0"/>
-              <a:t>11/02/2020</a:t>
+              <a:t>13/02/2020</a:t>
             </a:fld>
             <a:endParaRPr lang="en-GB"/>
           </a:p>
@@ -1836,7 +1843,7 @@
           <a:p>
             <a:fld id="{B027D84C-C8DF-44EC-8F26-E09A80CBF3F2}" type="datetimeFigureOut">
               <a:rPr lang="en-GB" smtClean="0"/>
-              <a:t>11/02/2020</a:t>
+              <a:t>13/02/2020</a:t>
             </a:fld>
             <a:endParaRPr lang="en-GB"/>
           </a:p>
@@ -1978,7 +1985,7 @@
           <a:p>
             <a:fld id="{B027D84C-C8DF-44EC-8F26-E09A80CBF3F2}" type="datetimeFigureOut">
               <a:rPr lang="en-GB" smtClean="0"/>
-              <a:t>11/02/2020</a:t>
+              <a:t>13/02/2020</a:t>
             </a:fld>
             <a:endParaRPr lang="en-GB"/>
           </a:p>
@@ -2091,7 +2098,7 @@
           <a:p>
             <a:fld id="{B027D84C-C8DF-44EC-8F26-E09A80CBF3F2}" type="datetimeFigureOut">
               <a:rPr lang="en-GB" smtClean="0"/>
-              <a:t>11/02/2020</a:t>
+              <a:t>13/02/2020</a:t>
             </a:fld>
             <a:endParaRPr lang="en-GB"/>
           </a:p>
@@ -2404,7 +2411,7 @@
           <a:p>
             <a:fld id="{B027D84C-C8DF-44EC-8F26-E09A80CBF3F2}" type="datetimeFigureOut">
               <a:rPr lang="en-GB" smtClean="0"/>
-              <a:t>11/02/2020</a:t>
+              <a:t>13/02/2020</a:t>
             </a:fld>
             <a:endParaRPr lang="en-GB"/>
           </a:p>
@@ -2693,7 +2700,7 @@
           <a:p>
             <a:fld id="{B027D84C-C8DF-44EC-8F26-E09A80CBF3F2}" type="datetimeFigureOut">
               <a:rPr lang="en-GB" smtClean="0"/>
-              <a:t>11/02/2020</a:t>
+              <a:t>13/02/2020</a:t>
             </a:fld>
             <a:endParaRPr lang="en-GB"/>
           </a:p>
@@ -2936,7 +2943,7 @@
           <a:p>
             <a:fld id="{B027D84C-C8DF-44EC-8F26-E09A80CBF3F2}" type="datetimeFigureOut">
               <a:rPr lang="en-GB" smtClean="0"/>
-              <a:t>11/02/2020</a:t>
+              <a:t>13/02/2020</a:t>
             </a:fld>
             <a:endParaRPr lang="en-GB"/>
           </a:p>
@@ -3452,7 +3459,7 @@
 </p:sld>
 </file>
 
-<file path=ppt/slides/slide2.xml><?xml version="1.0" encoding="utf-8"?>
+<file path=ppt/slides/slide10.xml><?xml version="1.0" encoding="utf-8"?>
 <p:sld xmlns:a="http://schemas.openxmlformats.org/drawingml/2006/main" xmlns:r="http://schemas.openxmlformats.org/officeDocument/2006/relationships" xmlns:p="http://schemas.openxmlformats.org/presentationml/2006/main">
   <p:cSld>
     <p:spTree>
@@ -3474,7 +3481,7 @@
           <p:cNvPr id="2" name="Title 1">
             <a:extLst>
               <a:ext uri="{FF2B5EF4-FFF2-40B4-BE49-F238E27FC236}">
-                <a16:creationId xmlns:a16="http://schemas.microsoft.com/office/drawing/2014/main" id="{0E5B7271-3723-49ED-A2DA-31D2BA410DEE}"/>
+                <a16:creationId xmlns:a16="http://schemas.microsoft.com/office/drawing/2014/main" id="{760EF5DD-47B4-4904-B175-B38B60653E55}"/>
               </a:ext>
             </a:extLst>
           </p:cNvPr>
@@ -3492,7 +3499,7 @@
           <a:p>
             <a:r>
               <a:rPr lang="en-GB" dirty="0"/>
-              <a:t>Range specification</a:t>
+              <a:t>Battery control overview</a:t>
             </a:r>
           </a:p>
         </p:txBody>
@@ -3502,7 +3509,7 @@
           <p:cNvPr id="3" name="Content Placeholder 2">
             <a:extLst>
               <a:ext uri="{FF2B5EF4-FFF2-40B4-BE49-F238E27FC236}">
-                <a16:creationId xmlns:a16="http://schemas.microsoft.com/office/drawing/2014/main" id="{AA7F8B67-E3A2-43A1-80EB-39942E5EBA00}"/>
+                <a16:creationId xmlns:a16="http://schemas.microsoft.com/office/drawing/2014/main" id="{3F6515A1-B1E3-4AE3-B640-E7A426887C39}"/>
               </a:ext>
             </a:extLst>
           </p:cNvPr>
@@ -3515,76 +3522,17 @@
         </p:nvSpPr>
         <p:spPr/>
         <p:txBody>
-          <a:bodyPr>
-            <a:normAutofit lnSpcReduction="10000"/>
-          </a:bodyPr>
-          <a:lstStyle/>
-          <a:p>
-            <a:pPr marL="0" indent="0">
-              <a:buNone/>
-            </a:pPr>
-            <a:r>
-              <a:rPr lang="en-GB" sz="3200" dirty="0"/>
-              <a:t>Specification</a:t>
-            </a:r>
-          </a:p>
-          <a:p>
-            <a:r>
-              <a:rPr lang="en-GB" sz="3200" dirty="0"/>
-              <a:t>Charge every week (7 days)</a:t>
-            </a:r>
-          </a:p>
-          <a:p>
-            <a:r>
-              <a:rPr lang="en-GB" sz="3200" dirty="0"/>
-              <a:t>Days being used:5 days (commute)</a:t>
-            </a:r>
-          </a:p>
-          <a:p>
-            <a:r>
-              <a:rPr lang="en-GB" sz="3200" dirty="0"/>
-              <a:t>Distance each day: 3km </a:t>
-            </a:r>
-          </a:p>
-          <a:p>
-            <a:r>
-              <a:rPr lang="en-GB" sz="3200" dirty="0"/>
-              <a:t>Estimated vertical distance: 80m</a:t>
-            </a:r>
-          </a:p>
-          <a:p>
-            <a:pPr marL="0" indent="0">
-              <a:buNone/>
-            </a:pPr>
-            <a:endParaRPr lang="en-GB" sz="3200" dirty="0"/>
-          </a:p>
-          <a:p>
-            <a:pPr marL="0" indent="0">
-              <a:buNone/>
-            </a:pPr>
-            <a:r>
-              <a:rPr lang="en-GB" sz="3200" dirty="0"/>
-              <a:t>This means:</a:t>
-            </a:r>
-          </a:p>
-          <a:p>
-            <a:r>
-              <a:rPr lang="en-GB" sz="3200" dirty="0"/>
-              <a:t>Estimated Watt-hours per mile: 10Wh/mile</a:t>
-            </a:r>
-          </a:p>
-          <a:p>
-            <a:endParaRPr lang="en-GB" sz="3200" dirty="0"/>
-          </a:p>
-          <a:p>
-            <a:endParaRPr lang="en-GB" sz="3200" dirty="0"/>
+          <a:bodyPr/>
+          <a:lstStyle/>
+          <a:p>
+            <a:endParaRPr lang="en-GB"/>
           </a:p>
         </p:txBody>
       </p:sp>
     </p:spTree>
     <p:extLst>
       <p:ext uri="{BB962C8B-B14F-4D97-AF65-F5344CB8AC3E}">
-        <p14:creationId xmlns:p14="http://schemas.microsoft.com/office/powerpoint/2010/main" val="2271532738"/>
+        <p14:creationId xmlns:p14="http://schemas.microsoft.com/office/powerpoint/2010/main" val="2397045919"/>
       </p:ext>
     </p:extLst>
   </p:cSld>
@@ -3594,7 +3542,7 @@
 </p:sld>
 </file>
 
-<file path=ppt/slides/slide3.xml><?xml version="1.0" encoding="utf-8"?>
+<file path=ppt/slides/slide11.xml><?xml version="1.0" encoding="utf-8"?>
 <p:sld xmlns:a="http://schemas.openxmlformats.org/drawingml/2006/main" xmlns:r="http://schemas.openxmlformats.org/officeDocument/2006/relationships" xmlns:p="http://schemas.openxmlformats.org/presentationml/2006/main">
   <p:cSld>
     <p:spTree>
@@ -3616,172 +3564,6 @@
           <p:cNvPr id="2" name="Title 1">
             <a:extLst>
               <a:ext uri="{FF2B5EF4-FFF2-40B4-BE49-F238E27FC236}">
-                <a16:creationId xmlns:a16="http://schemas.microsoft.com/office/drawing/2014/main" id="{673FF3E4-F450-44AE-80B0-AF79C50B5E10}"/>
-              </a:ext>
-            </a:extLst>
-          </p:cNvPr>
-          <p:cNvSpPr>
-            <a:spLocks noGrp="1"/>
-          </p:cNvSpPr>
-          <p:nvPr>
-            <p:ph type="title"/>
-          </p:nvPr>
-        </p:nvSpPr>
-        <p:spPr/>
-        <p:txBody>
-          <a:bodyPr/>
-          <a:lstStyle/>
-          <a:p>
-            <a:r>
-              <a:rPr lang="en-GB" dirty="0"/>
-              <a:t>Battery specification</a:t>
-            </a:r>
-          </a:p>
-        </p:txBody>
-      </p:sp>
-      <p:sp>
-        <p:nvSpPr>
-          <p:cNvPr id="3" name="Content Placeholder 2">
-            <a:extLst>
-              <a:ext uri="{FF2B5EF4-FFF2-40B4-BE49-F238E27FC236}">
-                <a16:creationId xmlns:a16="http://schemas.microsoft.com/office/drawing/2014/main" id="{D125B466-8300-4B74-A1BA-905EF3820914}"/>
-              </a:ext>
-            </a:extLst>
-          </p:cNvPr>
-          <p:cNvSpPr>
-            <a:spLocks noGrp="1"/>
-          </p:cNvSpPr>
-          <p:nvPr>
-            <p:ph idx="1"/>
-          </p:nvPr>
-        </p:nvSpPr>
-        <p:spPr/>
-        <p:txBody>
-          <a:bodyPr>
-            <a:normAutofit/>
-          </a:bodyPr>
-          <a:lstStyle/>
-          <a:p>
-            <a:pPr marL="0" indent="0">
-              <a:buNone/>
-            </a:pPr>
-            <a:r>
-              <a:rPr lang="en-GB" dirty="0"/>
-              <a:t>Lithium polymer chemistry</a:t>
-            </a:r>
-          </a:p>
-          <a:p>
-            <a:r>
-              <a:rPr lang="en-GB" dirty="0"/>
-              <a:t>Watt-hour capacity: 180Wh</a:t>
-            </a:r>
-          </a:p>
-          <a:p>
-            <a:r>
-              <a:rPr lang="en-GB" dirty="0"/>
-              <a:t>Supply voltage:22.2V</a:t>
-            </a:r>
-          </a:p>
-          <a:p>
-            <a:r>
-              <a:rPr lang="en-GB" dirty="0"/>
-              <a:t>Amp-hour capacity: 8100Ah</a:t>
-            </a:r>
-          </a:p>
-          <a:p>
-            <a:r>
-              <a:rPr lang="en-GB" dirty="0"/>
-              <a:t>Mass: 1.7kg</a:t>
-            </a:r>
-          </a:p>
-          <a:p>
-            <a:endParaRPr lang="en-GB" dirty="0"/>
-          </a:p>
-          <a:p>
-            <a:r>
-              <a:rPr lang="en-GB" dirty="0"/>
-              <a:t>Supply voltage: 50v</a:t>
-            </a:r>
-          </a:p>
-          <a:p>
-            <a:r>
-              <a:rPr lang="en-GB" dirty="0"/>
-              <a:t>2 batteries in parallel required</a:t>
-            </a:r>
-          </a:p>
-        </p:txBody>
-      </p:sp>
-      <p:pic>
-        <p:nvPicPr>
-          <p:cNvPr id="5" name="Picture 4" descr="A screenshot of a cell phone&#10;&#10;Description automatically generated">
-            <a:extLst>
-              <a:ext uri="{FF2B5EF4-FFF2-40B4-BE49-F238E27FC236}">
-                <a16:creationId xmlns:a16="http://schemas.microsoft.com/office/drawing/2014/main" id="{FD6F27ED-35B8-40F0-B2E0-07E4EFF2036D}"/>
-              </a:ext>
-            </a:extLst>
-          </p:cNvPr>
-          <p:cNvPicPr>
-            <a:picLocks noChangeAspect="1"/>
-          </p:cNvPicPr>
-          <p:nvPr/>
-        </p:nvPicPr>
-        <p:blipFill>
-          <a:blip r:embed="rId2">
-            <a:extLst>
-              <a:ext uri="{28A0092B-C50C-407E-A947-70E740481C1C}">
-                <a14:useLocalDpi xmlns:a14="http://schemas.microsoft.com/office/drawing/2010/main" val="0"/>
-              </a:ext>
-            </a:extLst>
-          </a:blip>
-          <a:stretch>
-            <a:fillRect/>
-          </a:stretch>
-        </p:blipFill>
-        <p:spPr>
-          <a:xfrm>
-            <a:off x="6096000" y="928328"/>
-            <a:ext cx="5907531" cy="3759338"/>
-          </a:xfrm>
-          <a:prstGeom prst="rect">
-            <a:avLst/>
-          </a:prstGeom>
-        </p:spPr>
-      </p:pic>
-    </p:spTree>
-    <p:extLst>
-      <p:ext uri="{BB962C8B-B14F-4D97-AF65-F5344CB8AC3E}">
-        <p14:creationId xmlns:p14="http://schemas.microsoft.com/office/powerpoint/2010/main" val="1175002974"/>
-      </p:ext>
-    </p:extLst>
-  </p:cSld>
-  <p:clrMapOvr>
-    <a:masterClrMapping/>
-  </p:clrMapOvr>
-</p:sld>
-</file>
-
-<file path=ppt/slides/slide4.xml><?xml version="1.0" encoding="utf-8"?>
-<p:sld xmlns:a="http://schemas.openxmlformats.org/drawingml/2006/main" xmlns:r="http://schemas.openxmlformats.org/officeDocument/2006/relationships" xmlns:p="http://schemas.openxmlformats.org/presentationml/2006/main">
-  <p:cSld>
-    <p:spTree>
-      <p:nvGrpSpPr>
-        <p:cNvPr id="1" name=""/>
-        <p:cNvGrpSpPr/>
-        <p:nvPr/>
-      </p:nvGrpSpPr>
-      <p:grpSpPr>
-        <a:xfrm>
-          <a:off x="0" y="0"/>
-          <a:ext cx="0" cy="0"/>
-          <a:chOff x="0" y="0"/>
-          <a:chExt cx="0" cy="0"/>
-        </a:xfrm>
-      </p:grpSpPr>
-      <p:sp>
-        <p:nvSpPr>
-          <p:cNvPr id="2" name="Title 1">
-            <a:extLst>
-              <a:ext uri="{FF2B5EF4-FFF2-40B4-BE49-F238E27FC236}">
                 <a16:creationId xmlns:a16="http://schemas.microsoft.com/office/drawing/2014/main" id="{AB06405B-CD38-4321-A24A-67621C4E3700}"/>
               </a:ext>
             </a:extLst>
@@ -3805,8 +3587,8 @@
           </a:p>
         </p:txBody>
       </p:sp>
-      <mc:AlternateContent xmlns:mc="http://schemas.openxmlformats.org/markup-compatibility/2006">
-        <mc:Choice xmlns:a14="http://schemas.microsoft.com/office/drawing/2010/main" Requires="a14">
+      <mc:AlternateContent xmlns:mc="http://schemas.openxmlformats.org/markup-compatibility/2006" xmlns:a14="http://schemas.microsoft.com/office/drawing/2010/main">
+        <mc:Choice Requires="a14">
           <p:sp>
             <p:nvSpPr>
               <p:cNvPr id="3" name="Content Placeholder 2">
@@ -3930,7 +3712,7 @@
             </p:txBody>
           </p:sp>
         </mc:Choice>
-        <mc:Fallback>
+        <mc:Fallback xmlns="">
           <p:sp>
             <p:nvSpPr>
               <p:cNvPr id="3" name="Content Placeholder 2">
@@ -4013,169 +3795,7 @@
 </p:sld>
 </file>
 
-<file path=ppt/slides/slide5.xml><?xml version="1.0" encoding="utf-8"?>
-<p:sld xmlns:a="http://schemas.openxmlformats.org/drawingml/2006/main" xmlns:r="http://schemas.openxmlformats.org/officeDocument/2006/relationships" xmlns:p="http://schemas.openxmlformats.org/presentationml/2006/main">
-  <p:cSld>
-    <p:spTree>
-      <p:nvGrpSpPr>
-        <p:cNvPr id="1" name=""/>
-        <p:cNvGrpSpPr/>
-        <p:nvPr/>
-      </p:nvGrpSpPr>
-      <p:grpSpPr>
-        <a:xfrm>
-          <a:off x="0" y="0"/>
-          <a:ext cx="0" cy="0"/>
-          <a:chOff x="0" y="0"/>
-          <a:chExt cx="0" cy="0"/>
-        </a:xfrm>
-      </p:grpSpPr>
-      <p:sp>
-        <p:nvSpPr>
-          <p:cNvPr id="2" name="Title 1">
-            <a:extLst>
-              <a:ext uri="{FF2B5EF4-FFF2-40B4-BE49-F238E27FC236}">
-                <a16:creationId xmlns:a16="http://schemas.microsoft.com/office/drawing/2014/main" id="{37129C13-237D-4521-81BA-D7F55AD5B585}"/>
-              </a:ext>
-            </a:extLst>
-          </p:cNvPr>
-          <p:cNvSpPr>
-            <a:spLocks noGrp="1"/>
-          </p:cNvSpPr>
-          <p:nvPr>
-            <p:ph type="title"/>
-          </p:nvPr>
-        </p:nvSpPr>
-        <p:spPr/>
-        <p:txBody>
-          <a:bodyPr/>
-          <a:lstStyle/>
-          <a:p>
-            <a:r>
-              <a:rPr lang="en-GB" dirty="0"/>
-              <a:t>Battery charging</a:t>
-            </a:r>
-          </a:p>
-        </p:txBody>
-      </p:sp>
-      <p:sp>
-        <p:nvSpPr>
-          <p:cNvPr id="3" name="Content Placeholder 2">
-            <a:extLst>
-              <a:ext uri="{FF2B5EF4-FFF2-40B4-BE49-F238E27FC236}">
-                <a16:creationId xmlns:a16="http://schemas.microsoft.com/office/drawing/2014/main" id="{67871035-2C42-42A1-86FD-846461ADF945}"/>
-              </a:ext>
-            </a:extLst>
-          </p:cNvPr>
-          <p:cNvSpPr>
-            <a:spLocks noGrp="1"/>
-          </p:cNvSpPr>
-          <p:nvPr>
-            <p:ph idx="1"/>
-          </p:nvPr>
-        </p:nvSpPr>
-        <p:spPr/>
-        <p:txBody>
-          <a:bodyPr/>
-          <a:lstStyle/>
-          <a:p>
-            <a:r>
-              <a:rPr lang="en-GB" dirty="0"/>
-              <a:t>Lithium polymer can be dangerous:</a:t>
-            </a:r>
-          </a:p>
-          <a:p>
-            <a:pPr lvl="1"/>
-            <a:r>
-              <a:rPr lang="en-GB" dirty="0"/>
-              <a:t>Overcharging</a:t>
-            </a:r>
-          </a:p>
-          <a:p>
-            <a:pPr lvl="1"/>
-            <a:r>
-              <a:rPr lang="en-GB" dirty="0"/>
-              <a:t>Unbalanced charging</a:t>
-            </a:r>
-          </a:p>
-          <a:p>
-            <a:r>
-              <a:rPr lang="en-GB" dirty="0"/>
-              <a:t>Use an off the shelf solution</a:t>
-            </a:r>
-          </a:p>
-          <a:p>
-            <a:r>
-              <a:rPr lang="en-GB" dirty="0"/>
-              <a:t>Use hobby/RC charger</a:t>
-            </a:r>
-          </a:p>
-          <a:p>
-            <a:r>
-              <a:rPr lang="en-GB" dirty="0"/>
-              <a:t>Charge batteries in parallel</a:t>
-            </a:r>
-          </a:p>
-          <a:p>
-            <a:endParaRPr lang="en-GB" dirty="0"/>
-          </a:p>
-          <a:p>
-            <a:r>
-              <a:rPr lang="en-GB" dirty="0"/>
-              <a:t>Battery isolated from charger by MOSFET mux</a:t>
-            </a:r>
-          </a:p>
-          <a:p>
-            <a:endParaRPr lang="en-GB" dirty="0"/>
-          </a:p>
-          <a:p>
-            <a:endParaRPr lang="en-GB" dirty="0"/>
-          </a:p>
-        </p:txBody>
-      </p:sp>
-      <p:pic>
-        <p:nvPicPr>
-          <p:cNvPr id="6" name="Picture 5">
-            <a:extLst>
-              <a:ext uri="{FF2B5EF4-FFF2-40B4-BE49-F238E27FC236}">
-                <a16:creationId xmlns:a16="http://schemas.microsoft.com/office/drawing/2014/main" id="{38978E23-184E-43D4-927F-322B80564812}"/>
-              </a:ext>
-            </a:extLst>
-          </p:cNvPr>
-          <p:cNvPicPr>
-            <a:picLocks noChangeAspect="1"/>
-          </p:cNvPicPr>
-          <p:nvPr/>
-        </p:nvPicPr>
-        <p:blipFill rotWithShape="1">
-          <a:blip r:embed="rId2"/>
-          <a:srcRect l="1375"/>
-          <a:stretch/>
-        </p:blipFill>
-        <p:spPr>
-          <a:xfrm>
-            <a:off x="7055194" y="681037"/>
-            <a:ext cx="4525780" cy="3465767"/>
-          </a:xfrm>
-          <a:prstGeom prst="rect">
-            <a:avLst/>
-          </a:prstGeom>
-        </p:spPr>
-      </p:pic>
-    </p:spTree>
-    <p:extLst>
-      <p:ext uri="{BB962C8B-B14F-4D97-AF65-F5344CB8AC3E}">
-        <p14:creationId xmlns:p14="http://schemas.microsoft.com/office/powerpoint/2010/main" val="2721647380"/>
-      </p:ext>
-    </p:extLst>
-  </p:cSld>
-  <p:clrMapOvr>
-    <a:masterClrMapping/>
-  </p:clrMapOvr>
-</p:sld>
-</file>
-
-<file path=ppt/slides/slide6.xml><?xml version="1.0" encoding="utf-8"?>
+<file path=ppt/slides/slide12.xml><?xml version="1.0" encoding="utf-8"?>
 <p:sld xmlns:a="http://schemas.openxmlformats.org/drawingml/2006/main" xmlns:r="http://schemas.openxmlformats.org/officeDocument/2006/relationships" xmlns:p="http://schemas.openxmlformats.org/presentationml/2006/main">
   <p:cSld>
     <p:spTree>
@@ -4309,6 +3929,907 @@
 </p:sld>
 </file>
 
+<file path=ppt/slides/slide13.xml><?xml version="1.0" encoding="utf-8"?>
+<p:sld xmlns:a="http://schemas.openxmlformats.org/drawingml/2006/main" xmlns:r="http://schemas.openxmlformats.org/officeDocument/2006/relationships" xmlns:p="http://schemas.openxmlformats.org/presentationml/2006/main">
+  <p:cSld>
+    <p:spTree>
+      <p:nvGrpSpPr>
+        <p:cNvPr id="1" name=""/>
+        <p:cNvGrpSpPr/>
+        <p:nvPr/>
+      </p:nvGrpSpPr>
+      <p:grpSpPr>
+        <a:xfrm>
+          <a:off x="0" y="0"/>
+          <a:ext cx="0" cy="0"/>
+          <a:chOff x="0" y="0"/>
+          <a:chExt cx="0" cy="0"/>
+        </a:xfrm>
+      </p:grpSpPr>
+      <p:sp>
+        <p:nvSpPr>
+          <p:cNvPr id="2" name="Title 1">
+            <a:extLst>
+              <a:ext uri="{FF2B5EF4-FFF2-40B4-BE49-F238E27FC236}">
+                <a16:creationId xmlns:a16="http://schemas.microsoft.com/office/drawing/2014/main" id="{FE0F4796-51C8-49EF-98D8-8B5BA57E15CE}"/>
+              </a:ext>
+            </a:extLst>
+          </p:cNvPr>
+          <p:cNvSpPr>
+            <a:spLocks noGrp="1"/>
+          </p:cNvSpPr>
+          <p:nvPr>
+            <p:ph type="title"/>
+          </p:nvPr>
+        </p:nvSpPr>
+        <p:spPr/>
+        <p:txBody>
+          <a:bodyPr/>
+          <a:lstStyle/>
+          <a:p>
+            <a:r>
+              <a:rPr lang="en-GB" dirty="0"/>
+              <a:t>Battery mux	</a:t>
+            </a:r>
+          </a:p>
+        </p:txBody>
+      </p:sp>
+      <p:sp>
+        <p:nvSpPr>
+          <p:cNvPr id="3" name="Content Placeholder 2">
+            <a:extLst>
+              <a:ext uri="{FF2B5EF4-FFF2-40B4-BE49-F238E27FC236}">
+                <a16:creationId xmlns:a16="http://schemas.microsoft.com/office/drawing/2014/main" id="{B7847DB7-EF3F-4994-B4A2-71BE0D764F4A}"/>
+              </a:ext>
+            </a:extLst>
+          </p:cNvPr>
+          <p:cNvSpPr>
+            <a:spLocks noGrp="1"/>
+          </p:cNvSpPr>
+          <p:nvPr>
+            <p:ph idx="1"/>
+          </p:nvPr>
+        </p:nvSpPr>
+        <p:spPr/>
+        <p:txBody>
+          <a:bodyPr/>
+          <a:lstStyle/>
+          <a:p>
+            <a:r>
+              <a:rPr lang="en-GB" dirty="0"/>
+              <a:t>Two large batteries</a:t>
+            </a:r>
+          </a:p>
+          <a:p>
+            <a:pPr marL="0" indent="0">
+              <a:buNone/>
+            </a:pPr>
+            <a:r>
+              <a:rPr lang="en-GB" dirty="0"/>
+              <a:t>States:</a:t>
+            </a:r>
+          </a:p>
+          <a:p>
+            <a:pPr lvl="1"/>
+            <a:r>
+              <a:rPr lang="en-GB" dirty="0"/>
+              <a:t>Charge in parallel</a:t>
+            </a:r>
+          </a:p>
+          <a:p>
+            <a:pPr lvl="1"/>
+            <a:r>
+              <a:rPr lang="en-GB" dirty="0"/>
+              <a:t>Discharge in series</a:t>
+            </a:r>
+          </a:p>
+          <a:p>
+            <a:r>
+              <a:rPr lang="en-GB" dirty="0"/>
+              <a:t>Electrically controlled path switching</a:t>
+            </a:r>
+          </a:p>
+          <a:p>
+            <a:r>
+              <a:rPr lang="en-GB" dirty="0"/>
+              <a:t>Vibration resistant</a:t>
+            </a:r>
+          </a:p>
+          <a:p>
+            <a:r>
+              <a:rPr lang="en-GB" dirty="0"/>
+              <a:t>Short resistant</a:t>
+            </a:r>
+          </a:p>
+          <a:p>
+            <a:r>
+              <a:rPr lang="en-GB" dirty="0"/>
+              <a:t>Bidirectional current flow (balanced charging)</a:t>
+            </a:r>
+          </a:p>
+          <a:p>
+            <a:endParaRPr lang="en-GB" dirty="0"/>
+          </a:p>
+        </p:txBody>
+      </p:sp>
+    </p:spTree>
+    <p:extLst>
+      <p:ext uri="{BB962C8B-B14F-4D97-AF65-F5344CB8AC3E}">
+        <p14:creationId xmlns:p14="http://schemas.microsoft.com/office/powerpoint/2010/main" val="431821034"/>
+      </p:ext>
+    </p:extLst>
+  </p:cSld>
+  <p:clrMapOvr>
+    <a:masterClrMapping/>
+  </p:clrMapOvr>
+</p:sld>
+</file>
+
+<file path=ppt/slides/slide14.xml><?xml version="1.0" encoding="utf-8"?>
+<p:sld xmlns:a="http://schemas.openxmlformats.org/drawingml/2006/main" xmlns:r="http://schemas.openxmlformats.org/officeDocument/2006/relationships" xmlns:p="http://schemas.openxmlformats.org/presentationml/2006/main">
+  <p:cSld>
+    <p:spTree>
+      <p:nvGrpSpPr>
+        <p:cNvPr id="1" name=""/>
+        <p:cNvGrpSpPr/>
+        <p:nvPr/>
+      </p:nvGrpSpPr>
+      <p:grpSpPr>
+        <a:xfrm>
+          <a:off x="0" y="0"/>
+          <a:ext cx="0" cy="0"/>
+          <a:chOff x="0" y="0"/>
+          <a:chExt cx="0" cy="0"/>
+        </a:xfrm>
+      </p:grpSpPr>
+      <p:sp>
+        <p:nvSpPr>
+          <p:cNvPr id="2" name="Title 1">
+            <a:extLst>
+              <a:ext uri="{FF2B5EF4-FFF2-40B4-BE49-F238E27FC236}">
+                <a16:creationId xmlns:a16="http://schemas.microsoft.com/office/drawing/2014/main" id="{B9ADB3C6-0180-42C7-9291-81D283C2953E}"/>
+              </a:ext>
+            </a:extLst>
+          </p:cNvPr>
+          <p:cNvSpPr>
+            <a:spLocks noGrp="1"/>
+          </p:cNvSpPr>
+          <p:nvPr>
+            <p:ph type="title"/>
+          </p:nvPr>
+        </p:nvSpPr>
+        <p:spPr/>
+        <p:txBody>
+          <a:bodyPr/>
+          <a:lstStyle/>
+          <a:p>
+            <a:r>
+              <a:rPr lang="en-GB" dirty="0"/>
+              <a:t>Switching technology</a:t>
+            </a:r>
+          </a:p>
+        </p:txBody>
+      </p:sp>
+      <p:sp>
+        <p:nvSpPr>
+          <p:cNvPr id="3" name="Content Placeholder 2">
+            <a:extLst>
+              <a:ext uri="{FF2B5EF4-FFF2-40B4-BE49-F238E27FC236}">
+                <a16:creationId xmlns:a16="http://schemas.microsoft.com/office/drawing/2014/main" id="{F3AE64F4-03B2-4673-8BDD-84CA0ABF0AC7}"/>
+              </a:ext>
+            </a:extLst>
+          </p:cNvPr>
+          <p:cNvSpPr>
+            <a:spLocks noGrp="1"/>
+          </p:cNvSpPr>
+          <p:nvPr>
+            <p:ph idx="1"/>
+          </p:nvPr>
+        </p:nvSpPr>
+        <p:spPr>
+          <a:xfrm>
+            <a:off x="838200" y="1825625"/>
+            <a:ext cx="4748868" cy="4351338"/>
+          </a:xfrm>
+        </p:spPr>
+        <p:txBody>
+          <a:bodyPr/>
+          <a:lstStyle/>
+          <a:p>
+            <a:pPr marL="0" indent="0">
+              <a:buNone/>
+            </a:pPr>
+            <a:r>
+              <a:rPr lang="en-GB" dirty="0"/>
+              <a:t>Relay:</a:t>
+            </a:r>
+          </a:p>
+          <a:p>
+            <a:r>
+              <a:rPr lang="en-GB" dirty="0"/>
+              <a:t>Mechanical switch</a:t>
+            </a:r>
+          </a:p>
+          <a:p>
+            <a:r>
+              <a:rPr lang="en-GB" dirty="0"/>
+              <a:t>Very High voltage</a:t>
+            </a:r>
+          </a:p>
+          <a:p>
+            <a:r>
+              <a:rPr lang="en-GB" dirty="0"/>
+              <a:t>Very High current</a:t>
+            </a:r>
+          </a:p>
+          <a:p>
+            <a:r>
+              <a:rPr lang="en-GB" dirty="0"/>
+              <a:t>Low standby draw</a:t>
+            </a:r>
+          </a:p>
+          <a:p>
+            <a:endParaRPr lang="en-GB" dirty="0"/>
+          </a:p>
+          <a:p>
+            <a:endParaRPr lang="en-GB" dirty="0"/>
+          </a:p>
+        </p:txBody>
+      </p:sp>
+      <p:sp>
+        <p:nvSpPr>
+          <p:cNvPr id="4" name="Content Placeholder 2">
+            <a:extLst>
+              <a:ext uri="{FF2B5EF4-FFF2-40B4-BE49-F238E27FC236}">
+                <a16:creationId xmlns:a16="http://schemas.microsoft.com/office/drawing/2014/main" id="{80FCAF3B-D795-4829-8DBE-A7553CCAA8E5}"/>
+              </a:ext>
+            </a:extLst>
+          </p:cNvPr>
+          <p:cNvSpPr txBox="1">
+            <a:spLocks/>
+          </p:cNvSpPr>
+          <p:nvPr/>
+        </p:nvSpPr>
+        <p:spPr>
+          <a:xfrm>
+            <a:off x="6292442" y="1825625"/>
+            <a:ext cx="4748868" cy="4351338"/>
+          </a:xfrm>
+          <a:prstGeom prst="rect">
+            <a:avLst/>
+          </a:prstGeom>
+        </p:spPr>
+        <p:txBody>
+          <a:bodyPr vert="horz" lIns="91440" tIns="45720" rIns="91440" bIns="45720" rtlCol="0">
+            <a:normAutofit/>
+          </a:bodyPr>
+          <a:lstStyle>
+            <a:lvl1pPr marL="228600" indent="-228600" algn="l" defTabSz="914400" rtl="0" eaLnBrk="1" latinLnBrk="0" hangingPunct="1">
+              <a:lnSpc>
+                <a:spcPct val="90000"/>
+              </a:lnSpc>
+              <a:spcBef>
+                <a:spcPts val="1000"/>
+              </a:spcBef>
+              <a:buFont typeface="Arial" panose="020B0604020202020204" pitchFamily="34" charset="0"/>
+              <a:buChar char="•"/>
+              <a:defRPr sz="2800" kern="1200">
+                <a:solidFill>
+                  <a:schemeClr val="tx1"/>
+                </a:solidFill>
+                <a:latin typeface="+mn-lt"/>
+                <a:ea typeface="+mn-ea"/>
+                <a:cs typeface="+mn-cs"/>
+              </a:defRPr>
+            </a:lvl1pPr>
+            <a:lvl2pPr marL="685800" indent="-228600" algn="l" defTabSz="914400" rtl="0" eaLnBrk="1" latinLnBrk="0" hangingPunct="1">
+              <a:lnSpc>
+                <a:spcPct val="90000"/>
+              </a:lnSpc>
+              <a:spcBef>
+                <a:spcPts val="500"/>
+              </a:spcBef>
+              <a:buFont typeface="Arial" panose="020B0604020202020204" pitchFamily="34" charset="0"/>
+              <a:buChar char="•"/>
+              <a:defRPr sz="2400" kern="1200">
+                <a:solidFill>
+                  <a:schemeClr val="tx1"/>
+                </a:solidFill>
+                <a:latin typeface="+mn-lt"/>
+                <a:ea typeface="+mn-ea"/>
+                <a:cs typeface="+mn-cs"/>
+              </a:defRPr>
+            </a:lvl2pPr>
+            <a:lvl3pPr marL="1143000" indent="-228600" algn="l" defTabSz="914400" rtl="0" eaLnBrk="1" latinLnBrk="0" hangingPunct="1">
+              <a:lnSpc>
+                <a:spcPct val="90000"/>
+              </a:lnSpc>
+              <a:spcBef>
+                <a:spcPts val="500"/>
+              </a:spcBef>
+              <a:buFont typeface="Arial" panose="020B0604020202020204" pitchFamily="34" charset="0"/>
+              <a:buChar char="•"/>
+              <a:defRPr sz="2000" kern="1200">
+                <a:solidFill>
+                  <a:schemeClr val="tx1"/>
+                </a:solidFill>
+                <a:latin typeface="+mn-lt"/>
+                <a:ea typeface="+mn-ea"/>
+                <a:cs typeface="+mn-cs"/>
+              </a:defRPr>
+            </a:lvl3pPr>
+            <a:lvl4pPr marL="1600200" indent="-228600" algn="l" defTabSz="914400" rtl="0" eaLnBrk="1" latinLnBrk="0" hangingPunct="1">
+              <a:lnSpc>
+                <a:spcPct val="90000"/>
+              </a:lnSpc>
+              <a:spcBef>
+                <a:spcPts val="500"/>
+              </a:spcBef>
+              <a:buFont typeface="Arial" panose="020B0604020202020204" pitchFamily="34" charset="0"/>
+              <a:buChar char="•"/>
+              <a:defRPr sz="1800" kern="1200">
+                <a:solidFill>
+                  <a:schemeClr val="tx1"/>
+                </a:solidFill>
+                <a:latin typeface="+mn-lt"/>
+                <a:ea typeface="+mn-ea"/>
+                <a:cs typeface="+mn-cs"/>
+              </a:defRPr>
+            </a:lvl4pPr>
+            <a:lvl5pPr marL="2057400" indent="-228600" algn="l" defTabSz="914400" rtl="0" eaLnBrk="1" latinLnBrk="0" hangingPunct="1">
+              <a:lnSpc>
+                <a:spcPct val="90000"/>
+              </a:lnSpc>
+              <a:spcBef>
+                <a:spcPts val="500"/>
+              </a:spcBef>
+              <a:buFont typeface="Arial" panose="020B0604020202020204" pitchFamily="34" charset="0"/>
+              <a:buChar char="•"/>
+              <a:defRPr sz="1800" kern="1200">
+                <a:solidFill>
+                  <a:schemeClr val="tx1"/>
+                </a:solidFill>
+                <a:latin typeface="+mn-lt"/>
+                <a:ea typeface="+mn-ea"/>
+                <a:cs typeface="+mn-cs"/>
+              </a:defRPr>
+            </a:lvl5pPr>
+            <a:lvl6pPr marL="2514600" indent="-228600" algn="l" defTabSz="914400" rtl="0" eaLnBrk="1" latinLnBrk="0" hangingPunct="1">
+              <a:lnSpc>
+                <a:spcPct val="90000"/>
+              </a:lnSpc>
+              <a:spcBef>
+                <a:spcPts val="500"/>
+              </a:spcBef>
+              <a:buFont typeface="Arial" panose="020B0604020202020204" pitchFamily="34" charset="0"/>
+              <a:buChar char="•"/>
+              <a:defRPr sz="1800" kern="1200">
+                <a:solidFill>
+                  <a:schemeClr val="tx1"/>
+                </a:solidFill>
+                <a:latin typeface="+mn-lt"/>
+                <a:ea typeface="+mn-ea"/>
+                <a:cs typeface="+mn-cs"/>
+              </a:defRPr>
+            </a:lvl6pPr>
+            <a:lvl7pPr marL="2971800" indent="-228600" algn="l" defTabSz="914400" rtl="0" eaLnBrk="1" latinLnBrk="0" hangingPunct="1">
+              <a:lnSpc>
+                <a:spcPct val="90000"/>
+              </a:lnSpc>
+              <a:spcBef>
+                <a:spcPts val="500"/>
+              </a:spcBef>
+              <a:buFont typeface="Arial" panose="020B0604020202020204" pitchFamily="34" charset="0"/>
+              <a:buChar char="•"/>
+              <a:defRPr sz="1800" kern="1200">
+                <a:solidFill>
+                  <a:schemeClr val="tx1"/>
+                </a:solidFill>
+                <a:latin typeface="+mn-lt"/>
+                <a:ea typeface="+mn-ea"/>
+                <a:cs typeface="+mn-cs"/>
+              </a:defRPr>
+            </a:lvl7pPr>
+            <a:lvl8pPr marL="3429000" indent="-228600" algn="l" defTabSz="914400" rtl="0" eaLnBrk="1" latinLnBrk="0" hangingPunct="1">
+              <a:lnSpc>
+                <a:spcPct val="90000"/>
+              </a:lnSpc>
+              <a:spcBef>
+                <a:spcPts val="500"/>
+              </a:spcBef>
+              <a:buFont typeface="Arial" panose="020B0604020202020204" pitchFamily="34" charset="0"/>
+              <a:buChar char="•"/>
+              <a:defRPr sz="1800" kern="1200">
+                <a:solidFill>
+                  <a:schemeClr val="tx1"/>
+                </a:solidFill>
+                <a:latin typeface="+mn-lt"/>
+                <a:ea typeface="+mn-ea"/>
+                <a:cs typeface="+mn-cs"/>
+              </a:defRPr>
+            </a:lvl8pPr>
+            <a:lvl9pPr marL="3886200" indent="-228600" algn="l" defTabSz="914400" rtl="0" eaLnBrk="1" latinLnBrk="0" hangingPunct="1">
+              <a:lnSpc>
+                <a:spcPct val="90000"/>
+              </a:lnSpc>
+              <a:spcBef>
+                <a:spcPts val="500"/>
+              </a:spcBef>
+              <a:buFont typeface="Arial" panose="020B0604020202020204" pitchFamily="34" charset="0"/>
+              <a:buChar char="•"/>
+              <a:defRPr sz="1800" kern="1200">
+                <a:solidFill>
+                  <a:schemeClr val="tx1"/>
+                </a:solidFill>
+                <a:latin typeface="+mn-lt"/>
+                <a:ea typeface="+mn-ea"/>
+                <a:cs typeface="+mn-cs"/>
+              </a:defRPr>
+            </a:lvl9pPr>
+          </a:lstStyle>
+          <a:p>
+            <a:pPr marL="0" indent="0">
+              <a:buNone/>
+            </a:pPr>
+            <a:r>
+              <a:rPr lang="en-GB" dirty="0"/>
+              <a:t>Bipolar power switch(BPS):</a:t>
+            </a:r>
+          </a:p>
+          <a:p>
+            <a:r>
+              <a:rPr lang="en-GB" dirty="0"/>
+              <a:t>Solid state system</a:t>
+            </a:r>
+          </a:p>
+          <a:p>
+            <a:r>
+              <a:rPr lang="en-GB" dirty="0"/>
+              <a:t>MOSFET switching</a:t>
+            </a:r>
+          </a:p>
+          <a:p>
+            <a:r>
+              <a:rPr lang="en-GB" dirty="0"/>
+              <a:t>Higher power dissipation</a:t>
+            </a:r>
+          </a:p>
+          <a:p>
+            <a:r>
+              <a:rPr lang="en-GB" dirty="0"/>
+              <a:t>Fast switching</a:t>
+            </a:r>
+          </a:p>
+        </p:txBody>
+      </p:sp>
+    </p:spTree>
+    <p:extLst>
+      <p:ext uri="{BB962C8B-B14F-4D97-AF65-F5344CB8AC3E}">
+        <p14:creationId xmlns:p14="http://schemas.microsoft.com/office/powerpoint/2010/main" val="3038464115"/>
+      </p:ext>
+    </p:extLst>
+  </p:cSld>
+  <p:clrMapOvr>
+    <a:masterClrMapping/>
+  </p:clrMapOvr>
+</p:sld>
+</file>
+
+<file path=ppt/slides/slide2.xml><?xml version="1.0" encoding="utf-8"?>
+<p:sld xmlns:a="http://schemas.openxmlformats.org/drawingml/2006/main" xmlns:r="http://schemas.openxmlformats.org/officeDocument/2006/relationships" xmlns:p="http://schemas.openxmlformats.org/presentationml/2006/main">
+  <p:cSld>
+    <p:spTree>
+      <p:nvGrpSpPr>
+        <p:cNvPr id="1" name=""/>
+        <p:cNvGrpSpPr/>
+        <p:nvPr/>
+      </p:nvGrpSpPr>
+      <p:grpSpPr>
+        <a:xfrm>
+          <a:off x="0" y="0"/>
+          <a:ext cx="0" cy="0"/>
+          <a:chOff x="0" y="0"/>
+          <a:chExt cx="0" cy="0"/>
+        </a:xfrm>
+      </p:grpSpPr>
+      <p:sp>
+        <p:nvSpPr>
+          <p:cNvPr id="2" name="Title 1">
+            <a:extLst>
+              <a:ext uri="{FF2B5EF4-FFF2-40B4-BE49-F238E27FC236}">
+                <a16:creationId xmlns:a16="http://schemas.microsoft.com/office/drawing/2014/main" id="{87F95180-E0DA-4CA2-BA61-0FC2BB0738A1}"/>
+              </a:ext>
+            </a:extLst>
+          </p:cNvPr>
+          <p:cNvSpPr>
+            <a:spLocks noGrp="1"/>
+          </p:cNvSpPr>
+          <p:nvPr>
+            <p:ph type="title"/>
+          </p:nvPr>
+        </p:nvSpPr>
+        <p:spPr/>
+        <p:txBody>
+          <a:bodyPr/>
+          <a:lstStyle/>
+          <a:p>
+            <a:r>
+              <a:rPr lang="en-GB" dirty="0"/>
+              <a:t>Into - toby</a:t>
+            </a:r>
+          </a:p>
+        </p:txBody>
+      </p:sp>
+      <p:sp>
+        <p:nvSpPr>
+          <p:cNvPr id="3" name="Content Placeholder 2">
+            <a:extLst>
+              <a:ext uri="{FF2B5EF4-FFF2-40B4-BE49-F238E27FC236}">
+                <a16:creationId xmlns:a16="http://schemas.microsoft.com/office/drawing/2014/main" id="{9F1D8DE5-1BA7-4DCC-BB90-D0359564455C}"/>
+              </a:ext>
+            </a:extLst>
+          </p:cNvPr>
+          <p:cNvSpPr>
+            <a:spLocks noGrp="1"/>
+          </p:cNvSpPr>
+          <p:nvPr>
+            <p:ph idx="1"/>
+          </p:nvPr>
+        </p:nvSpPr>
+        <p:spPr/>
+        <p:txBody>
+          <a:bodyPr/>
+          <a:lstStyle/>
+          <a:p>
+            <a:endParaRPr lang="en-GB"/>
+          </a:p>
+        </p:txBody>
+      </p:sp>
+    </p:spTree>
+    <p:extLst>
+      <p:ext uri="{BB962C8B-B14F-4D97-AF65-F5344CB8AC3E}">
+        <p14:creationId xmlns:p14="http://schemas.microsoft.com/office/powerpoint/2010/main" val="275639994"/>
+      </p:ext>
+    </p:extLst>
+  </p:cSld>
+  <p:clrMapOvr>
+    <a:masterClrMapping/>
+  </p:clrMapOvr>
+</p:sld>
+</file>
+
+<file path=ppt/slides/slide3.xml><?xml version="1.0" encoding="utf-8"?>
+<p:sld xmlns:a="http://schemas.openxmlformats.org/drawingml/2006/main" xmlns:r="http://schemas.openxmlformats.org/officeDocument/2006/relationships" xmlns:p="http://schemas.openxmlformats.org/presentationml/2006/main">
+  <p:cSld>
+    <p:spTree>
+      <p:nvGrpSpPr>
+        <p:cNvPr id="1" name=""/>
+        <p:cNvGrpSpPr/>
+        <p:nvPr/>
+      </p:nvGrpSpPr>
+      <p:grpSpPr>
+        <a:xfrm>
+          <a:off x="0" y="0"/>
+          <a:ext cx="0" cy="0"/>
+          <a:chOff x="0" y="0"/>
+          <a:chExt cx="0" cy="0"/>
+        </a:xfrm>
+      </p:grpSpPr>
+      <p:sp>
+        <p:nvSpPr>
+          <p:cNvPr id="2" name="Title 1">
+            <a:extLst>
+              <a:ext uri="{FF2B5EF4-FFF2-40B4-BE49-F238E27FC236}">
+                <a16:creationId xmlns:a16="http://schemas.microsoft.com/office/drawing/2014/main" id="{16E1419E-1881-49D7-A695-3E923D925BB6}"/>
+              </a:ext>
+            </a:extLst>
+          </p:cNvPr>
+          <p:cNvSpPr>
+            <a:spLocks noGrp="1"/>
+          </p:cNvSpPr>
+          <p:nvPr>
+            <p:ph type="title"/>
+          </p:nvPr>
+        </p:nvSpPr>
+        <p:spPr/>
+        <p:txBody>
+          <a:bodyPr/>
+          <a:lstStyle/>
+          <a:p>
+            <a:r>
+              <a:rPr lang="en-GB" dirty="0"/>
+              <a:t>BOARD - ED</a:t>
+            </a:r>
+          </a:p>
+        </p:txBody>
+      </p:sp>
+      <p:sp>
+        <p:nvSpPr>
+          <p:cNvPr id="3" name="Content Placeholder 2">
+            <a:extLst>
+              <a:ext uri="{FF2B5EF4-FFF2-40B4-BE49-F238E27FC236}">
+                <a16:creationId xmlns:a16="http://schemas.microsoft.com/office/drawing/2014/main" id="{3B1C41F3-4EF7-41FB-8FE4-436C725FB87F}"/>
+              </a:ext>
+            </a:extLst>
+          </p:cNvPr>
+          <p:cNvSpPr>
+            <a:spLocks noGrp="1"/>
+          </p:cNvSpPr>
+          <p:nvPr>
+            <p:ph idx="1"/>
+          </p:nvPr>
+        </p:nvSpPr>
+        <p:spPr/>
+        <p:txBody>
+          <a:bodyPr/>
+          <a:lstStyle/>
+          <a:p>
+            <a:endParaRPr lang="en-GB"/>
+          </a:p>
+        </p:txBody>
+      </p:sp>
+    </p:spTree>
+    <p:extLst>
+      <p:ext uri="{BB962C8B-B14F-4D97-AF65-F5344CB8AC3E}">
+        <p14:creationId xmlns:p14="http://schemas.microsoft.com/office/powerpoint/2010/main" val="1177586150"/>
+      </p:ext>
+    </p:extLst>
+  </p:cSld>
+  <p:clrMapOvr>
+    <a:masterClrMapping/>
+  </p:clrMapOvr>
+</p:sld>
+</file>
+
+<file path=ppt/slides/slide4.xml><?xml version="1.0" encoding="utf-8"?>
+<p:sld xmlns:a="http://schemas.openxmlformats.org/drawingml/2006/main" xmlns:r="http://schemas.openxmlformats.org/officeDocument/2006/relationships" xmlns:p="http://schemas.openxmlformats.org/presentationml/2006/main">
+  <p:cSld>
+    <p:spTree>
+      <p:nvGrpSpPr>
+        <p:cNvPr id="1" name=""/>
+        <p:cNvGrpSpPr/>
+        <p:nvPr/>
+      </p:nvGrpSpPr>
+      <p:grpSpPr>
+        <a:xfrm>
+          <a:off x="0" y="0"/>
+          <a:ext cx="0" cy="0"/>
+          <a:chOff x="0" y="0"/>
+          <a:chExt cx="0" cy="0"/>
+        </a:xfrm>
+      </p:grpSpPr>
+      <p:sp>
+        <p:nvSpPr>
+          <p:cNvPr id="2" name="Title 1">
+            <a:extLst>
+              <a:ext uri="{FF2B5EF4-FFF2-40B4-BE49-F238E27FC236}">
+                <a16:creationId xmlns:a16="http://schemas.microsoft.com/office/drawing/2014/main" id="{4F7200DE-032E-48FD-8334-F93B5DE71996}"/>
+              </a:ext>
+            </a:extLst>
+          </p:cNvPr>
+          <p:cNvSpPr>
+            <a:spLocks noGrp="1"/>
+          </p:cNvSpPr>
+          <p:nvPr>
+            <p:ph type="title"/>
+          </p:nvPr>
+        </p:nvSpPr>
+        <p:spPr/>
+        <p:txBody>
+          <a:bodyPr/>
+          <a:lstStyle/>
+          <a:p>
+            <a:r>
+              <a:rPr lang="en-GB" dirty="0"/>
+              <a:t>TRUCKS - TOBY</a:t>
+            </a:r>
+          </a:p>
+        </p:txBody>
+      </p:sp>
+      <p:sp>
+        <p:nvSpPr>
+          <p:cNvPr id="3" name="Content Placeholder 2">
+            <a:extLst>
+              <a:ext uri="{FF2B5EF4-FFF2-40B4-BE49-F238E27FC236}">
+                <a16:creationId xmlns:a16="http://schemas.microsoft.com/office/drawing/2014/main" id="{CE0BD0BB-3E09-46CF-8A28-1943386FEC0F}"/>
+              </a:ext>
+            </a:extLst>
+          </p:cNvPr>
+          <p:cNvSpPr>
+            <a:spLocks noGrp="1"/>
+          </p:cNvSpPr>
+          <p:nvPr>
+            <p:ph idx="1"/>
+          </p:nvPr>
+        </p:nvSpPr>
+        <p:spPr/>
+        <p:txBody>
+          <a:bodyPr/>
+          <a:lstStyle/>
+          <a:p>
+            <a:endParaRPr lang="en-GB"/>
+          </a:p>
+        </p:txBody>
+      </p:sp>
+    </p:spTree>
+    <p:extLst>
+      <p:ext uri="{BB962C8B-B14F-4D97-AF65-F5344CB8AC3E}">
+        <p14:creationId xmlns:p14="http://schemas.microsoft.com/office/powerpoint/2010/main" val="3459229785"/>
+      </p:ext>
+    </p:extLst>
+  </p:cSld>
+  <p:clrMapOvr>
+    <a:masterClrMapping/>
+  </p:clrMapOvr>
+</p:sld>
+</file>
+
+<file path=ppt/slides/slide5.xml><?xml version="1.0" encoding="utf-8"?>
+<p:sld xmlns:a="http://schemas.openxmlformats.org/drawingml/2006/main" xmlns:r="http://schemas.openxmlformats.org/officeDocument/2006/relationships" xmlns:p="http://schemas.openxmlformats.org/presentationml/2006/main">
+  <p:cSld>
+    <p:spTree>
+      <p:nvGrpSpPr>
+        <p:cNvPr id="1" name=""/>
+        <p:cNvGrpSpPr/>
+        <p:nvPr/>
+      </p:nvGrpSpPr>
+      <p:grpSpPr>
+        <a:xfrm>
+          <a:off x="0" y="0"/>
+          <a:ext cx="0" cy="0"/>
+          <a:chOff x="0" y="0"/>
+          <a:chExt cx="0" cy="0"/>
+        </a:xfrm>
+      </p:grpSpPr>
+      <p:sp>
+        <p:nvSpPr>
+          <p:cNvPr id="2" name="Title 1">
+            <a:extLst>
+              <a:ext uri="{FF2B5EF4-FFF2-40B4-BE49-F238E27FC236}">
+                <a16:creationId xmlns:a16="http://schemas.microsoft.com/office/drawing/2014/main" id="{23179417-7B3A-4B85-92FD-69E7E95D03A0}"/>
+              </a:ext>
+            </a:extLst>
+          </p:cNvPr>
+          <p:cNvSpPr>
+            <a:spLocks noGrp="1"/>
+          </p:cNvSpPr>
+          <p:nvPr>
+            <p:ph type="title"/>
+          </p:nvPr>
+        </p:nvSpPr>
+        <p:spPr/>
+        <p:txBody>
+          <a:bodyPr/>
+          <a:lstStyle/>
+          <a:p>
+            <a:r>
+              <a:rPr lang="en-GB" dirty="0"/>
+              <a:t>Wheels - HUGO</a:t>
+            </a:r>
+          </a:p>
+        </p:txBody>
+      </p:sp>
+      <p:sp>
+        <p:nvSpPr>
+          <p:cNvPr id="3" name="Content Placeholder 2">
+            <a:extLst>
+              <a:ext uri="{FF2B5EF4-FFF2-40B4-BE49-F238E27FC236}">
+                <a16:creationId xmlns:a16="http://schemas.microsoft.com/office/drawing/2014/main" id="{FBF7D434-3D6C-409F-BDDF-960525912722}"/>
+              </a:ext>
+            </a:extLst>
+          </p:cNvPr>
+          <p:cNvSpPr>
+            <a:spLocks noGrp="1"/>
+          </p:cNvSpPr>
+          <p:nvPr>
+            <p:ph idx="1"/>
+          </p:nvPr>
+        </p:nvSpPr>
+        <p:spPr/>
+        <p:txBody>
+          <a:bodyPr/>
+          <a:lstStyle/>
+          <a:p>
+            <a:endParaRPr lang="en-GB"/>
+          </a:p>
+        </p:txBody>
+      </p:sp>
+    </p:spTree>
+    <p:extLst>
+      <p:ext uri="{BB962C8B-B14F-4D97-AF65-F5344CB8AC3E}">
+        <p14:creationId xmlns:p14="http://schemas.microsoft.com/office/powerpoint/2010/main" val="2605612958"/>
+      </p:ext>
+    </p:extLst>
+  </p:cSld>
+  <p:clrMapOvr>
+    <a:masterClrMapping/>
+  </p:clrMapOvr>
+</p:sld>
+</file>
+
+<file path=ppt/slides/slide6.xml><?xml version="1.0" encoding="utf-8"?>
+<p:sld xmlns:a="http://schemas.openxmlformats.org/drawingml/2006/main" xmlns:r="http://schemas.openxmlformats.org/officeDocument/2006/relationships" xmlns:p="http://schemas.openxmlformats.org/presentationml/2006/main">
+  <p:cSld>
+    <p:spTree>
+      <p:nvGrpSpPr>
+        <p:cNvPr id="1" name=""/>
+        <p:cNvGrpSpPr/>
+        <p:nvPr/>
+      </p:nvGrpSpPr>
+      <p:grpSpPr>
+        <a:xfrm>
+          <a:off x="0" y="0"/>
+          <a:ext cx="0" cy="0"/>
+          <a:chOff x="0" y="0"/>
+          <a:chExt cx="0" cy="0"/>
+        </a:xfrm>
+      </p:grpSpPr>
+      <p:sp>
+        <p:nvSpPr>
+          <p:cNvPr id="2" name="Title 1">
+            <a:extLst>
+              <a:ext uri="{FF2B5EF4-FFF2-40B4-BE49-F238E27FC236}">
+                <a16:creationId xmlns:a16="http://schemas.microsoft.com/office/drawing/2014/main" id="{5A5E529B-DFE6-4189-8C9D-83663736760C}"/>
+              </a:ext>
+            </a:extLst>
+          </p:cNvPr>
+          <p:cNvSpPr>
+            <a:spLocks noGrp="1"/>
+          </p:cNvSpPr>
+          <p:nvPr>
+            <p:ph type="title"/>
+          </p:nvPr>
+        </p:nvSpPr>
+        <p:spPr/>
+        <p:txBody>
+          <a:bodyPr/>
+          <a:lstStyle/>
+          <a:p>
+            <a:r>
+              <a:rPr lang="en-GB" dirty="0"/>
+              <a:t>Battery – SAM</a:t>
+            </a:r>
+          </a:p>
+        </p:txBody>
+      </p:sp>
+      <p:sp>
+        <p:nvSpPr>
+          <p:cNvPr id="3" name="Content Placeholder 2">
+            <a:extLst>
+              <a:ext uri="{FF2B5EF4-FFF2-40B4-BE49-F238E27FC236}">
+                <a16:creationId xmlns:a16="http://schemas.microsoft.com/office/drawing/2014/main" id="{1F2F5A3D-399D-42E6-B9E6-1FB08B63D0D2}"/>
+              </a:ext>
+            </a:extLst>
+          </p:cNvPr>
+          <p:cNvSpPr>
+            <a:spLocks noGrp="1"/>
+          </p:cNvSpPr>
+          <p:nvPr>
+            <p:ph idx="1"/>
+          </p:nvPr>
+        </p:nvSpPr>
+        <p:spPr/>
+        <p:txBody>
+          <a:bodyPr/>
+          <a:lstStyle/>
+          <a:p>
+            <a:endParaRPr lang="en-GB" dirty="0"/>
+          </a:p>
+        </p:txBody>
+      </p:sp>
+    </p:spTree>
+    <p:extLst>
+      <p:ext uri="{BB962C8B-B14F-4D97-AF65-F5344CB8AC3E}">
+        <p14:creationId xmlns:p14="http://schemas.microsoft.com/office/powerpoint/2010/main" val="693304522"/>
+      </p:ext>
+    </p:extLst>
+  </p:cSld>
+  <p:clrMapOvr>
+    <a:masterClrMapping/>
+  </p:clrMapOvr>
+</p:sld>
+</file>
+
 <file path=ppt/slides/slide7.xml><?xml version="1.0" encoding="utf-8"?>
 <p:sld xmlns:a="http://schemas.openxmlformats.org/drawingml/2006/main" xmlns:r="http://schemas.openxmlformats.org/officeDocument/2006/relationships" xmlns:p="http://schemas.openxmlformats.org/presentationml/2006/main">
   <p:cSld>
@@ -4331,7 +4852,7 @@
           <p:cNvPr id="2" name="Title 1">
             <a:extLst>
               <a:ext uri="{FF2B5EF4-FFF2-40B4-BE49-F238E27FC236}">
-                <a16:creationId xmlns:a16="http://schemas.microsoft.com/office/drawing/2014/main" id="{FE0F4796-51C8-49EF-98D8-8B5BA57E15CE}"/>
+                <a16:creationId xmlns:a16="http://schemas.microsoft.com/office/drawing/2014/main" id="{0E5B7271-3723-49ED-A2DA-31D2BA410DEE}"/>
               </a:ext>
             </a:extLst>
           </p:cNvPr>
@@ -4347,7 +4868,10 @@
           <a:bodyPr/>
           <a:lstStyle/>
           <a:p>
-            <a:endParaRPr lang="en-GB"/>
+            <a:r>
+              <a:rPr lang="en-GB" dirty="0"/>
+              <a:t>Range specification</a:t>
+            </a:r>
           </a:p>
         </p:txBody>
       </p:sp>
@@ -4356,7 +4880,7 @@
           <p:cNvPr id="3" name="Content Placeholder 2">
             <a:extLst>
               <a:ext uri="{FF2B5EF4-FFF2-40B4-BE49-F238E27FC236}">
-                <a16:creationId xmlns:a16="http://schemas.microsoft.com/office/drawing/2014/main" id="{B7847DB7-EF3F-4994-B4A2-71BE0D764F4A}"/>
+                <a16:creationId xmlns:a16="http://schemas.microsoft.com/office/drawing/2014/main" id="{AA7F8B67-E3A2-43A1-80EB-39942E5EBA00}"/>
               </a:ext>
             </a:extLst>
           </p:cNvPr>
@@ -4369,17 +4893,404 @@
         </p:nvSpPr>
         <p:spPr/>
         <p:txBody>
-          <a:bodyPr/>
-          <a:lstStyle/>
-          <a:p>
-            <a:endParaRPr lang="en-GB"/>
+          <a:bodyPr>
+            <a:normAutofit lnSpcReduction="10000"/>
+          </a:bodyPr>
+          <a:lstStyle/>
+          <a:p>
+            <a:pPr marL="0" indent="0">
+              <a:buNone/>
+            </a:pPr>
+            <a:r>
+              <a:rPr lang="en-GB" sz="3200" dirty="0"/>
+              <a:t>Specification</a:t>
+            </a:r>
+          </a:p>
+          <a:p>
+            <a:r>
+              <a:rPr lang="en-GB" sz="3200" dirty="0"/>
+              <a:t>Charge every week (7 days)</a:t>
+            </a:r>
+          </a:p>
+          <a:p>
+            <a:r>
+              <a:rPr lang="en-GB" sz="3200" dirty="0"/>
+              <a:t>Days being used:5 days (commute)</a:t>
+            </a:r>
+          </a:p>
+          <a:p>
+            <a:r>
+              <a:rPr lang="en-GB" sz="3200" dirty="0"/>
+              <a:t>Distance each day: 3km </a:t>
+            </a:r>
+          </a:p>
+          <a:p>
+            <a:r>
+              <a:rPr lang="en-GB" sz="3200" dirty="0"/>
+              <a:t>Estimated vertical distance: 80m</a:t>
+            </a:r>
+          </a:p>
+          <a:p>
+            <a:pPr marL="0" indent="0">
+              <a:buNone/>
+            </a:pPr>
+            <a:endParaRPr lang="en-GB" sz="3200" dirty="0"/>
+          </a:p>
+          <a:p>
+            <a:pPr marL="0" indent="0">
+              <a:buNone/>
+            </a:pPr>
+            <a:r>
+              <a:rPr lang="en-GB" sz="3200" dirty="0"/>
+              <a:t>This means:</a:t>
+            </a:r>
+          </a:p>
+          <a:p>
+            <a:r>
+              <a:rPr lang="en-GB" sz="3200" dirty="0"/>
+              <a:t>Estimated Watt-hours per mile: 10Wh/mile</a:t>
+            </a:r>
+          </a:p>
+          <a:p>
+            <a:endParaRPr lang="en-GB" sz="3200" dirty="0"/>
+          </a:p>
+          <a:p>
+            <a:endParaRPr lang="en-GB" sz="3200" dirty="0"/>
           </a:p>
         </p:txBody>
       </p:sp>
     </p:spTree>
     <p:extLst>
       <p:ext uri="{BB962C8B-B14F-4D97-AF65-F5344CB8AC3E}">
-        <p14:creationId xmlns:p14="http://schemas.microsoft.com/office/powerpoint/2010/main" val="431821034"/>
+        <p14:creationId xmlns:p14="http://schemas.microsoft.com/office/powerpoint/2010/main" val="2271532738"/>
+      </p:ext>
+    </p:extLst>
+  </p:cSld>
+  <p:clrMapOvr>
+    <a:masterClrMapping/>
+  </p:clrMapOvr>
+</p:sld>
+</file>
+
+<file path=ppt/slides/slide8.xml><?xml version="1.0" encoding="utf-8"?>
+<p:sld xmlns:a="http://schemas.openxmlformats.org/drawingml/2006/main" xmlns:r="http://schemas.openxmlformats.org/officeDocument/2006/relationships" xmlns:p="http://schemas.openxmlformats.org/presentationml/2006/main">
+  <p:cSld>
+    <p:spTree>
+      <p:nvGrpSpPr>
+        <p:cNvPr id="1" name=""/>
+        <p:cNvGrpSpPr/>
+        <p:nvPr/>
+      </p:nvGrpSpPr>
+      <p:grpSpPr>
+        <a:xfrm>
+          <a:off x="0" y="0"/>
+          <a:ext cx="0" cy="0"/>
+          <a:chOff x="0" y="0"/>
+          <a:chExt cx="0" cy="0"/>
+        </a:xfrm>
+      </p:grpSpPr>
+      <p:sp>
+        <p:nvSpPr>
+          <p:cNvPr id="2" name="Title 1">
+            <a:extLst>
+              <a:ext uri="{FF2B5EF4-FFF2-40B4-BE49-F238E27FC236}">
+                <a16:creationId xmlns:a16="http://schemas.microsoft.com/office/drawing/2014/main" id="{673FF3E4-F450-44AE-80B0-AF79C50B5E10}"/>
+              </a:ext>
+            </a:extLst>
+          </p:cNvPr>
+          <p:cNvSpPr>
+            <a:spLocks noGrp="1"/>
+          </p:cNvSpPr>
+          <p:nvPr>
+            <p:ph type="title"/>
+          </p:nvPr>
+        </p:nvSpPr>
+        <p:spPr/>
+        <p:txBody>
+          <a:bodyPr/>
+          <a:lstStyle/>
+          <a:p>
+            <a:r>
+              <a:rPr lang="en-GB" dirty="0"/>
+              <a:t>Battery specification</a:t>
+            </a:r>
+          </a:p>
+        </p:txBody>
+      </p:sp>
+      <p:sp>
+        <p:nvSpPr>
+          <p:cNvPr id="3" name="Content Placeholder 2">
+            <a:extLst>
+              <a:ext uri="{FF2B5EF4-FFF2-40B4-BE49-F238E27FC236}">
+                <a16:creationId xmlns:a16="http://schemas.microsoft.com/office/drawing/2014/main" id="{D125B466-8300-4B74-A1BA-905EF3820914}"/>
+              </a:ext>
+            </a:extLst>
+          </p:cNvPr>
+          <p:cNvSpPr>
+            <a:spLocks noGrp="1"/>
+          </p:cNvSpPr>
+          <p:nvPr>
+            <p:ph idx="1"/>
+          </p:nvPr>
+        </p:nvSpPr>
+        <p:spPr/>
+        <p:txBody>
+          <a:bodyPr>
+            <a:normAutofit/>
+          </a:bodyPr>
+          <a:lstStyle/>
+          <a:p>
+            <a:pPr marL="0" indent="0">
+              <a:buNone/>
+            </a:pPr>
+            <a:r>
+              <a:rPr lang="en-GB" dirty="0"/>
+              <a:t>Lithium polymer chemistry</a:t>
+            </a:r>
+          </a:p>
+          <a:p>
+            <a:r>
+              <a:rPr lang="en-GB" dirty="0"/>
+              <a:t>Watt-hour capacity: 180Wh</a:t>
+            </a:r>
+          </a:p>
+          <a:p>
+            <a:r>
+              <a:rPr lang="en-GB" dirty="0"/>
+              <a:t>Supply voltage:22.2V</a:t>
+            </a:r>
+          </a:p>
+          <a:p>
+            <a:r>
+              <a:rPr lang="en-GB" dirty="0"/>
+              <a:t>Amp-hour capacity: 8100Ah</a:t>
+            </a:r>
+          </a:p>
+          <a:p>
+            <a:r>
+              <a:rPr lang="en-GB" dirty="0"/>
+              <a:t>Mass: 1.7kg</a:t>
+            </a:r>
+          </a:p>
+          <a:p>
+            <a:endParaRPr lang="en-GB" dirty="0"/>
+          </a:p>
+          <a:p>
+            <a:r>
+              <a:rPr lang="en-GB" dirty="0"/>
+              <a:t>Supply voltage: 50v</a:t>
+            </a:r>
+          </a:p>
+          <a:p>
+            <a:r>
+              <a:rPr lang="en-GB" dirty="0"/>
+              <a:t>2 batteries in parallel required</a:t>
+            </a:r>
+          </a:p>
+        </p:txBody>
+      </p:sp>
+      <p:pic>
+        <p:nvPicPr>
+          <p:cNvPr id="5" name="Picture 4" descr="A screenshot of a cell phone&#10;&#10;Description automatically generated">
+            <a:extLst>
+              <a:ext uri="{FF2B5EF4-FFF2-40B4-BE49-F238E27FC236}">
+                <a16:creationId xmlns:a16="http://schemas.microsoft.com/office/drawing/2014/main" id="{FD6F27ED-35B8-40F0-B2E0-07E4EFF2036D}"/>
+              </a:ext>
+            </a:extLst>
+          </p:cNvPr>
+          <p:cNvPicPr>
+            <a:picLocks noChangeAspect="1"/>
+          </p:cNvPicPr>
+          <p:nvPr/>
+        </p:nvPicPr>
+        <p:blipFill>
+          <a:blip r:embed="rId2">
+            <a:extLst>
+              <a:ext uri="{28A0092B-C50C-407E-A947-70E740481C1C}">
+                <a14:useLocalDpi xmlns:a14="http://schemas.microsoft.com/office/drawing/2010/main" val="0"/>
+              </a:ext>
+            </a:extLst>
+          </a:blip>
+          <a:stretch>
+            <a:fillRect/>
+          </a:stretch>
+        </p:blipFill>
+        <p:spPr>
+          <a:xfrm>
+            <a:off x="6096000" y="928328"/>
+            <a:ext cx="5907531" cy="3759338"/>
+          </a:xfrm>
+          <a:prstGeom prst="rect">
+            <a:avLst/>
+          </a:prstGeom>
+        </p:spPr>
+      </p:pic>
+    </p:spTree>
+    <p:extLst>
+      <p:ext uri="{BB962C8B-B14F-4D97-AF65-F5344CB8AC3E}">
+        <p14:creationId xmlns:p14="http://schemas.microsoft.com/office/powerpoint/2010/main" val="1175002974"/>
+      </p:ext>
+    </p:extLst>
+  </p:cSld>
+  <p:clrMapOvr>
+    <a:masterClrMapping/>
+  </p:clrMapOvr>
+</p:sld>
+</file>
+
+<file path=ppt/slides/slide9.xml><?xml version="1.0" encoding="utf-8"?>
+<p:sld xmlns:a="http://schemas.openxmlformats.org/drawingml/2006/main" xmlns:r="http://schemas.openxmlformats.org/officeDocument/2006/relationships" xmlns:p="http://schemas.openxmlformats.org/presentationml/2006/main">
+  <p:cSld>
+    <p:spTree>
+      <p:nvGrpSpPr>
+        <p:cNvPr id="1" name=""/>
+        <p:cNvGrpSpPr/>
+        <p:nvPr/>
+      </p:nvGrpSpPr>
+      <p:grpSpPr>
+        <a:xfrm>
+          <a:off x="0" y="0"/>
+          <a:ext cx="0" cy="0"/>
+          <a:chOff x="0" y="0"/>
+          <a:chExt cx="0" cy="0"/>
+        </a:xfrm>
+      </p:grpSpPr>
+      <p:sp>
+        <p:nvSpPr>
+          <p:cNvPr id="2" name="Title 1">
+            <a:extLst>
+              <a:ext uri="{FF2B5EF4-FFF2-40B4-BE49-F238E27FC236}">
+                <a16:creationId xmlns:a16="http://schemas.microsoft.com/office/drawing/2014/main" id="{37129C13-237D-4521-81BA-D7F55AD5B585}"/>
+              </a:ext>
+            </a:extLst>
+          </p:cNvPr>
+          <p:cNvSpPr>
+            <a:spLocks noGrp="1"/>
+          </p:cNvSpPr>
+          <p:nvPr>
+            <p:ph type="title"/>
+          </p:nvPr>
+        </p:nvSpPr>
+        <p:spPr/>
+        <p:txBody>
+          <a:bodyPr/>
+          <a:lstStyle/>
+          <a:p>
+            <a:r>
+              <a:rPr lang="en-GB" dirty="0"/>
+              <a:t>Battery charging</a:t>
+            </a:r>
+          </a:p>
+        </p:txBody>
+      </p:sp>
+      <p:sp>
+        <p:nvSpPr>
+          <p:cNvPr id="3" name="Content Placeholder 2">
+            <a:extLst>
+              <a:ext uri="{FF2B5EF4-FFF2-40B4-BE49-F238E27FC236}">
+                <a16:creationId xmlns:a16="http://schemas.microsoft.com/office/drawing/2014/main" id="{67871035-2C42-42A1-86FD-846461ADF945}"/>
+              </a:ext>
+            </a:extLst>
+          </p:cNvPr>
+          <p:cNvSpPr>
+            <a:spLocks noGrp="1"/>
+          </p:cNvSpPr>
+          <p:nvPr>
+            <p:ph idx="1"/>
+          </p:nvPr>
+        </p:nvSpPr>
+        <p:spPr/>
+        <p:txBody>
+          <a:bodyPr/>
+          <a:lstStyle/>
+          <a:p>
+            <a:r>
+              <a:rPr lang="en-GB" dirty="0"/>
+              <a:t>Lithium polymer can be dangerous:</a:t>
+            </a:r>
+          </a:p>
+          <a:p>
+            <a:pPr lvl="1"/>
+            <a:r>
+              <a:rPr lang="en-GB" dirty="0"/>
+              <a:t>Overcharging</a:t>
+            </a:r>
+          </a:p>
+          <a:p>
+            <a:pPr lvl="1"/>
+            <a:r>
+              <a:rPr lang="en-GB" dirty="0"/>
+              <a:t>Unbalanced charging</a:t>
+            </a:r>
+          </a:p>
+          <a:p>
+            <a:r>
+              <a:rPr lang="en-GB" dirty="0"/>
+              <a:t>Use an off the shelf solution</a:t>
+            </a:r>
+          </a:p>
+          <a:p>
+            <a:r>
+              <a:rPr lang="en-GB" dirty="0"/>
+              <a:t>Use hobby/RC charger</a:t>
+            </a:r>
+          </a:p>
+          <a:p>
+            <a:endParaRPr lang="en-GB" dirty="0"/>
+          </a:p>
+          <a:p>
+            <a:r>
+              <a:rPr lang="en-GB" dirty="0"/>
+              <a:t>Charge batteries in parallel</a:t>
+            </a:r>
+          </a:p>
+          <a:p>
+            <a:r>
+              <a:rPr lang="en-GB" dirty="0"/>
+              <a:t>System to switch between series and parallel</a:t>
+            </a:r>
+          </a:p>
+          <a:p>
+            <a:endParaRPr lang="en-GB" dirty="0"/>
+          </a:p>
+          <a:p>
+            <a:endParaRPr lang="en-GB" dirty="0"/>
+          </a:p>
+        </p:txBody>
+      </p:sp>
+      <p:pic>
+        <p:nvPicPr>
+          <p:cNvPr id="6" name="Picture 5">
+            <a:extLst>
+              <a:ext uri="{FF2B5EF4-FFF2-40B4-BE49-F238E27FC236}">
+                <a16:creationId xmlns:a16="http://schemas.microsoft.com/office/drawing/2014/main" id="{38978E23-184E-43D4-927F-322B80564812}"/>
+              </a:ext>
+            </a:extLst>
+          </p:cNvPr>
+          <p:cNvPicPr>
+            <a:picLocks noChangeAspect="1"/>
+          </p:cNvPicPr>
+          <p:nvPr/>
+        </p:nvPicPr>
+        <p:blipFill rotWithShape="1">
+          <a:blip r:embed="rId2"/>
+          <a:srcRect l="1375"/>
+          <a:stretch/>
+        </p:blipFill>
+        <p:spPr>
+          <a:xfrm>
+            <a:off x="7055194" y="681037"/>
+            <a:ext cx="4525780" cy="3465767"/>
+          </a:xfrm>
+          <a:prstGeom prst="rect">
+            <a:avLst/>
+          </a:prstGeom>
+        </p:spPr>
+      </p:pic>
+    </p:spTree>
+    <p:extLst>
+      <p:ext uri="{BB962C8B-B14F-4D97-AF65-F5344CB8AC3E}">
+        <p14:creationId xmlns:p14="http://schemas.microsoft.com/office/powerpoint/2010/main" val="2721647380"/>
       </p:ext>
     </p:extLst>
   </p:cSld>

</xml_diff>

<commit_message>
Pulled better battery from poor merge
</commit_message>
<xml_diff>
--- a/PRESENTATION/Battery.pptx
+++ b/PRESENTATION/Battery.pptx
@@ -6,12 +6,19 @@
   </p:sldMasterIdLst>
   <p:sldIdLst>
     <p:sldId id="256" r:id="rId2"/>
-    <p:sldId id="257" r:id="rId3"/>
-    <p:sldId id="258" r:id="rId4"/>
-    <p:sldId id="259" r:id="rId5"/>
-    <p:sldId id="260" r:id="rId6"/>
-    <p:sldId id="261" r:id="rId7"/>
-    <p:sldId id="262" r:id="rId8"/>
+    <p:sldId id="268" r:id="rId3"/>
+    <p:sldId id="266" r:id="rId4"/>
+    <p:sldId id="267" r:id="rId5"/>
+    <p:sldId id="269" r:id="rId6"/>
+    <p:sldId id="264" r:id="rId7"/>
+    <p:sldId id="257" r:id="rId8"/>
+    <p:sldId id="258" r:id="rId9"/>
+    <p:sldId id="260" r:id="rId10"/>
+    <p:sldId id="265" r:id="rId11"/>
+    <p:sldId id="259" r:id="rId12"/>
+    <p:sldId id="261" r:id="rId13"/>
+    <p:sldId id="262" r:id="rId14"/>
+    <p:sldId id="263" r:id="rId15"/>
   </p:sldIdLst>
   <p:sldSz cx="12192000" cy="6858000"/>
   <p:notesSz cx="6858000" cy="9144000"/>
@@ -267,7 +274,7 @@
           <a:p>
             <a:fld id="{B027D84C-C8DF-44EC-8F26-E09A80CBF3F2}" type="datetimeFigureOut">
               <a:rPr lang="en-GB" smtClean="0"/>
-              <a:t>11/02/2020</a:t>
+              <a:t>13/02/2020</a:t>
             </a:fld>
             <a:endParaRPr lang="en-GB"/>
           </a:p>
@@ -467,7 +474,7 @@
           <a:p>
             <a:fld id="{B027D84C-C8DF-44EC-8F26-E09A80CBF3F2}" type="datetimeFigureOut">
               <a:rPr lang="en-GB" smtClean="0"/>
-              <a:t>11/02/2020</a:t>
+              <a:t>13/02/2020</a:t>
             </a:fld>
             <a:endParaRPr lang="en-GB"/>
           </a:p>
@@ -677,7 +684,7 @@
           <a:p>
             <a:fld id="{B027D84C-C8DF-44EC-8F26-E09A80CBF3F2}" type="datetimeFigureOut">
               <a:rPr lang="en-GB" smtClean="0"/>
-              <a:t>11/02/2020</a:t>
+              <a:t>13/02/2020</a:t>
             </a:fld>
             <a:endParaRPr lang="en-GB"/>
           </a:p>
@@ -877,7 +884,7 @@
           <a:p>
             <a:fld id="{B027D84C-C8DF-44EC-8F26-E09A80CBF3F2}" type="datetimeFigureOut">
               <a:rPr lang="en-GB" smtClean="0"/>
-              <a:t>11/02/2020</a:t>
+              <a:t>13/02/2020</a:t>
             </a:fld>
             <a:endParaRPr lang="en-GB"/>
           </a:p>
@@ -1153,7 +1160,7 @@
           <a:p>
             <a:fld id="{B027D84C-C8DF-44EC-8F26-E09A80CBF3F2}" type="datetimeFigureOut">
               <a:rPr lang="en-GB" smtClean="0"/>
-              <a:t>11/02/2020</a:t>
+              <a:t>13/02/2020</a:t>
             </a:fld>
             <a:endParaRPr lang="en-GB"/>
           </a:p>
@@ -1421,7 +1428,7 @@
           <a:p>
             <a:fld id="{B027D84C-C8DF-44EC-8F26-E09A80CBF3F2}" type="datetimeFigureOut">
               <a:rPr lang="en-GB" smtClean="0"/>
-              <a:t>11/02/2020</a:t>
+              <a:t>13/02/2020</a:t>
             </a:fld>
             <a:endParaRPr lang="en-GB"/>
           </a:p>
@@ -1836,7 +1843,7 @@
           <a:p>
             <a:fld id="{B027D84C-C8DF-44EC-8F26-E09A80CBF3F2}" type="datetimeFigureOut">
               <a:rPr lang="en-GB" smtClean="0"/>
-              <a:t>11/02/2020</a:t>
+              <a:t>13/02/2020</a:t>
             </a:fld>
             <a:endParaRPr lang="en-GB"/>
           </a:p>
@@ -1978,7 +1985,7 @@
           <a:p>
             <a:fld id="{B027D84C-C8DF-44EC-8F26-E09A80CBF3F2}" type="datetimeFigureOut">
               <a:rPr lang="en-GB" smtClean="0"/>
-              <a:t>11/02/2020</a:t>
+              <a:t>13/02/2020</a:t>
             </a:fld>
             <a:endParaRPr lang="en-GB"/>
           </a:p>
@@ -2091,7 +2098,7 @@
           <a:p>
             <a:fld id="{B027D84C-C8DF-44EC-8F26-E09A80CBF3F2}" type="datetimeFigureOut">
               <a:rPr lang="en-GB" smtClean="0"/>
-              <a:t>11/02/2020</a:t>
+              <a:t>13/02/2020</a:t>
             </a:fld>
             <a:endParaRPr lang="en-GB"/>
           </a:p>
@@ -2404,7 +2411,7 @@
           <a:p>
             <a:fld id="{B027D84C-C8DF-44EC-8F26-E09A80CBF3F2}" type="datetimeFigureOut">
               <a:rPr lang="en-GB" smtClean="0"/>
-              <a:t>11/02/2020</a:t>
+              <a:t>13/02/2020</a:t>
             </a:fld>
             <a:endParaRPr lang="en-GB"/>
           </a:p>
@@ -2693,7 +2700,7 @@
           <a:p>
             <a:fld id="{B027D84C-C8DF-44EC-8F26-E09A80CBF3F2}" type="datetimeFigureOut">
               <a:rPr lang="en-GB" smtClean="0"/>
-              <a:t>11/02/2020</a:t>
+              <a:t>13/02/2020</a:t>
             </a:fld>
             <a:endParaRPr lang="en-GB"/>
           </a:p>
@@ -2936,7 +2943,7 @@
           <a:p>
             <a:fld id="{B027D84C-C8DF-44EC-8F26-E09A80CBF3F2}" type="datetimeFigureOut">
               <a:rPr lang="en-GB" smtClean="0"/>
-              <a:t>11/02/2020</a:t>
+              <a:t>13/02/2020</a:t>
             </a:fld>
             <a:endParaRPr lang="en-GB"/>
           </a:p>
@@ -3452,7 +3459,7 @@
 </p:sld>
 </file>
 
-<file path=ppt/slides/slide2.xml><?xml version="1.0" encoding="utf-8"?>
+<file path=ppt/slides/slide10.xml><?xml version="1.0" encoding="utf-8"?>
 <p:sld xmlns:a="http://schemas.openxmlformats.org/drawingml/2006/main" xmlns:r="http://schemas.openxmlformats.org/officeDocument/2006/relationships" xmlns:p="http://schemas.openxmlformats.org/presentationml/2006/main">
   <p:cSld>
     <p:spTree>
@@ -3474,7 +3481,7 @@
           <p:cNvPr id="2" name="Title 1">
             <a:extLst>
               <a:ext uri="{FF2B5EF4-FFF2-40B4-BE49-F238E27FC236}">
-                <a16:creationId xmlns:a16="http://schemas.microsoft.com/office/drawing/2014/main" id="{0E5B7271-3723-49ED-A2DA-31D2BA410DEE}"/>
+                <a16:creationId xmlns:a16="http://schemas.microsoft.com/office/drawing/2014/main" id="{760EF5DD-47B4-4904-B175-B38B60653E55}"/>
               </a:ext>
             </a:extLst>
           </p:cNvPr>
@@ -3492,7 +3499,7 @@
           <a:p>
             <a:r>
               <a:rPr lang="en-GB" dirty="0"/>
-              <a:t>Range specification</a:t>
+              <a:t>Battery control overview</a:t>
             </a:r>
           </a:p>
         </p:txBody>
@@ -3502,7 +3509,7 @@
           <p:cNvPr id="3" name="Content Placeholder 2">
             <a:extLst>
               <a:ext uri="{FF2B5EF4-FFF2-40B4-BE49-F238E27FC236}">
-                <a16:creationId xmlns:a16="http://schemas.microsoft.com/office/drawing/2014/main" id="{AA7F8B67-E3A2-43A1-80EB-39942E5EBA00}"/>
+                <a16:creationId xmlns:a16="http://schemas.microsoft.com/office/drawing/2014/main" id="{3F6515A1-B1E3-4AE3-B640-E7A426887C39}"/>
               </a:ext>
             </a:extLst>
           </p:cNvPr>
@@ -3515,76 +3522,17 @@
         </p:nvSpPr>
         <p:spPr/>
         <p:txBody>
-          <a:bodyPr>
-            <a:normAutofit lnSpcReduction="10000"/>
-          </a:bodyPr>
-          <a:lstStyle/>
-          <a:p>
-            <a:pPr marL="0" indent="0">
-              <a:buNone/>
-            </a:pPr>
-            <a:r>
-              <a:rPr lang="en-GB" sz="3200" dirty="0"/>
-              <a:t>Specification</a:t>
-            </a:r>
-          </a:p>
-          <a:p>
-            <a:r>
-              <a:rPr lang="en-GB" sz="3200" dirty="0"/>
-              <a:t>Charge every week (7 days)</a:t>
-            </a:r>
-          </a:p>
-          <a:p>
-            <a:r>
-              <a:rPr lang="en-GB" sz="3200" dirty="0"/>
-              <a:t>Days being used:5 days (commute)</a:t>
-            </a:r>
-          </a:p>
-          <a:p>
-            <a:r>
-              <a:rPr lang="en-GB" sz="3200" dirty="0"/>
-              <a:t>Distance each day: 3km </a:t>
-            </a:r>
-          </a:p>
-          <a:p>
-            <a:r>
-              <a:rPr lang="en-GB" sz="3200" dirty="0"/>
-              <a:t>Estimated vertical distance: 80m</a:t>
-            </a:r>
-          </a:p>
-          <a:p>
-            <a:pPr marL="0" indent="0">
-              <a:buNone/>
-            </a:pPr>
-            <a:endParaRPr lang="en-GB" sz="3200" dirty="0"/>
-          </a:p>
-          <a:p>
-            <a:pPr marL="0" indent="0">
-              <a:buNone/>
-            </a:pPr>
-            <a:r>
-              <a:rPr lang="en-GB" sz="3200" dirty="0"/>
-              <a:t>This means:</a:t>
-            </a:r>
-          </a:p>
-          <a:p>
-            <a:r>
-              <a:rPr lang="en-GB" sz="3200" dirty="0"/>
-              <a:t>Estimated Watt-hours per mile: 10Wh/mile</a:t>
-            </a:r>
-          </a:p>
-          <a:p>
-            <a:endParaRPr lang="en-GB" sz="3200" dirty="0"/>
-          </a:p>
-          <a:p>
-            <a:endParaRPr lang="en-GB" sz="3200" dirty="0"/>
+          <a:bodyPr/>
+          <a:lstStyle/>
+          <a:p>
+            <a:endParaRPr lang="en-GB"/>
           </a:p>
         </p:txBody>
       </p:sp>
     </p:spTree>
     <p:extLst>
       <p:ext uri="{BB962C8B-B14F-4D97-AF65-F5344CB8AC3E}">
-        <p14:creationId xmlns:p14="http://schemas.microsoft.com/office/powerpoint/2010/main" val="2271532738"/>
+        <p14:creationId xmlns:p14="http://schemas.microsoft.com/office/powerpoint/2010/main" val="2397045919"/>
       </p:ext>
     </p:extLst>
   </p:cSld>
@@ -3594,7 +3542,7 @@
 </p:sld>
 </file>
 
-<file path=ppt/slides/slide3.xml><?xml version="1.0" encoding="utf-8"?>
+<file path=ppt/slides/slide11.xml><?xml version="1.0" encoding="utf-8"?>
 <p:sld xmlns:a="http://schemas.openxmlformats.org/drawingml/2006/main" xmlns:r="http://schemas.openxmlformats.org/officeDocument/2006/relationships" xmlns:p="http://schemas.openxmlformats.org/presentationml/2006/main">
   <p:cSld>
     <p:spTree>
@@ -3616,172 +3564,6 @@
           <p:cNvPr id="2" name="Title 1">
             <a:extLst>
               <a:ext uri="{FF2B5EF4-FFF2-40B4-BE49-F238E27FC236}">
-                <a16:creationId xmlns:a16="http://schemas.microsoft.com/office/drawing/2014/main" id="{673FF3E4-F450-44AE-80B0-AF79C50B5E10}"/>
-              </a:ext>
-            </a:extLst>
-          </p:cNvPr>
-          <p:cNvSpPr>
-            <a:spLocks noGrp="1"/>
-          </p:cNvSpPr>
-          <p:nvPr>
-            <p:ph type="title"/>
-          </p:nvPr>
-        </p:nvSpPr>
-        <p:spPr/>
-        <p:txBody>
-          <a:bodyPr/>
-          <a:lstStyle/>
-          <a:p>
-            <a:r>
-              <a:rPr lang="en-GB" dirty="0"/>
-              <a:t>Battery specification</a:t>
-            </a:r>
-          </a:p>
-        </p:txBody>
-      </p:sp>
-      <p:sp>
-        <p:nvSpPr>
-          <p:cNvPr id="3" name="Content Placeholder 2">
-            <a:extLst>
-              <a:ext uri="{FF2B5EF4-FFF2-40B4-BE49-F238E27FC236}">
-                <a16:creationId xmlns:a16="http://schemas.microsoft.com/office/drawing/2014/main" id="{D125B466-8300-4B74-A1BA-905EF3820914}"/>
-              </a:ext>
-            </a:extLst>
-          </p:cNvPr>
-          <p:cNvSpPr>
-            <a:spLocks noGrp="1"/>
-          </p:cNvSpPr>
-          <p:nvPr>
-            <p:ph idx="1"/>
-          </p:nvPr>
-        </p:nvSpPr>
-        <p:spPr/>
-        <p:txBody>
-          <a:bodyPr>
-            <a:normAutofit/>
-          </a:bodyPr>
-          <a:lstStyle/>
-          <a:p>
-            <a:pPr marL="0" indent="0">
-              <a:buNone/>
-            </a:pPr>
-            <a:r>
-              <a:rPr lang="en-GB" dirty="0"/>
-              <a:t>Lithium polymer chemistry</a:t>
-            </a:r>
-          </a:p>
-          <a:p>
-            <a:r>
-              <a:rPr lang="en-GB" dirty="0"/>
-              <a:t>Watt-hour capacity: 180Wh</a:t>
-            </a:r>
-          </a:p>
-          <a:p>
-            <a:r>
-              <a:rPr lang="en-GB" dirty="0"/>
-              <a:t>Supply voltage:22.2V</a:t>
-            </a:r>
-          </a:p>
-          <a:p>
-            <a:r>
-              <a:rPr lang="en-GB" dirty="0"/>
-              <a:t>Amp-hour capacity: 8100Ah</a:t>
-            </a:r>
-          </a:p>
-          <a:p>
-            <a:r>
-              <a:rPr lang="en-GB" dirty="0"/>
-              <a:t>Mass: 1.7kg</a:t>
-            </a:r>
-          </a:p>
-          <a:p>
-            <a:endParaRPr lang="en-GB" dirty="0"/>
-          </a:p>
-          <a:p>
-            <a:r>
-              <a:rPr lang="en-GB" dirty="0"/>
-              <a:t>Supply voltage: 50v</a:t>
-            </a:r>
-          </a:p>
-          <a:p>
-            <a:r>
-              <a:rPr lang="en-GB" dirty="0"/>
-              <a:t>2 batteries in parallel required</a:t>
-            </a:r>
-          </a:p>
-        </p:txBody>
-      </p:sp>
-      <p:pic>
-        <p:nvPicPr>
-          <p:cNvPr id="5" name="Picture 4" descr="A screenshot of a cell phone&#10;&#10;Description automatically generated">
-            <a:extLst>
-              <a:ext uri="{FF2B5EF4-FFF2-40B4-BE49-F238E27FC236}">
-                <a16:creationId xmlns:a16="http://schemas.microsoft.com/office/drawing/2014/main" id="{FD6F27ED-35B8-40F0-B2E0-07E4EFF2036D}"/>
-              </a:ext>
-            </a:extLst>
-          </p:cNvPr>
-          <p:cNvPicPr>
-            <a:picLocks noChangeAspect="1"/>
-          </p:cNvPicPr>
-          <p:nvPr/>
-        </p:nvPicPr>
-        <p:blipFill>
-          <a:blip r:embed="rId2">
-            <a:extLst>
-              <a:ext uri="{28A0092B-C50C-407E-A947-70E740481C1C}">
-                <a14:useLocalDpi xmlns:a14="http://schemas.microsoft.com/office/drawing/2010/main" val="0"/>
-              </a:ext>
-            </a:extLst>
-          </a:blip>
-          <a:stretch>
-            <a:fillRect/>
-          </a:stretch>
-        </p:blipFill>
-        <p:spPr>
-          <a:xfrm>
-            <a:off x="6096000" y="928328"/>
-            <a:ext cx="5907531" cy="3759338"/>
-          </a:xfrm>
-          <a:prstGeom prst="rect">
-            <a:avLst/>
-          </a:prstGeom>
-        </p:spPr>
-      </p:pic>
-    </p:spTree>
-    <p:extLst>
-      <p:ext uri="{BB962C8B-B14F-4D97-AF65-F5344CB8AC3E}">
-        <p14:creationId xmlns:p14="http://schemas.microsoft.com/office/powerpoint/2010/main" val="1175002974"/>
-      </p:ext>
-    </p:extLst>
-  </p:cSld>
-  <p:clrMapOvr>
-    <a:masterClrMapping/>
-  </p:clrMapOvr>
-</p:sld>
-</file>
-
-<file path=ppt/slides/slide4.xml><?xml version="1.0" encoding="utf-8"?>
-<p:sld xmlns:a="http://schemas.openxmlformats.org/drawingml/2006/main" xmlns:r="http://schemas.openxmlformats.org/officeDocument/2006/relationships" xmlns:p="http://schemas.openxmlformats.org/presentationml/2006/main">
-  <p:cSld>
-    <p:spTree>
-      <p:nvGrpSpPr>
-        <p:cNvPr id="1" name=""/>
-        <p:cNvGrpSpPr/>
-        <p:nvPr/>
-      </p:nvGrpSpPr>
-      <p:grpSpPr>
-        <a:xfrm>
-          <a:off x="0" y="0"/>
-          <a:ext cx="0" cy="0"/>
-          <a:chOff x="0" y="0"/>
-          <a:chExt cx="0" cy="0"/>
-        </a:xfrm>
-      </p:grpSpPr>
-      <p:sp>
-        <p:nvSpPr>
-          <p:cNvPr id="2" name="Title 1">
-            <a:extLst>
-              <a:ext uri="{FF2B5EF4-FFF2-40B4-BE49-F238E27FC236}">
                 <a16:creationId xmlns:a16="http://schemas.microsoft.com/office/drawing/2014/main" id="{AB06405B-CD38-4321-A24A-67621C4E3700}"/>
               </a:ext>
             </a:extLst>
@@ -3805,8 +3587,8 @@
           </a:p>
         </p:txBody>
       </p:sp>
-      <mc:AlternateContent xmlns:mc="http://schemas.openxmlformats.org/markup-compatibility/2006">
-        <mc:Choice xmlns:a14="http://schemas.microsoft.com/office/drawing/2010/main" Requires="a14">
+      <mc:AlternateContent xmlns:mc="http://schemas.openxmlformats.org/markup-compatibility/2006" xmlns:a14="http://schemas.microsoft.com/office/drawing/2010/main">
+        <mc:Choice Requires="a14">
           <p:sp>
             <p:nvSpPr>
               <p:cNvPr id="3" name="Content Placeholder 2">
@@ -3826,7 +3608,7 @@
             <p:spPr/>
             <p:txBody>
               <a:bodyPr>
-                <a:normAutofit/>
+                <a:normAutofit lnSpcReduction="10000"/>
               </a:bodyPr>
               <a:lstStyle/>
               <a:p>
@@ -3874,6 +3656,27 @@
                 </a:r>
               </a:p>
               <a:p>
+                <a:pPr lvl="1"/>
+                <a:r>
+                  <a:rPr lang="en-GB" dirty="0"/>
+                  <a:t>Volts</a:t>
+                </a:r>
+              </a:p>
+              <a:p>
+                <a:pPr lvl="1"/>
+                <a:r>
+                  <a:rPr lang="en-GB" dirty="0"/>
+                  <a:t>Time</a:t>
+                </a:r>
+              </a:p>
+              <a:p>
+                <a:pPr lvl="1"/>
+                <a:r>
+                  <a:rPr lang="en-GB" dirty="0"/>
+                  <a:t>Cycle count</a:t>
+                </a:r>
+              </a:p>
+              <a:p>
                 <a:r>
                   <a:rPr lang="en-GB" dirty="0"/>
                   <a:t>Controls battery series/parallel mux</a:t>
@@ -3882,8 +3685,19 @@
               <a:p>
                 <a:r>
                   <a:rPr lang="en-GB" dirty="0"/>
-                  <a:t>Heartbeat signal from main micro</a:t>
+                  <a:t>Controls charge circuit</a:t>
                 </a:r>
+              </a:p>
+              <a:p>
+                <a:r>
+                  <a:rPr lang="en-GB" dirty="0"/>
+                  <a:t>Heartbeat signal from </a:t>
+                </a:r>
+                <a:r>
+                  <a:rPr lang="en-GB"/>
+                  <a:t>main micro</a:t>
+                </a:r>
+                <a:endParaRPr lang="en-GB" dirty="0"/>
               </a:p>
               <a:p>
                 <a:pPr lvl="1"/>
@@ -3898,7 +3712,7 @@
             </p:txBody>
           </p:sp>
         </mc:Choice>
-        <mc:Fallback>
+        <mc:Fallback xmlns="">
           <p:sp>
             <p:nvSpPr>
               <p:cNvPr id="3" name="Content Placeholder 2">
@@ -3919,7 +3733,7 @@
               <a:blipFill>
                 <a:blip r:embed="rId2"/>
                 <a:stretch>
-                  <a:fillRect l="-1043" t="-2241"/>
+                  <a:fillRect l="-1043" t="-3081" b="-3221"/>
                 </a:stretch>
               </a:blipFill>
             </p:spPr>
@@ -3981,169 +3795,7 @@
 </p:sld>
 </file>
 
-<file path=ppt/slides/slide5.xml><?xml version="1.0" encoding="utf-8"?>
-<p:sld xmlns:a="http://schemas.openxmlformats.org/drawingml/2006/main" xmlns:r="http://schemas.openxmlformats.org/officeDocument/2006/relationships" xmlns:p="http://schemas.openxmlformats.org/presentationml/2006/main">
-  <p:cSld>
-    <p:spTree>
-      <p:nvGrpSpPr>
-        <p:cNvPr id="1" name=""/>
-        <p:cNvGrpSpPr/>
-        <p:nvPr/>
-      </p:nvGrpSpPr>
-      <p:grpSpPr>
-        <a:xfrm>
-          <a:off x="0" y="0"/>
-          <a:ext cx="0" cy="0"/>
-          <a:chOff x="0" y="0"/>
-          <a:chExt cx="0" cy="0"/>
-        </a:xfrm>
-      </p:grpSpPr>
-      <p:sp>
-        <p:nvSpPr>
-          <p:cNvPr id="2" name="Title 1">
-            <a:extLst>
-              <a:ext uri="{FF2B5EF4-FFF2-40B4-BE49-F238E27FC236}">
-                <a16:creationId xmlns:a16="http://schemas.microsoft.com/office/drawing/2014/main" id="{37129C13-237D-4521-81BA-D7F55AD5B585}"/>
-              </a:ext>
-            </a:extLst>
-          </p:cNvPr>
-          <p:cNvSpPr>
-            <a:spLocks noGrp="1"/>
-          </p:cNvSpPr>
-          <p:nvPr>
-            <p:ph type="title"/>
-          </p:nvPr>
-        </p:nvSpPr>
-        <p:spPr/>
-        <p:txBody>
-          <a:bodyPr/>
-          <a:lstStyle/>
-          <a:p>
-            <a:r>
-              <a:rPr lang="en-GB" dirty="0"/>
-              <a:t>Battery charging</a:t>
-            </a:r>
-          </a:p>
-        </p:txBody>
-      </p:sp>
-      <p:sp>
-        <p:nvSpPr>
-          <p:cNvPr id="3" name="Content Placeholder 2">
-            <a:extLst>
-              <a:ext uri="{FF2B5EF4-FFF2-40B4-BE49-F238E27FC236}">
-                <a16:creationId xmlns:a16="http://schemas.microsoft.com/office/drawing/2014/main" id="{67871035-2C42-42A1-86FD-846461ADF945}"/>
-              </a:ext>
-            </a:extLst>
-          </p:cNvPr>
-          <p:cNvSpPr>
-            <a:spLocks noGrp="1"/>
-          </p:cNvSpPr>
-          <p:nvPr>
-            <p:ph idx="1"/>
-          </p:nvPr>
-        </p:nvSpPr>
-        <p:spPr/>
-        <p:txBody>
-          <a:bodyPr/>
-          <a:lstStyle/>
-          <a:p>
-            <a:r>
-              <a:rPr lang="en-GB" dirty="0"/>
-              <a:t>Lithium polymer can be dangerous:</a:t>
-            </a:r>
-          </a:p>
-          <a:p>
-            <a:pPr lvl="1"/>
-            <a:r>
-              <a:rPr lang="en-GB" dirty="0"/>
-              <a:t>Overcharging</a:t>
-            </a:r>
-          </a:p>
-          <a:p>
-            <a:pPr lvl="1"/>
-            <a:r>
-              <a:rPr lang="en-GB" dirty="0"/>
-              <a:t>Unbalanced charging</a:t>
-            </a:r>
-          </a:p>
-          <a:p>
-            <a:r>
-              <a:rPr lang="en-GB" dirty="0"/>
-              <a:t>Use an off the shelf solution</a:t>
-            </a:r>
-          </a:p>
-          <a:p>
-            <a:r>
-              <a:rPr lang="en-GB" dirty="0"/>
-              <a:t>Use hobby/RC charger</a:t>
-            </a:r>
-          </a:p>
-          <a:p>
-            <a:r>
-              <a:rPr lang="en-GB" dirty="0"/>
-              <a:t>Charge batteries in parallel</a:t>
-            </a:r>
-          </a:p>
-          <a:p>
-            <a:endParaRPr lang="en-GB" dirty="0"/>
-          </a:p>
-          <a:p>
-            <a:r>
-              <a:rPr lang="en-GB" dirty="0"/>
-              <a:t>Battery isolated from charger by MOSFET mux</a:t>
-            </a:r>
-          </a:p>
-          <a:p>
-            <a:endParaRPr lang="en-GB" dirty="0"/>
-          </a:p>
-          <a:p>
-            <a:endParaRPr lang="en-GB" dirty="0"/>
-          </a:p>
-        </p:txBody>
-      </p:sp>
-      <p:pic>
-        <p:nvPicPr>
-          <p:cNvPr id="6" name="Picture 5">
-            <a:extLst>
-              <a:ext uri="{FF2B5EF4-FFF2-40B4-BE49-F238E27FC236}">
-                <a16:creationId xmlns:a16="http://schemas.microsoft.com/office/drawing/2014/main" id="{38978E23-184E-43D4-927F-322B80564812}"/>
-              </a:ext>
-            </a:extLst>
-          </p:cNvPr>
-          <p:cNvPicPr>
-            <a:picLocks noChangeAspect="1"/>
-          </p:cNvPicPr>
-          <p:nvPr/>
-        </p:nvPicPr>
-        <p:blipFill rotWithShape="1">
-          <a:blip r:embed="rId2"/>
-          <a:srcRect l="1375"/>
-          <a:stretch/>
-        </p:blipFill>
-        <p:spPr>
-          <a:xfrm>
-            <a:off x="7055194" y="681037"/>
-            <a:ext cx="4525780" cy="3465767"/>
-          </a:xfrm>
-          <a:prstGeom prst="rect">
-            <a:avLst/>
-          </a:prstGeom>
-        </p:spPr>
-      </p:pic>
-    </p:spTree>
-    <p:extLst>
-      <p:ext uri="{BB962C8B-B14F-4D97-AF65-F5344CB8AC3E}">
-        <p14:creationId xmlns:p14="http://schemas.microsoft.com/office/powerpoint/2010/main" val="2721647380"/>
-      </p:ext>
-    </p:extLst>
-  </p:cSld>
-  <p:clrMapOvr>
-    <a:masterClrMapping/>
-  </p:clrMapOvr>
-</p:sld>
-</file>
-
-<file path=ppt/slides/slide6.xml><?xml version="1.0" encoding="utf-8"?>
+<file path=ppt/slides/slide12.xml><?xml version="1.0" encoding="utf-8"?>
 <p:sld xmlns:a="http://schemas.openxmlformats.org/drawingml/2006/main" xmlns:r="http://schemas.openxmlformats.org/officeDocument/2006/relationships" xmlns:p="http://schemas.openxmlformats.org/presentationml/2006/main">
   <p:cSld>
     <p:spTree>
@@ -4277,6 +3929,907 @@
 </p:sld>
 </file>
 
+<file path=ppt/slides/slide13.xml><?xml version="1.0" encoding="utf-8"?>
+<p:sld xmlns:a="http://schemas.openxmlformats.org/drawingml/2006/main" xmlns:r="http://schemas.openxmlformats.org/officeDocument/2006/relationships" xmlns:p="http://schemas.openxmlformats.org/presentationml/2006/main">
+  <p:cSld>
+    <p:spTree>
+      <p:nvGrpSpPr>
+        <p:cNvPr id="1" name=""/>
+        <p:cNvGrpSpPr/>
+        <p:nvPr/>
+      </p:nvGrpSpPr>
+      <p:grpSpPr>
+        <a:xfrm>
+          <a:off x="0" y="0"/>
+          <a:ext cx="0" cy="0"/>
+          <a:chOff x="0" y="0"/>
+          <a:chExt cx="0" cy="0"/>
+        </a:xfrm>
+      </p:grpSpPr>
+      <p:sp>
+        <p:nvSpPr>
+          <p:cNvPr id="2" name="Title 1">
+            <a:extLst>
+              <a:ext uri="{FF2B5EF4-FFF2-40B4-BE49-F238E27FC236}">
+                <a16:creationId xmlns:a16="http://schemas.microsoft.com/office/drawing/2014/main" id="{FE0F4796-51C8-49EF-98D8-8B5BA57E15CE}"/>
+              </a:ext>
+            </a:extLst>
+          </p:cNvPr>
+          <p:cNvSpPr>
+            <a:spLocks noGrp="1"/>
+          </p:cNvSpPr>
+          <p:nvPr>
+            <p:ph type="title"/>
+          </p:nvPr>
+        </p:nvSpPr>
+        <p:spPr/>
+        <p:txBody>
+          <a:bodyPr/>
+          <a:lstStyle/>
+          <a:p>
+            <a:r>
+              <a:rPr lang="en-GB" dirty="0"/>
+              <a:t>Battery mux	</a:t>
+            </a:r>
+          </a:p>
+        </p:txBody>
+      </p:sp>
+      <p:sp>
+        <p:nvSpPr>
+          <p:cNvPr id="3" name="Content Placeholder 2">
+            <a:extLst>
+              <a:ext uri="{FF2B5EF4-FFF2-40B4-BE49-F238E27FC236}">
+                <a16:creationId xmlns:a16="http://schemas.microsoft.com/office/drawing/2014/main" id="{B7847DB7-EF3F-4994-B4A2-71BE0D764F4A}"/>
+              </a:ext>
+            </a:extLst>
+          </p:cNvPr>
+          <p:cNvSpPr>
+            <a:spLocks noGrp="1"/>
+          </p:cNvSpPr>
+          <p:nvPr>
+            <p:ph idx="1"/>
+          </p:nvPr>
+        </p:nvSpPr>
+        <p:spPr/>
+        <p:txBody>
+          <a:bodyPr/>
+          <a:lstStyle/>
+          <a:p>
+            <a:r>
+              <a:rPr lang="en-GB" dirty="0"/>
+              <a:t>Two large batteries</a:t>
+            </a:r>
+          </a:p>
+          <a:p>
+            <a:pPr marL="0" indent="0">
+              <a:buNone/>
+            </a:pPr>
+            <a:r>
+              <a:rPr lang="en-GB" dirty="0"/>
+              <a:t>States:</a:t>
+            </a:r>
+          </a:p>
+          <a:p>
+            <a:pPr lvl="1"/>
+            <a:r>
+              <a:rPr lang="en-GB" dirty="0"/>
+              <a:t>Charge in parallel</a:t>
+            </a:r>
+          </a:p>
+          <a:p>
+            <a:pPr lvl="1"/>
+            <a:r>
+              <a:rPr lang="en-GB" dirty="0"/>
+              <a:t>Discharge in series</a:t>
+            </a:r>
+          </a:p>
+          <a:p>
+            <a:r>
+              <a:rPr lang="en-GB" dirty="0"/>
+              <a:t>Electrically controlled path switching</a:t>
+            </a:r>
+          </a:p>
+          <a:p>
+            <a:r>
+              <a:rPr lang="en-GB" dirty="0"/>
+              <a:t>Vibration resistant</a:t>
+            </a:r>
+          </a:p>
+          <a:p>
+            <a:r>
+              <a:rPr lang="en-GB" dirty="0"/>
+              <a:t>Short resistant</a:t>
+            </a:r>
+          </a:p>
+          <a:p>
+            <a:r>
+              <a:rPr lang="en-GB" dirty="0"/>
+              <a:t>Bidirectional current flow (balanced charging)</a:t>
+            </a:r>
+          </a:p>
+          <a:p>
+            <a:endParaRPr lang="en-GB" dirty="0"/>
+          </a:p>
+        </p:txBody>
+      </p:sp>
+    </p:spTree>
+    <p:extLst>
+      <p:ext uri="{BB962C8B-B14F-4D97-AF65-F5344CB8AC3E}">
+        <p14:creationId xmlns:p14="http://schemas.microsoft.com/office/powerpoint/2010/main" val="431821034"/>
+      </p:ext>
+    </p:extLst>
+  </p:cSld>
+  <p:clrMapOvr>
+    <a:masterClrMapping/>
+  </p:clrMapOvr>
+</p:sld>
+</file>
+
+<file path=ppt/slides/slide14.xml><?xml version="1.0" encoding="utf-8"?>
+<p:sld xmlns:a="http://schemas.openxmlformats.org/drawingml/2006/main" xmlns:r="http://schemas.openxmlformats.org/officeDocument/2006/relationships" xmlns:p="http://schemas.openxmlformats.org/presentationml/2006/main">
+  <p:cSld>
+    <p:spTree>
+      <p:nvGrpSpPr>
+        <p:cNvPr id="1" name=""/>
+        <p:cNvGrpSpPr/>
+        <p:nvPr/>
+      </p:nvGrpSpPr>
+      <p:grpSpPr>
+        <a:xfrm>
+          <a:off x="0" y="0"/>
+          <a:ext cx="0" cy="0"/>
+          <a:chOff x="0" y="0"/>
+          <a:chExt cx="0" cy="0"/>
+        </a:xfrm>
+      </p:grpSpPr>
+      <p:sp>
+        <p:nvSpPr>
+          <p:cNvPr id="2" name="Title 1">
+            <a:extLst>
+              <a:ext uri="{FF2B5EF4-FFF2-40B4-BE49-F238E27FC236}">
+                <a16:creationId xmlns:a16="http://schemas.microsoft.com/office/drawing/2014/main" id="{B9ADB3C6-0180-42C7-9291-81D283C2953E}"/>
+              </a:ext>
+            </a:extLst>
+          </p:cNvPr>
+          <p:cNvSpPr>
+            <a:spLocks noGrp="1"/>
+          </p:cNvSpPr>
+          <p:nvPr>
+            <p:ph type="title"/>
+          </p:nvPr>
+        </p:nvSpPr>
+        <p:spPr/>
+        <p:txBody>
+          <a:bodyPr/>
+          <a:lstStyle/>
+          <a:p>
+            <a:r>
+              <a:rPr lang="en-GB" dirty="0"/>
+              <a:t>Switching technology</a:t>
+            </a:r>
+          </a:p>
+        </p:txBody>
+      </p:sp>
+      <p:sp>
+        <p:nvSpPr>
+          <p:cNvPr id="3" name="Content Placeholder 2">
+            <a:extLst>
+              <a:ext uri="{FF2B5EF4-FFF2-40B4-BE49-F238E27FC236}">
+                <a16:creationId xmlns:a16="http://schemas.microsoft.com/office/drawing/2014/main" id="{F3AE64F4-03B2-4673-8BDD-84CA0ABF0AC7}"/>
+              </a:ext>
+            </a:extLst>
+          </p:cNvPr>
+          <p:cNvSpPr>
+            <a:spLocks noGrp="1"/>
+          </p:cNvSpPr>
+          <p:nvPr>
+            <p:ph idx="1"/>
+          </p:nvPr>
+        </p:nvSpPr>
+        <p:spPr>
+          <a:xfrm>
+            <a:off x="838200" y="1825625"/>
+            <a:ext cx="4748868" cy="4351338"/>
+          </a:xfrm>
+        </p:spPr>
+        <p:txBody>
+          <a:bodyPr/>
+          <a:lstStyle/>
+          <a:p>
+            <a:pPr marL="0" indent="0">
+              <a:buNone/>
+            </a:pPr>
+            <a:r>
+              <a:rPr lang="en-GB" dirty="0"/>
+              <a:t>Relay:</a:t>
+            </a:r>
+          </a:p>
+          <a:p>
+            <a:r>
+              <a:rPr lang="en-GB" dirty="0"/>
+              <a:t>Mechanical switch</a:t>
+            </a:r>
+          </a:p>
+          <a:p>
+            <a:r>
+              <a:rPr lang="en-GB" dirty="0"/>
+              <a:t>Very High voltage</a:t>
+            </a:r>
+          </a:p>
+          <a:p>
+            <a:r>
+              <a:rPr lang="en-GB" dirty="0"/>
+              <a:t>Very High current</a:t>
+            </a:r>
+          </a:p>
+          <a:p>
+            <a:r>
+              <a:rPr lang="en-GB" dirty="0"/>
+              <a:t>Low standby draw</a:t>
+            </a:r>
+          </a:p>
+          <a:p>
+            <a:endParaRPr lang="en-GB" dirty="0"/>
+          </a:p>
+          <a:p>
+            <a:endParaRPr lang="en-GB" dirty="0"/>
+          </a:p>
+        </p:txBody>
+      </p:sp>
+      <p:sp>
+        <p:nvSpPr>
+          <p:cNvPr id="4" name="Content Placeholder 2">
+            <a:extLst>
+              <a:ext uri="{FF2B5EF4-FFF2-40B4-BE49-F238E27FC236}">
+                <a16:creationId xmlns:a16="http://schemas.microsoft.com/office/drawing/2014/main" id="{80FCAF3B-D795-4829-8DBE-A7553CCAA8E5}"/>
+              </a:ext>
+            </a:extLst>
+          </p:cNvPr>
+          <p:cNvSpPr txBox="1">
+            <a:spLocks/>
+          </p:cNvSpPr>
+          <p:nvPr/>
+        </p:nvSpPr>
+        <p:spPr>
+          <a:xfrm>
+            <a:off x="6292442" y="1825625"/>
+            <a:ext cx="4748868" cy="4351338"/>
+          </a:xfrm>
+          <a:prstGeom prst="rect">
+            <a:avLst/>
+          </a:prstGeom>
+        </p:spPr>
+        <p:txBody>
+          <a:bodyPr vert="horz" lIns="91440" tIns="45720" rIns="91440" bIns="45720" rtlCol="0">
+            <a:normAutofit/>
+          </a:bodyPr>
+          <a:lstStyle>
+            <a:lvl1pPr marL="228600" indent="-228600" algn="l" defTabSz="914400" rtl="0" eaLnBrk="1" latinLnBrk="0" hangingPunct="1">
+              <a:lnSpc>
+                <a:spcPct val="90000"/>
+              </a:lnSpc>
+              <a:spcBef>
+                <a:spcPts val="1000"/>
+              </a:spcBef>
+              <a:buFont typeface="Arial" panose="020B0604020202020204" pitchFamily="34" charset="0"/>
+              <a:buChar char="•"/>
+              <a:defRPr sz="2800" kern="1200">
+                <a:solidFill>
+                  <a:schemeClr val="tx1"/>
+                </a:solidFill>
+                <a:latin typeface="+mn-lt"/>
+                <a:ea typeface="+mn-ea"/>
+                <a:cs typeface="+mn-cs"/>
+              </a:defRPr>
+            </a:lvl1pPr>
+            <a:lvl2pPr marL="685800" indent="-228600" algn="l" defTabSz="914400" rtl="0" eaLnBrk="1" latinLnBrk="0" hangingPunct="1">
+              <a:lnSpc>
+                <a:spcPct val="90000"/>
+              </a:lnSpc>
+              <a:spcBef>
+                <a:spcPts val="500"/>
+              </a:spcBef>
+              <a:buFont typeface="Arial" panose="020B0604020202020204" pitchFamily="34" charset="0"/>
+              <a:buChar char="•"/>
+              <a:defRPr sz="2400" kern="1200">
+                <a:solidFill>
+                  <a:schemeClr val="tx1"/>
+                </a:solidFill>
+                <a:latin typeface="+mn-lt"/>
+                <a:ea typeface="+mn-ea"/>
+                <a:cs typeface="+mn-cs"/>
+              </a:defRPr>
+            </a:lvl2pPr>
+            <a:lvl3pPr marL="1143000" indent="-228600" algn="l" defTabSz="914400" rtl="0" eaLnBrk="1" latinLnBrk="0" hangingPunct="1">
+              <a:lnSpc>
+                <a:spcPct val="90000"/>
+              </a:lnSpc>
+              <a:spcBef>
+                <a:spcPts val="500"/>
+              </a:spcBef>
+              <a:buFont typeface="Arial" panose="020B0604020202020204" pitchFamily="34" charset="0"/>
+              <a:buChar char="•"/>
+              <a:defRPr sz="2000" kern="1200">
+                <a:solidFill>
+                  <a:schemeClr val="tx1"/>
+                </a:solidFill>
+                <a:latin typeface="+mn-lt"/>
+                <a:ea typeface="+mn-ea"/>
+                <a:cs typeface="+mn-cs"/>
+              </a:defRPr>
+            </a:lvl3pPr>
+            <a:lvl4pPr marL="1600200" indent="-228600" algn="l" defTabSz="914400" rtl="0" eaLnBrk="1" latinLnBrk="0" hangingPunct="1">
+              <a:lnSpc>
+                <a:spcPct val="90000"/>
+              </a:lnSpc>
+              <a:spcBef>
+                <a:spcPts val="500"/>
+              </a:spcBef>
+              <a:buFont typeface="Arial" panose="020B0604020202020204" pitchFamily="34" charset="0"/>
+              <a:buChar char="•"/>
+              <a:defRPr sz="1800" kern="1200">
+                <a:solidFill>
+                  <a:schemeClr val="tx1"/>
+                </a:solidFill>
+                <a:latin typeface="+mn-lt"/>
+                <a:ea typeface="+mn-ea"/>
+                <a:cs typeface="+mn-cs"/>
+              </a:defRPr>
+            </a:lvl4pPr>
+            <a:lvl5pPr marL="2057400" indent="-228600" algn="l" defTabSz="914400" rtl="0" eaLnBrk="1" latinLnBrk="0" hangingPunct="1">
+              <a:lnSpc>
+                <a:spcPct val="90000"/>
+              </a:lnSpc>
+              <a:spcBef>
+                <a:spcPts val="500"/>
+              </a:spcBef>
+              <a:buFont typeface="Arial" panose="020B0604020202020204" pitchFamily="34" charset="0"/>
+              <a:buChar char="•"/>
+              <a:defRPr sz="1800" kern="1200">
+                <a:solidFill>
+                  <a:schemeClr val="tx1"/>
+                </a:solidFill>
+                <a:latin typeface="+mn-lt"/>
+                <a:ea typeface="+mn-ea"/>
+                <a:cs typeface="+mn-cs"/>
+              </a:defRPr>
+            </a:lvl5pPr>
+            <a:lvl6pPr marL="2514600" indent="-228600" algn="l" defTabSz="914400" rtl="0" eaLnBrk="1" latinLnBrk="0" hangingPunct="1">
+              <a:lnSpc>
+                <a:spcPct val="90000"/>
+              </a:lnSpc>
+              <a:spcBef>
+                <a:spcPts val="500"/>
+              </a:spcBef>
+              <a:buFont typeface="Arial" panose="020B0604020202020204" pitchFamily="34" charset="0"/>
+              <a:buChar char="•"/>
+              <a:defRPr sz="1800" kern="1200">
+                <a:solidFill>
+                  <a:schemeClr val="tx1"/>
+                </a:solidFill>
+                <a:latin typeface="+mn-lt"/>
+                <a:ea typeface="+mn-ea"/>
+                <a:cs typeface="+mn-cs"/>
+              </a:defRPr>
+            </a:lvl6pPr>
+            <a:lvl7pPr marL="2971800" indent="-228600" algn="l" defTabSz="914400" rtl="0" eaLnBrk="1" latinLnBrk="0" hangingPunct="1">
+              <a:lnSpc>
+                <a:spcPct val="90000"/>
+              </a:lnSpc>
+              <a:spcBef>
+                <a:spcPts val="500"/>
+              </a:spcBef>
+              <a:buFont typeface="Arial" panose="020B0604020202020204" pitchFamily="34" charset="0"/>
+              <a:buChar char="•"/>
+              <a:defRPr sz="1800" kern="1200">
+                <a:solidFill>
+                  <a:schemeClr val="tx1"/>
+                </a:solidFill>
+                <a:latin typeface="+mn-lt"/>
+                <a:ea typeface="+mn-ea"/>
+                <a:cs typeface="+mn-cs"/>
+              </a:defRPr>
+            </a:lvl7pPr>
+            <a:lvl8pPr marL="3429000" indent="-228600" algn="l" defTabSz="914400" rtl="0" eaLnBrk="1" latinLnBrk="0" hangingPunct="1">
+              <a:lnSpc>
+                <a:spcPct val="90000"/>
+              </a:lnSpc>
+              <a:spcBef>
+                <a:spcPts val="500"/>
+              </a:spcBef>
+              <a:buFont typeface="Arial" panose="020B0604020202020204" pitchFamily="34" charset="0"/>
+              <a:buChar char="•"/>
+              <a:defRPr sz="1800" kern="1200">
+                <a:solidFill>
+                  <a:schemeClr val="tx1"/>
+                </a:solidFill>
+                <a:latin typeface="+mn-lt"/>
+                <a:ea typeface="+mn-ea"/>
+                <a:cs typeface="+mn-cs"/>
+              </a:defRPr>
+            </a:lvl8pPr>
+            <a:lvl9pPr marL="3886200" indent="-228600" algn="l" defTabSz="914400" rtl="0" eaLnBrk="1" latinLnBrk="0" hangingPunct="1">
+              <a:lnSpc>
+                <a:spcPct val="90000"/>
+              </a:lnSpc>
+              <a:spcBef>
+                <a:spcPts val="500"/>
+              </a:spcBef>
+              <a:buFont typeface="Arial" panose="020B0604020202020204" pitchFamily="34" charset="0"/>
+              <a:buChar char="•"/>
+              <a:defRPr sz="1800" kern="1200">
+                <a:solidFill>
+                  <a:schemeClr val="tx1"/>
+                </a:solidFill>
+                <a:latin typeface="+mn-lt"/>
+                <a:ea typeface="+mn-ea"/>
+                <a:cs typeface="+mn-cs"/>
+              </a:defRPr>
+            </a:lvl9pPr>
+          </a:lstStyle>
+          <a:p>
+            <a:pPr marL="0" indent="0">
+              <a:buNone/>
+            </a:pPr>
+            <a:r>
+              <a:rPr lang="en-GB" dirty="0"/>
+              <a:t>Bipolar power switch(BPS):</a:t>
+            </a:r>
+          </a:p>
+          <a:p>
+            <a:r>
+              <a:rPr lang="en-GB" dirty="0"/>
+              <a:t>Solid state system</a:t>
+            </a:r>
+          </a:p>
+          <a:p>
+            <a:r>
+              <a:rPr lang="en-GB" dirty="0"/>
+              <a:t>MOSFET switching</a:t>
+            </a:r>
+          </a:p>
+          <a:p>
+            <a:r>
+              <a:rPr lang="en-GB" dirty="0"/>
+              <a:t>Higher power dissipation</a:t>
+            </a:r>
+          </a:p>
+          <a:p>
+            <a:r>
+              <a:rPr lang="en-GB" dirty="0"/>
+              <a:t>Fast switching</a:t>
+            </a:r>
+          </a:p>
+        </p:txBody>
+      </p:sp>
+    </p:spTree>
+    <p:extLst>
+      <p:ext uri="{BB962C8B-B14F-4D97-AF65-F5344CB8AC3E}">
+        <p14:creationId xmlns:p14="http://schemas.microsoft.com/office/powerpoint/2010/main" val="3038464115"/>
+      </p:ext>
+    </p:extLst>
+  </p:cSld>
+  <p:clrMapOvr>
+    <a:masterClrMapping/>
+  </p:clrMapOvr>
+</p:sld>
+</file>
+
+<file path=ppt/slides/slide2.xml><?xml version="1.0" encoding="utf-8"?>
+<p:sld xmlns:a="http://schemas.openxmlformats.org/drawingml/2006/main" xmlns:r="http://schemas.openxmlformats.org/officeDocument/2006/relationships" xmlns:p="http://schemas.openxmlformats.org/presentationml/2006/main">
+  <p:cSld>
+    <p:spTree>
+      <p:nvGrpSpPr>
+        <p:cNvPr id="1" name=""/>
+        <p:cNvGrpSpPr/>
+        <p:nvPr/>
+      </p:nvGrpSpPr>
+      <p:grpSpPr>
+        <a:xfrm>
+          <a:off x="0" y="0"/>
+          <a:ext cx="0" cy="0"/>
+          <a:chOff x="0" y="0"/>
+          <a:chExt cx="0" cy="0"/>
+        </a:xfrm>
+      </p:grpSpPr>
+      <p:sp>
+        <p:nvSpPr>
+          <p:cNvPr id="2" name="Title 1">
+            <a:extLst>
+              <a:ext uri="{FF2B5EF4-FFF2-40B4-BE49-F238E27FC236}">
+                <a16:creationId xmlns:a16="http://schemas.microsoft.com/office/drawing/2014/main" id="{87F95180-E0DA-4CA2-BA61-0FC2BB0738A1}"/>
+              </a:ext>
+            </a:extLst>
+          </p:cNvPr>
+          <p:cNvSpPr>
+            <a:spLocks noGrp="1"/>
+          </p:cNvSpPr>
+          <p:nvPr>
+            <p:ph type="title"/>
+          </p:nvPr>
+        </p:nvSpPr>
+        <p:spPr/>
+        <p:txBody>
+          <a:bodyPr/>
+          <a:lstStyle/>
+          <a:p>
+            <a:r>
+              <a:rPr lang="en-GB" dirty="0"/>
+              <a:t>Into - toby</a:t>
+            </a:r>
+          </a:p>
+        </p:txBody>
+      </p:sp>
+      <p:sp>
+        <p:nvSpPr>
+          <p:cNvPr id="3" name="Content Placeholder 2">
+            <a:extLst>
+              <a:ext uri="{FF2B5EF4-FFF2-40B4-BE49-F238E27FC236}">
+                <a16:creationId xmlns:a16="http://schemas.microsoft.com/office/drawing/2014/main" id="{9F1D8DE5-1BA7-4DCC-BB90-D0359564455C}"/>
+              </a:ext>
+            </a:extLst>
+          </p:cNvPr>
+          <p:cNvSpPr>
+            <a:spLocks noGrp="1"/>
+          </p:cNvSpPr>
+          <p:nvPr>
+            <p:ph idx="1"/>
+          </p:nvPr>
+        </p:nvSpPr>
+        <p:spPr/>
+        <p:txBody>
+          <a:bodyPr/>
+          <a:lstStyle/>
+          <a:p>
+            <a:endParaRPr lang="en-GB"/>
+          </a:p>
+        </p:txBody>
+      </p:sp>
+    </p:spTree>
+    <p:extLst>
+      <p:ext uri="{BB962C8B-B14F-4D97-AF65-F5344CB8AC3E}">
+        <p14:creationId xmlns:p14="http://schemas.microsoft.com/office/powerpoint/2010/main" val="275639994"/>
+      </p:ext>
+    </p:extLst>
+  </p:cSld>
+  <p:clrMapOvr>
+    <a:masterClrMapping/>
+  </p:clrMapOvr>
+</p:sld>
+</file>
+
+<file path=ppt/slides/slide3.xml><?xml version="1.0" encoding="utf-8"?>
+<p:sld xmlns:a="http://schemas.openxmlformats.org/drawingml/2006/main" xmlns:r="http://schemas.openxmlformats.org/officeDocument/2006/relationships" xmlns:p="http://schemas.openxmlformats.org/presentationml/2006/main">
+  <p:cSld>
+    <p:spTree>
+      <p:nvGrpSpPr>
+        <p:cNvPr id="1" name=""/>
+        <p:cNvGrpSpPr/>
+        <p:nvPr/>
+      </p:nvGrpSpPr>
+      <p:grpSpPr>
+        <a:xfrm>
+          <a:off x="0" y="0"/>
+          <a:ext cx="0" cy="0"/>
+          <a:chOff x="0" y="0"/>
+          <a:chExt cx="0" cy="0"/>
+        </a:xfrm>
+      </p:grpSpPr>
+      <p:sp>
+        <p:nvSpPr>
+          <p:cNvPr id="2" name="Title 1">
+            <a:extLst>
+              <a:ext uri="{FF2B5EF4-FFF2-40B4-BE49-F238E27FC236}">
+                <a16:creationId xmlns:a16="http://schemas.microsoft.com/office/drawing/2014/main" id="{16E1419E-1881-49D7-A695-3E923D925BB6}"/>
+              </a:ext>
+            </a:extLst>
+          </p:cNvPr>
+          <p:cNvSpPr>
+            <a:spLocks noGrp="1"/>
+          </p:cNvSpPr>
+          <p:nvPr>
+            <p:ph type="title"/>
+          </p:nvPr>
+        </p:nvSpPr>
+        <p:spPr/>
+        <p:txBody>
+          <a:bodyPr/>
+          <a:lstStyle/>
+          <a:p>
+            <a:r>
+              <a:rPr lang="en-GB" dirty="0"/>
+              <a:t>BOARD - ED</a:t>
+            </a:r>
+          </a:p>
+        </p:txBody>
+      </p:sp>
+      <p:sp>
+        <p:nvSpPr>
+          <p:cNvPr id="3" name="Content Placeholder 2">
+            <a:extLst>
+              <a:ext uri="{FF2B5EF4-FFF2-40B4-BE49-F238E27FC236}">
+                <a16:creationId xmlns:a16="http://schemas.microsoft.com/office/drawing/2014/main" id="{3B1C41F3-4EF7-41FB-8FE4-436C725FB87F}"/>
+              </a:ext>
+            </a:extLst>
+          </p:cNvPr>
+          <p:cNvSpPr>
+            <a:spLocks noGrp="1"/>
+          </p:cNvSpPr>
+          <p:nvPr>
+            <p:ph idx="1"/>
+          </p:nvPr>
+        </p:nvSpPr>
+        <p:spPr/>
+        <p:txBody>
+          <a:bodyPr/>
+          <a:lstStyle/>
+          <a:p>
+            <a:endParaRPr lang="en-GB"/>
+          </a:p>
+        </p:txBody>
+      </p:sp>
+    </p:spTree>
+    <p:extLst>
+      <p:ext uri="{BB962C8B-B14F-4D97-AF65-F5344CB8AC3E}">
+        <p14:creationId xmlns:p14="http://schemas.microsoft.com/office/powerpoint/2010/main" val="1177586150"/>
+      </p:ext>
+    </p:extLst>
+  </p:cSld>
+  <p:clrMapOvr>
+    <a:masterClrMapping/>
+  </p:clrMapOvr>
+</p:sld>
+</file>
+
+<file path=ppt/slides/slide4.xml><?xml version="1.0" encoding="utf-8"?>
+<p:sld xmlns:a="http://schemas.openxmlformats.org/drawingml/2006/main" xmlns:r="http://schemas.openxmlformats.org/officeDocument/2006/relationships" xmlns:p="http://schemas.openxmlformats.org/presentationml/2006/main">
+  <p:cSld>
+    <p:spTree>
+      <p:nvGrpSpPr>
+        <p:cNvPr id="1" name=""/>
+        <p:cNvGrpSpPr/>
+        <p:nvPr/>
+      </p:nvGrpSpPr>
+      <p:grpSpPr>
+        <a:xfrm>
+          <a:off x="0" y="0"/>
+          <a:ext cx="0" cy="0"/>
+          <a:chOff x="0" y="0"/>
+          <a:chExt cx="0" cy="0"/>
+        </a:xfrm>
+      </p:grpSpPr>
+      <p:sp>
+        <p:nvSpPr>
+          <p:cNvPr id="2" name="Title 1">
+            <a:extLst>
+              <a:ext uri="{FF2B5EF4-FFF2-40B4-BE49-F238E27FC236}">
+                <a16:creationId xmlns:a16="http://schemas.microsoft.com/office/drawing/2014/main" id="{4F7200DE-032E-48FD-8334-F93B5DE71996}"/>
+              </a:ext>
+            </a:extLst>
+          </p:cNvPr>
+          <p:cNvSpPr>
+            <a:spLocks noGrp="1"/>
+          </p:cNvSpPr>
+          <p:nvPr>
+            <p:ph type="title"/>
+          </p:nvPr>
+        </p:nvSpPr>
+        <p:spPr/>
+        <p:txBody>
+          <a:bodyPr/>
+          <a:lstStyle/>
+          <a:p>
+            <a:r>
+              <a:rPr lang="en-GB" dirty="0"/>
+              <a:t>TRUCKS - TOBY</a:t>
+            </a:r>
+          </a:p>
+        </p:txBody>
+      </p:sp>
+      <p:sp>
+        <p:nvSpPr>
+          <p:cNvPr id="3" name="Content Placeholder 2">
+            <a:extLst>
+              <a:ext uri="{FF2B5EF4-FFF2-40B4-BE49-F238E27FC236}">
+                <a16:creationId xmlns:a16="http://schemas.microsoft.com/office/drawing/2014/main" id="{CE0BD0BB-3E09-46CF-8A28-1943386FEC0F}"/>
+              </a:ext>
+            </a:extLst>
+          </p:cNvPr>
+          <p:cNvSpPr>
+            <a:spLocks noGrp="1"/>
+          </p:cNvSpPr>
+          <p:nvPr>
+            <p:ph idx="1"/>
+          </p:nvPr>
+        </p:nvSpPr>
+        <p:spPr/>
+        <p:txBody>
+          <a:bodyPr/>
+          <a:lstStyle/>
+          <a:p>
+            <a:endParaRPr lang="en-GB"/>
+          </a:p>
+        </p:txBody>
+      </p:sp>
+    </p:spTree>
+    <p:extLst>
+      <p:ext uri="{BB962C8B-B14F-4D97-AF65-F5344CB8AC3E}">
+        <p14:creationId xmlns:p14="http://schemas.microsoft.com/office/powerpoint/2010/main" val="3459229785"/>
+      </p:ext>
+    </p:extLst>
+  </p:cSld>
+  <p:clrMapOvr>
+    <a:masterClrMapping/>
+  </p:clrMapOvr>
+</p:sld>
+</file>
+
+<file path=ppt/slides/slide5.xml><?xml version="1.0" encoding="utf-8"?>
+<p:sld xmlns:a="http://schemas.openxmlformats.org/drawingml/2006/main" xmlns:r="http://schemas.openxmlformats.org/officeDocument/2006/relationships" xmlns:p="http://schemas.openxmlformats.org/presentationml/2006/main">
+  <p:cSld>
+    <p:spTree>
+      <p:nvGrpSpPr>
+        <p:cNvPr id="1" name=""/>
+        <p:cNvGrpSpPr/>
+        <p:nvPr/>
+      </p:nvGrpSpPr>
+      <p:grpSpPr>
+        <a:xfrm>
+          <a:off x="0" y="0"/>
+          <a:ext cx="0" cy="0"/>
+          <a:chOff x="0" y="0"/>
+          <a:chExt cx="0" cy="0"/>
+        </a:xfrm>
+      </p:grpSpPr>
+      <p:sp>
+        <p:nvSpPr>
+          <p:cNvPr id="2" name="Title 1">
+            <a:extLst>
+              <a:ext uri="{FF2B5EF4-FFF2-40B4-BE49-F238E27FC236}">
+                <a16:creationId xmlns:a16="http://schemas.microsoft.com/office/drawing/2014/main" id="{23179417-7B3A-4B85-92FD-69E7E95D03A0}"/>
+              </a:ext>
+            </a:extLst>
+          </p:cNvPr>
+          <p:cNvSpPr>
+            <a:spLocks noGrp="1"/>
+          </p:cNvSpPr>
+          <p:nvPr>
+            <p:ph type="title"/>
+          </p:nvPr>
+        </p:nvSpPr>
+        <p:spPr/>
+        <p:txBody>
+          <a:bodyPr/>
+          <a:lstStyle/>
+          <a:p>
+            <a:r>
+              <a:rPr lang="en-GB" dirty="0"/>
+              <a:t>Wheels - HUGO</a:t>
+            </a:r>
+          </a:p>
+        </p:txBody>
+      </p:sp>
+      <p:sp>
+        <p:nvSpPr>
+          <p:cNvPr id="3" name="Content Placeholder 2">
+            <a:extLst>
+              <a:ext uri="{FF2B5EF4-FFF2-40B4-BE49-F238E27FC236}">
+                <a16:creationId xmlns:a16="http://schemas.microsoft.com/office/drawing/2014/main" id="{FBF7D434-3D6C-409F-BDDF-960525912722}"/>
+              </a:ext>
+            </a:extLst>
+          </p:cNvPr>
+          <p:cNvSpPr>
+            <a:spLocks noGrp="1"/>
+          </p:cNvSpPr>
+          <p:nvPr>
+            <p:ph idx="1"/>
+          </p:nvPr>
+        </p:nvSpPr>
+        <p:spPr/>
+        <p:txBody>
+          <a:bodyPr/>
+          <a:lstStyle/>
+          <a:p>
+            <a:endParaRPr lang="en-GB"/>
+          </a:p>
+        </p:txBody>
+      </p:sp>
+    </p:spTree>
+    <p:extLst>
+      <p:ext uri="{BB962C8B-B14F-4D97-AF65-F5344CB8AC3E}">
+        <p14:creationId xmlns:p14="http://schemas.microsoft.com/office/powerpoint/2010/main" val="2605612958"/>
+      </p:ext>
+    </p:extLst>
+  </p:cSld>
+  <p:clrMapOvr>
+    <a:masterClrMapping/>
+  </p:clrMapOvr>
+</p:sld>
+</file>
+
+<file path=ppt/slides/slide6.xml><?xml version="1.0" encoding="utf-8"?>
+<p:sld xmlns:a="http://schemas.openxmlformats.org/drawingml/2006/main" xmlns:r="http://schemas.openxmlformats.org/officeDocument/2006/relationships" xmlns:p="http://schemas.openxmlformats.org/presentationml/2006/main">
+  <p:cSld>
+    <p:spTree>
+      <p:nvGrpSpPr>
+        <p:cNvPr id="1" name=""/>
+        <p:cNvGrpSpPr/>
+        <p:nvPr/>
+      </p:nvGrpSpPr>
+      <p:grpSpPr>
+        <a:xfrm>
+          <a:off x="0" y="0"/>
+          <a:ext cx="0" cy="0"/>
+          <a:chOff x="0" y="0"/>
+          <a:chExt cx="0" cy="0"/>
+        </a:xfrm>
+      </p:grpSpPr>
+      <p:sp>
+        <p:nvSpPr>
+          <p:cNvPr id="2" name="Title 1">
+            <a:extLst>
+              <a:ext uri="{FF2B5EF4-FFF2-40B4-BE49-F238E27FC236}">
+                <a16:creationId xmlns:a16="http://schemas.microsoft.com/office/drawing/2014/main" id="{5A5E529B-DFE6-4189-8C9D-83663736760C}"/>
+              </a:ext>
+            </a:extLst>
+          </p:cNvPr>
+          <p:cNvSpPr>
+            <a:spLocks noGrp="1"/>
+          </p:cNvSpPr>
+          <p:nvPr>
+            <p:ph type="title"/>
+          </p:nvPr>
+        </p:nvSpPr>
+        <p:spPr/>
+        <p:txBody>
+          <a:bodyPr/>
+          <a:lstStyle/>
+          <a:p>
+            <a:r>
+              <a:rPr lang="en-GB" dirty="0"/>
+              <a:t>Battery – SAM</a:t>
+            </a:r>
+          </a:p>
+        </p:txBody>
+      </p:sp>
+      <p:sp>
+        <p:nvSpPr>
+          <p:cNvPr id="3" name="Content Placeholder 2">
+            <a:extLst>
+              <a:ext uri="{FF2B5EF4-FFF2-40B4-BE49-F238E27FC236}">
+                <a16:creationId xmlns:a16="http://schemas.microsoft.com/office/drawing/2014/main" id="{1F2F5A3D-399D-42E6-B9E6-1FB08B63D0D2}"/>
+              </a:ext>
+            </a:extLst>
+          </p:cNvPr>
+          <p:cNvSpPr>
+            <a:spLocks noGrp="1"/>
+          </p:cNvSpPr>
+          <p:nvPr>
+            <p:ph idx="1"/>
+          </p:nvPr>
+        </p:nvSpPr>
+        <p:spPr/>
+        <p:txBody>
+          <a:bodyPr/>
+          <a:lstStyle/>
+          <a:p>
+            <a:endParaRPr lang="en-GB" dirty="0"/>
+          </a:p>
+        </p:txBody>
+      </p:sp>
+    </p:spTree>
+    <p:extLst>
+      <p:ext uri="{BB962C8B-B14F-4D97-AF65-F5344CB8AC3E}">
+        <p14:creationId xmlns:p14="http://schemas.microsoft.com/office/powerpoint/2010/main" val="693304522"/>
+      </p:ext>
+    </p:extLst>
+  </p:cSld>
+  <p:clrMapOvr>
+    <a:masterClrMapping/>
+  </p:clrMapOvr>
+</p:sld>
+</file>
+
 <file path=ppt/slides/slide7.xml><?xml version="1.0" encoding="utf-8"?>
 <p:sld xmlns:a="http://schemas.openxmlformats.org/drawingml/2006/main" xmlns:r="http://schemas.openxmlformats.org/officeDocument/2006/relationships" xmlns:p="http://schemas.openxmlformats.org/presentationml/2006/main">
   <p:cSld>
@@ -4299,7 +4852,7 @@
           <p:cNvPr id="2" name="Title 1">
             <a:extLst>
               <a:ext uri="{FF2B5EF4-FFF2-40B4-BE49-F238E27FC236}">
-                <a16:creationId xmlns:a16="http://schemas.microsoft.com/office/drawing/2014/main" id="{FE0F4796-51C8-49EF-98D8-8B5BA57E15CE}"/>
+                <a16:creationId xmlns:a16="http://schemas.microsoft.com/office/drawing/2014/main" id="{0E5B7271-3723-49ED-A2DA-31D2BA410DEE}"/>
               </a:ext>
             </a:extLst>
           </p:cNvPr>
@@ -4317,11 +4870,7 @@
           <a:p>
             <a:r>
               <a:rPr lang="en-GB" dirty="0"/>
-              <a:t>Battery </a:t>
-            </a:r>
-            <a:r>
-              <a:rPr lang="en-GB"/>
-              <a:t>control circuit</a:t>
+              <a:t>Range specification</a:t>
             </a:r>
           </a:p>
         </p:txBody>
@@ -4331,7 +4880,7 @@
           <p:cNvPr id="3" name="Content Placeholder 2">
             <a:extLst>
               <a:ext uri="{FF2B5EF4-FFF2-40B4-BE49-F238E27FC236}">
-                <a16:creationId xmlns:a16="http://schemas.microsoft.com/office/drawing/2014/main" id="{B7847DB7-EF3F-4994-B4A2-71BE0D764F4A}"/>
+                <a16:creationId xmlns:a16="http://schemas.microsoft.com/office/drawing/2014/main" id="{AA7F8B67-E3A2-43A1-80EB-39942E5EBA00}"/>
               </a:ext>
             </a:extLst>
           </p:cNvPr>
@@ -4344,17 +4893,404 @@
         </p:nvSpPr>
         <p:spPr/>
         <p:txBody>
-          <a:bodyPr/>
-          <a:lstStyle/>
-          <a:p>
-            <a:endParaRPr lang="en-GB"/>
+          <a:bodyPr>
+            <a:normAutofit lnSpcReduction="10000"/>
+          </a:bodyPr>
+          <a:lstStyle/>
+          <a:p>
+            <a:pPr marL="0" indent="0">
+              <a:buNone/>
+            </a:pPr>
+            <a:r>
+              <a:rPr lang="en-GB" sz="3200" dirty="0"/>
+              <a:t>Specification</a:t>
+            </a:r>
+          </a:p>
+          <a:p>
+            <a:r>
+              <a:rPr lang="en-GB" sz="3200" dirty="0"/>
+              <a:t>Charge every week (7 days)</a:t>
+            </a:r>
+          </a:p>
+          <a:p>
+            <a:r>
+              <a:rPr lang="en-GB" sz="3200" dirty="0"/>
+              <a:t>Days being used:5 days (commute)</a:t>
+            </a:r>
+          </a:p>
+          <a:p>
+            <a:r>
+              <a:rPr lang="en-GB" sz="3200" dirty="0"/>
+              <a:t>Distance each day: 3km </a:t>
+            </a:r>
+          </a:p>
+          <a:p>
+            <a:r>
+              <a:rPr lang="en-GB" sz="3200" dirty="0"/>
+              <a:t>Estimated vertical distance: 80m</a:t>
+            </a:r>
+          </a:p>
+          <a:p>
+            <a:pPr marL="0" indent="0">
+              <a:buNone/>
+            </a:pPr>
+            <a:endParaRPr lang="en-GB" sz="3200" dirty="0"/>
+          </a:p>
+          <a:p>
+            <a:pPr marL="0" indent="0">
+              <a:buNone/>
+            </a:pPr>
+            <a:r>
+              <a:rPr lang="en-GB" sz="3200" dirty="0"/>
+              <a:t>This means:</a:t>
+            </a:r>
+          </a:p>
+          <a:p>
+            <a:r>
+              <a:rPr lang="en-GB" sz="3200" dirty="0"/>
+              <a:t>Estimated Watt-hours per mile: 10Wh/mile</a:t>
+            </a:r>
+          </a:p>
+          <a:p>
+            <a:endParaRPr lang="en-GB" sz="3200" dirty="0"/>
+          </a:p>
+          <a:p>
+            <a:endParaRPr lang="en-GB" sz="3200" dirty="0"/>
           </a:p>
         </p:txBody>
       </p:sp>
     </p:spTree>
     <p:extLst>
       <p:ext uri="{BB962C8B-B14F-4D97-AF65-F5344CB8AC3E}">
-        <p14:creationId xmlns:p14="http://schemas.microsoft.com/office/powerpoint/2010/main" val="431821034"/>
+        <p14:creationId xmlns:p14="http://schemas.microsoft.com/office/powerpoint/2010/main" val="2271532738"/>
+      </p:ext>
+    </p:extLst>
+  </p:cSld>
+  <p:clrMapOvr>
+    <a:masterClrMapping/>
+  </p:clrMapOvr>
+</p:sld>
+</file>
+
+<file path=ppt/slides/slide8.xml><?xml version="1.0" encoding="utf-8"?>
+<p:sld xmlns:a="http://schemas.openxmlformats.org/drawingml/2006/main" xmlns:r="http://schemas.openxmlformats.org/officeDocument/2006/relationships" xmlns:p="http://schemas.openxmlformats.org/presentationml/2006/main">
+  <p:cSld>
+    <p:spTree>
+      <p:nvGrpSpPr>
+        <p:cNvPr id="1" name=""/>
+        <p:cNvGrpSpPr/>
+        <p:nvPr/>
+      </p:nvGrpSpPr>
+      <p:grpSpPr>
+        <a:xfrm>
+          <a:off x="0" y="0"/>
+          <a:ext cx="0" cy="0"/>
+          <a:chOff x="0" y="0"/>
+          <a:chExt cx="0" cy="0"/>
+        </a:xfrm>
+      </p:grpSpPr>
+      <p:sp>
+        <p:nvSpPr>
+          <p:cNvPr id="2" name="Title 1">
+            <a:extLst>
+              <a:ext uri="{FF2B5EF4-FFF2-40B4-BE49-F238E27FC236}">
+                <a16:creationId xmlns:a16="http://schemas.microsoft.com/office/drawing/2014/main" id="{673FF3E4-F450-44AE-80B0-AF79C50B5E10}"/>
+              </a:ext>
+            </a:extLst>
+          </p:cNvPr>
+          <p:cNvSpPr>
+            <a:spLocks noGrp="1"/>
+          </p:cNvSpPr>
+          <p:nvPr>
+            <p:ph type="title"/>
+          </p:nvPr>
+        </p:nvSpPr>
+        <p:spPr/>
+        <p:txBody>
+          <a:bodyPr/>
+          <a:lstStyle/>
+          <a:p>
+            <a:r>
+              <a:rPr lang="en-GB" dirty="0"/>
+              <a:t>Battery specification</a:t>
+            </a:r>
+          </a:p>
+        </p:txBody>
+      </p:sp>
+      <p:sp>
+        <p:nvSpPr>
+          <p:cNvPr id="3" name="Content Placeholder 2">
+            <a:extLst>
+              <a:ext uri="{FF2B5EF4-FFF2-40B4-BE49-F238E27FC236}">
+                <a16:creationId xmlns:a16="http://schemas.microsoft.com/office/drawing/2014/main" id="{D125B466-8300-4B74-A1BA-905EF3820914}"/>
+              </a:ext>
+            </a:extLst>
+          </p:cNvPr>
+          <p:cNvSpPr>
+            <a:spLocks noGrp="1"/>
+          </p:cNvSpPr>
+          <p:nvPr>
+            <p:ph idx="1"/>
+          </p:nvPr>
+        </p:nvSpPr>
+        <p:spPr/>
+        <p:txBody>
+          <a:bodyPr>
+            <a:normAutofit/>
+          </a:bodyPr>
+          <a:lstStyle/>
+          <a:p>
+            <a:pPr marL="0" indent="0">
+              <a:buNone/>
+            </a:pPr>
+            <a:r>
+              <a:rPr lang="en-GB" dirty="0"/>
+              <a:t>Lithium polymer chemistry</a:t>
+            </a:r>
+          </a:p>
+          <a:p>
+            <a:r>
+              <a:rPr lang="en-GB" dirty="0"/>
+              <a:t>Watt-hour capacity: 180Wh</a:t>
+            </a:r>
+          </a:p>
+          <a:p>
+            <a:r>
+              <a:rPr lang="en-GB" dirty="0"/>
+              <a:t>Supply voltage:22.2V</a:t>
+            </a:r>
+          </a:p>
+          <a:p>
+            <a:r>
+              <a:rPr lang="en-GB" dirty="0"/>
+              <a:t>Amp-hour capacity: 8100Ah</a:t>
+            </a:r>
+          </a:p>
+          <a:p>
+            <a:r>
+              <a:rPr lang="en-GB" dirty="0"/>
+              <a:t>Mass: 1.7kg</a:t>
+            </a:r>
+          </a:p>
+          <a:p>
+            <a:endParaRPr lang="en-GB" dirty="0"/>
+          </a:p>
+          <a:p>
+            <a:r>
+              <a:rPr lang="en-GB" dirty="0"/>
+              <a:t>Supply voltage: 50v</a:t>
+            </a:r>
+          </a:p>
+          <a:p>
+            <a:r>
+              <a:rPr lang="en-GB" dirty="0"/>
+              <a:t>2 batteries in parallel required</a:t>
+            </a:r>
+          </a:p>
+        </p:txBody>
+      </p:sp>
+      <p:pic>
+        <p:nvPicPr>
+          <p:cNvPr id="5" name="Picture 4" descr="A screenshot of a cell phone&#10;&#10;Description automatically generated">
+            <a:extLst>
+              <a:ext uri="{FF2B5EF4-FFF2-40B4-BE49-F238E27FC236}">
+                <a16:creationId xmlns:a16="http://schemas.microsoft.com/office/drawing/2014/main" id="{FD6F27ED-35B8-40F0-B2E0-07E4EFF2036D}"/>
+              </a:ext>
+            </a:extLst>
+          </p:cNvPr>
+          <p:cNvPicPr>
+            <a:picLocks noChangeAspect="1"/>
+          </p:cNvPicPr>
+          <p:nvPr/>
+        </p:nvPicPr>
+        <p:blipFill>
+          <a:blip r:embed="rId2">
+            <a:extLst>
+              <a:ext uri="{28A0092B-C50C-407E-A947-70E740481C1C}">
+                <a14:useLocalDpi xmlns:a14="http://schemas.microsoft.com/office/drawing/2010/main" val="0"/>
+              </a:ext>
+            </a:extLst>
+          </a:blip>
+          <a:stretch>
+            <a:fillRect/>
+          </a:stretch>
+        </p:blipFill>
+        <p:spPr>
+          <a:xfrm>
+            <a:off x="6096000" y="928328"/>
+            <a:ext cx="5907531" cy="3759338"/>
+          </a:xfrm>
+          <a:prstGeom prst="rect">
+            <a:avLst/>
+          </a:prstGeom>
+        </p:spPr>
+      </p:pic>
+    </p:spTree>
+    <p:extLst>
+      <p:ext uri="{BB962C8B-B14F-4D97-AF65-F5344CB8AC3E}">
+        <p14:creationId xmlns:p14="http://schemas.microsoft.com/office/powerpoint/2010/main" val="1175002974"/>
+      </p:ext>
+    </p:extLst>
+  </p:cSld>
+  <p:clrMapOvr>
+    <a:masterClrMapping/>
+  </p:clrMapOvr>
+</p:sld>
+</file>
+
+<file path=ppt/slides/slide9.xml><?xml version="1.0" encoding="utf-8"?>
+<p:sld xmlns:a="http://schemas.openxmlformats.org/drawingml/2006/main" xmlns:r="http://schemas.openxmlformats.org/officeDocument/2006/relationships" xmlns:p="http://schemas.openxmlformats.org/presentationml/2006/main">
+  <p:cSld>
+    <p:spTree>
+      <p:nvGrpSpPr>
+        <p:cNvPr id="1" name=""/>
+        <p:cNvGrpSpPr/>
+        <p:nvPr/>
+      </p:nvGrpSpPr>
+      <p:grpSpPr>
+        <a:xfrm>
+          <a:off x="0" y="0"/>
+          <a:ext cx="0" cy="0"/>
+          <a:chOff x="0" y="0"/>
+          <a:chExt cx="0" cy="0"/>
+        </a:xfrm>
+      </p:grpSpPr>
+      <p:sp>
+        <p:nvSpPr>
+          <p:cNvPr id="2" name="Title 1">
+            <a:extLst>
+              <a:ext uri="{FF2B5EF4-FFF2-40B4-BE49-F238E27FC236}">
+                <a16:creationId xmlns:a16="http://schemas.microsoft.com/office/drawing/2014/main" id="{37129C13-237D-4521-81BA-D7F55AD5B585}"/>
+              </a:ext>
+            </a:extLst>
+          </p:cNvPr>
+          <p:cNvSpPr>
+            <a:spLocks noGrp="1"/>
+          </p:cNvSpPr>
+          <p:nvPr>
+            <p:ph type="title"/>
+          </p:nvPr>
+        </p:nvSpPr>
+        <p:spPr/>
+        <p:txBody>
+          <a:bodyPr/>
+          <a:lstStyle/>
+          <a:p>
+            <a:r>
+              <a:rPr lang="en-GB" dirty="0"/>
+              <a:t>Battery charging</a:t>
+            </a:r>
+          </a:p>
+        </p:txBody>
+      </p:sp>
+      <p:sp>
+        <p:nvSpPr>
+          <p:cNvPr id="3" name="Content Placeholder 2">
+            <a:extLst>
+              <a:ext uri="{FF2B5EF4-FFF2-40B4-BE49-F238E27FC236}">
+                <a16:creationId xmlns:a16="http://schemas.microsoft.com/office/drawing/2014/main" id="{67871035-2C42-42A1-86FD-846461ADF945}"/>
+              </a:ext>
+            </a:extLst>
+          </p:cNvPr>
+          <p:cNvSpPr>
+            <a:spLocks noGrp="1"/>
+          </p:cNvSpPr>
+          <p:nvPr>
+            <p:ph idx="1"/>
+          </p:nvPr>
+        </p:nvSpPr>
+        <p:spPr/>
+        <p:txBody>
+          <a:bodyPr/>
+          <a:lstStyle/>
+          <a:p>
+            <a:r>
+              <a:rPr lang="en-GB" dirty="0"/>
+              <a:t>Lithium polymer can be dangerous:</a:t>
+            </a:r>
+          </a:p>
+          <a:p>
+            <a:pPr lvl="1"/>
+            <a:r>
+              <a:rPr lang="en-GB" dirty="0"/>
+              <a:t>Overcharging</a:t>
+            </a:r>
+          </a:p>
+          <a:p>
+            <a:pPr lvl="1"/>
+            <a:r>
+              <a:rPr lang="en-GB" dirty="0"/>
+              <a:t>Unbalanced charging</a:t>
+            </a:r>
+          </a:p>
+          <a:p>
+            <a:r>
+              <a:rPr lang="en-GB" dirty="0"/>
+              <a:t>Use an off the shelf solution</a:t>
+            </a:r>
+          </a:p>
+          <a:p>
+            <a:r>
+              <a:rPr lang="en-GB" dirty="0"/>
+              <a:t>Use hobby/RC charger</a:t>
+            </a:r>
+          </a:p>
+          <a:p>
+            <a:endParaRPr lang="en-GB" dirty="0"/>
+          </a:p>
+          <a:p>
+            <a:r>
+              <a:rPr lang="en-GB" dirty="0"/>
+              <a:t>Charge batteries in parallel</a:t>
+            </a:r>
+          </a:p>
+          <a:p>
+            <a:r>
+              <a:rPr lang="en-GB" dirty="0"/>
+              <a:t>System to switch between series and parallel</a:t>
+            </a:r>
+          </a:p>
+          <a:p>
+            <a:endParaRPr lang="en-GB" dirty="0"/>
+          </a:p>
+          <a:p>
+            <a:endParaRPr lang="en-GB" dirty="0"/>
+          </a:p>
+        </p:txBody>
+      </p:sp>
+      <p:pic>
+        <p:nvPicPr>
+          <p:cNvPr id="6" name="Picture 5">
+            <a:extLst>
+              <a:ext uri="{FF2B5EF4-FFF2-40B4-BE49-F238E27FC236}">
+                <a16:creationId xmlns:a16="http://schemas.microsoft.com/office/drawing/2014/main" id="{38978E23-184E-43D4-927F-322B80564812}"/>
+              </a:ext>
+            </a:extLst>
+          </p:cNvPr>
+          <p:cNvPicPr>
+            <a:picLocks noChangeAspect="1"/>
+          </p:cNvPicPr>
+          <p:nvPr/>
+        </p:nvPicPr>
+        <p:blipFill rotWithShape="1">
+          <a:blip r:embed="rId2"/>
+          <a:srcRect l="1375"/>
+          <a:stretch/>
+        </p:blipFill>
+        <p:spPr>
+          <a:xfrm>
+            <a:off x="7055194" y="681037"/>
+            <a:ext cx="4525780" cy="3465767"/>
+          </a:xfrm>
+          <a:prstGeom prst="rect">
+            <a:avLst/>
+          </a:prstGeom>
+        </p:spPr>
+      </p:pic>
+    </p:spTree>
+    <p:extLst>
+      <p:ext uri="{BB962C8B-B14F-4D97-AF65-F5344CB8AC3E}">
+        <p14:creationId xmlns:p14="http://schemas.microsoft.com/office/powerpoint/2010/main" val="2721647380"/>
       </p:ext>
     </p:extLst>
   </p:cSld>

</xml_diff>